<commit_message>
Added more to slides
</commit_message>
<xml_diff>
--- a/5YCM/Slides_5YCM.pptx
+++ b/5YCM/Slides_5YCM.pptx
@@ -15,8 +15,8 @@
     <p:sldId id="271" r:id="rId6"/>
     <p:sldId id="281" r:id="rId7"/>
     <p:sldId id="284" r:id="rId8"/>
-    <p:sldId id="285" r:id="rId9"/>
-    <p:sldId id="286" r:id="rId10"/>
+    <p:sldId id="286" r:id="rId9"/>
+    <p:sldId id="285" r:id="rId10"/>
     <p:sldId id="287" r:id="rId11"/>
     <p:sldId id="259" r:id="rId12"/>
     <p:sldId id="260" r:id="rId13"/>
@@ -141,8 +141,8 @@
           <p14:sldIdLst>
             <p14:sldId id="281"/>
             <p14:sldId id="284"/>
+            <p14:sldId id="286"/>
             <p14:sldId id="285"/>
-            <p14:sldId id="286"/>
             <p14:sldId id="287"/>
           </p14:sldIdLst>
         </p14:section>
@@ -160,6 +160,20 @@
           </p14:sldIdLst>
         </p14:section>
       </p14:sectionLst>
+    </p:ext>
+    <p:ext uri="{EFAFB233-063F-42B5-8137-9DF3F51BA10A}">
+      <p15:sldGuideLst xmlns:p15="http://schemas.microsoft.com/office/powerpoint/2012/main">
+        <p15:guide id="1" orient="horz" pos="2160">
+          <p15:clr>
+            <a:srgbClr val="A4A3A4"/>
+          </p15:clr>
+        </p15:guide>
+        <p15:guide id="2" pos="2880">
+          <p15:clr>
+            <a:srgbClr val="A4A3A4"/>
+          </p15:clr>
+        </p15:guide>
+      </p15:sldGuideLst>
     </p:ext>
   </p:extLst>
 </p:presentation>
@@ -793,14 +807,6 @@
           <a:bodyPr/>
           <a:lstStyle/>
           <a:p>
-            <a:r>
-              <a:rPr lang="en-US" dirty="0" smtClean="0"/>
-              <a:t>Filtering is ones</a:t>
-            </a:r>
-            <a:r>
-              <a:rPr lang="en-US" baseline="0" dirty="0" smtClean="0"/>
-              <a:t> with &gt; 50% completion and less than 10% redundancy using 139 single copy genes</a:t>
-            </a:r>
             <a:endParaRPr lang="en-US" dirty="0"/>
           </a:p>
         </p:txBody>
@@ -822,7 +828,7 @@
           <a:p>
             <a:fld id="{03226FDB-C243-F04F-A3A4-63881AA9751B}" type="slidenum">
               <a:rPr lang="en-US" smtClean="0"/>
-              <a:t>8</a:t>
+              <a:t>4</a:t>
             </a:fld>
             <a:endParaRPr lang="en-US"/>
           </a:p>
@@ -831,7 +837,7 @@
     </p:spTree>
     <p:extLst>
       <p:ext uri="{BB962C8B-B14F-4D97-AF65-F5344CB8AC3E}">
-        <p14:creationId xmlns:p14="http://schemas.microsoft.com/office/powerpoint/2010/main" val="3805351520"/>
+        <p14:creationId xmlns:p14="http://schemas.microsoft.com/office/powerpoint/2010/main" val="1015896996"/>
       </p:ext>
     </p:extLst>
   </p:cSld>
@@ -887,28 +893,16 @@
           <a:p>
             <a:r>
               <a:rPr lang="en-US" dirty="0" smtClean="0"/>
-              <a:t>TB</a:t>
+              <a:t>Filtering is ones</a:t>
             </a:r>
             <a:r>
               <a:rPr lang="en-US" baseline="0" dirty="0" smtClean="0"/>
-              <a:t> – </a:t>
-            </a:r>
-            <a:r>
-              <a:rPr lang="en-US" baseline="0" dirty="0" err="1" smtClean="0"/>
-              <a:t>Dimictic</a:t>
-            </a:r>
-            <a:endParaRPr lang="en-US" baseline="0" dirty="0" smtClean="0"/>
-          </a:p>
-          <a:p>
+              <a:t> with &gt; 50% completion and less than 10% redundancy using 139 single copy </a:t>
+            </a:r>
             <a:r>
               <a:rPr lang="en-US" baseline="0" dirty="0" smtClean="0"/>
-              <a:t>CB -- </a:t>
-            </a:r>
-            <a:r>
-              <a:rPr lang="en-US" baseline="0" dirty="0" err="1" smtClean="0"/>
-              <a:t>Polymictic</a:t>
-            </a:r>
-            <a:endParaRPr lang="en-US" dirty="0"/>
+              <a:t>genes</a:t>
+            </a:r>
           </a:p>
         </p:txBody>
       </p:sp>
@@ -927,9 +921,9 @@
           <a:bodyPr/>
           <a:lstStyle/>
           <a:p>
-            <a:fld id="{E24C21EA-28B2-0442-AFB4-706342F125BD}" type="slidenum">
-              <a:rPr lang="en-US" smtClean="0"/>
-              <a:t>11</a:t>
+            <a:fld id="{03226FDB-C243-F04F-A3A4-63881AA9751B}" type="slidenum">
+              <a:rPr lang="en-US" smtClean="0"/>
+              <a:t>9</a:t>
             </a:fld>
             <a:endParaRPr lang="en-US"/>
           </a:p>
@@ -938,7 +932,7 @@
     </p:spTree>
     <p:extLst>
       <p:ext uri="{BB962C8B-B14F-4D97-AF65-F5344CB8AC3E}">
-        <p14:creationId xmlns:p14="http://schemas.microsoft.com/office/powerpoint/2010/main" val="37004290"/>
+        <p14:creationId xmlns:p14="http://schemas.microsoft.com/office/powerpoint/2010/main" val="3805351520"/>
       </p:ext>
     </p:extLst>
   </p:cSld>
@@ -994,6 +988,113 @@
           <a:p>
             <a:r>
               <a:rPr lang="en-US" dirty="0" smtClean="0"/>
+              <a:t>TB</a:t>
+            </a:r>
+            <a:r>
+              <a:rPr lang="en-US" baseline="0" dirty="0" smtClean="0"/>
+              <a:t> – </a:t>
+            </a:r>
+            <a:r>
+              <a:rPr lang="en-US" baseline="0" dirty="0" err="1" smtClean="0"/>
+              <a:t>Dimictic</a:t>
+            </a:r>
+            <a:endParaRPr lang="en-US" baseline="0" dirty="0" smtClean="0"/>
+          </a:p>
+          <a:p>
+            <a:r>
+              <a:rPr lang="en-US" baseline="0" dirty="0" smtClean="0"/>
+              <a:t>CB -- </a:t>
+            </a:r>
+            <a:r>
+              <a:rPr lang="en-US" baseline="0" dirty="0" err="1" smtClean="0"/>
+              <a:t>Polymictic</a:t>
+            </a:r>
+            <a:endParaRPr lang="en-US" dirty="0"/>
+          </a:p>
+        </p:txBody>
+      </p:sp>
+      <p:sp>
+        <p:nvSpPr>
+          <p:cNvPr id="4" name="Slide Number Placeholder 3"/>
+          <p:cNvSpPr>
+            <a:spLocks noGrp="1"/>
+          </p:cNvSpPr>
+          <p:nvPr>
+            <p:ph type="sldNum" sz="quarter" idx="10"/>
+          </p:nvPr>
+        </p:nvSpPr>
+        <p:spPr/>
+        <p:txBody>
+          <a:bodyPr/>
+          <a:lstStyle/>
+          <a:p>
+            <a:fld id="{E24C21EA-28B2-0442-AFB4-706342F125BD}" type="slidenum">
+              <a:rPr lang="en-US" smtClean="0"/>
+              <a:t>11</a:t>
+            </a:fld>
+            <a:endParaRPr lang="en-US"/>
+          </a:p>
+        </p:txBody>
+      </p:sp>
+    </p:spTree>
+    <p:extLst>
+      <p:ext uri="{BB962C8B-B14F-4D97-AF65-F5344CB8AC3E}">
+        <p14:creationId xmlns:p14="http://schemas.microsoft.com/office/powerpoint/2010/main" val="37004290"/>
+      </p:ext>
+    </p:extLst>
+  </p:cSld>
+  <p:clrMapOvr>
+    <a:masterClrMapping/>
+  </p:clrMapOvr>
+</p:notes>
+</file>
+
+<file path=ppt/notesSlides/notesSlide6.xml><?xml version="1.0" encoding="utf-8"?>
+<p:notes xmlns:a="http://schemas.openxmlformats.org/drawingml/2006/main" xmlns:r="http://schemas.openxmlformats.org/officeDocument/2006/relationships" xmlns:p="http://schemas.openxmlformats.org/presentationml/2006/main">
+  <p:cSld>
+    <p:spTree>
+      <p:nvGrpSpPr>
+        <p:cNvPr id="1" name=""/>
+        <p:cNvGrpSpPr/>
+        <p:nvPr/>
+      </p:nvGrpSpPr>
+      <p:grpSpPr>
+        <a:xfrm>
+          <a:off x="0" y="0"/>
+          <a:ext cx="0" cy="0"/>
+          <a:chOff x="0" y="0"/>
+          <a:chExt cx="0" cy="0"/>
+        </a:xfrm>
+      </p:grpSpPr>
+      <p:sp>
+        <p:nvSpPr>
+          <p:cNvPr id="2" name="Slide Image Placeholder 1"/>
+          <p:cNvSpPr>
+            <a:spLocks noGrp="1" noRot="1" noChangeAspect="1"/>
+          </p:cNvSpPr>
+          <p:nvPr>
+            <p:ph type="sldImg"/>
+          </p:nvPr>
+        </p:nvSpPr>
+        <p:spPr/>
+      </p:sp>
+      <p:sp>
+        <p:nvSpPr>
+          <p:cNvPr id="3" name="Notes Placeholder 2"/>
+          <p:cNvSpPr>
+            <a:spLocks noGrp="1"/>
+          </p:cNvSpPr>
+          <p:nvPr>
+            <p:ph type="body" idx="1"/>
+          </p:nvPr>
+        </p:nvSpPr>
+        <p:spPr/>
+        <p:txBody>
+          <a:bodyPr/>
+          <a:lstStyle/>
+          <a:p>
+            <a:r>
+              <a:rPr lang="en-US" dirty="0" smtClean="0"/>
               <a:t>Mary</a:t>
             </a:r>
             <a:r>
@@ -1051,7 +1152,7 @@
 </p:notes>
 </file>
 
-<file path=ppt/notesSlides/notesSlide6.xml><?xml version="1.0" encoding="utf-8"?>
+<file path=ppt/notesSlides/notesSlide7.xml><?xml version="1.0" encoding="utf-8"?>
 <p:notes xmlns:a="http://schemas.openxmlformats.org/drawingml/2006/main" xmlns:r="http://schemas.openxmlformats.org/officeDocument/2006/relationships" xmlns:p="http://schemas.openxmlformats.org/presentationml/2006/main">
   <p:cSld>
     <p:spTree>
@@ -4189,11 +4290,7 @@
             </a:r>
             <a:r>
               <a:rPr lang="en-US" dirty="0" smtClean="0"/>
-              <a:t> </a:t>
-            </a:r>
-            <a:r>
-              <a:rPr lang="en-US" dirty="0" smtClean="0"/>
-              <a:t>Year Committee Meeting</a:t>
+              <a:t> Year Committee Meeting</a:t>
             </a:r>
             <a:endParaRPr lang="en-US" dirty="0"/>
           </a:p>
@@ -4222,7 +4319,7 @@
             <a:r>
               <a:rPr lang="en-US" dirty="0" smtClean="0">
                 <a:solidFill>
-                  <a:schemeClr val="tx1"/>
+                  <a:schemeClr val="bg1"/>
                 </a:solidFill>
               </a:rPr>
               <a:t>Sarah Stevens</a:t>
@@ -4232,7 +4329,7 @@
             <a:r>
               <a:rPr lang="en-US" dirty="0" smtClean="0">
                 <a:solidFill>
-                  <a:schemeClr val="tx1"/>
+                  <a:schemeClr val="bg1"/>
                 </a:solidFill>
               </a:rPr>
               <a:t>@</a:t>
@@ -4240,14 +4337,14 @@
             <a:r>
               <a:rPr lang="en-US" dirty="0" err="1" smtClean="0">
                 <a:solidFill>
-                  <a:schemeClr val="tx1"/>
+                  <a:schemeClr val="bg1"/>
                 </a:solidFill>
               </a:rPr>
               <a:t>microStevens</a:t>
             </a:r>
             <a:endParaRPr lang="en-US" dirty="0" smtClean="0">
               <a:solidFill>
-                <a:schemeClr val="tx1"/>
+                <a:schemeClr val="bg1"/>
               </a:solidFill>
             </a:endParaRPr>
           </a:p>
@@ -4255,14 +4352,14 @@
             <a:r>
               <a:rPr lang="en-US" dirty="0" smtClean="0">
                 <a:solidFill>
-                  <a:schemeClr val="tx1"/>
+                  <a:schemeClr val="bg1"/>
                 </a:solidFill>
               </a:rPr>
               <a:t>McMahon Lab</a:t>
             </a:r>
             <a:endParaRPr lang="en-US" dirty="0">
               <a:solidFill>
-                <a:schemeClr val="tx1"/>
+                <a:schemeClr val="bg1"/>
               </a:solidFill>
             </a:endParaRPr>
           </a:p>
@@ -4289,7 +4386,7 @@
   <p:timing>
     <p:tnLst>
       <p:par>
-        <p:cTn xmlns:p14="http://schemas.microsoft.com/office/powerpoint/2010/main" id="1" dur="indefinite" restart="never" nodeType="tmRoot"/>
+        <p:cTn id="1" dur="indefinite" restart="never" nodeType="tmRoot"/>
       </p:par>
     </p:tnLst>
   </p:timing>
@@ -4371,7 +4468,6 @@
               <a:rPr lang="en-US" dirty="0"/>
               <a:t>recombination between such strains?</a:t>
             </a:r>
-            <a:endParaRPr lang="en-US" dirty="0"/>
           </a:p>
         </p:txBody>
       </p:sp>
@@ -4503,13 +4599,13 @@
       <p:transition spd="slow" p14:dur="2000"/>
     </mc:Choice>
     <mc:Fallback>
-      <p:transition xmlns:p14="http://schemas.microsoft.com/office/powerpoint/2010/main" spd="slow"/>
+      <p:transition spd="slow"/>
     </mc:Fallback>
   </mc:AlternateContent>
   <p:timing>
     <p:tnLst>
       <p:par>
-        <p:cTn xmlns:p14="http://schemas.microsoft.com/office/powerpoint/2010/main" id="1" dur="indefinite" restart="never" nodeType="tmRoot"/>
+        <p:cTn id="1" dur="indefinite" restart="never" nodeType="tmRoot"/>
       </p:par>
     </p:tnLst>
   </p:timing>
@@ -4654,13 +4750,13 @@
       <p:transition spd="slow" p14:dur="2000"/>
     </mc:Choice>
     <mc:Fallback>
-      <p:transition xmlns:p14="http://schemas.microsoft.com/office/powerpoint/2010/main" spd="slow"/>
+      <p:transition spd="slow"/>
     </mc:Fallback>
   </mc:AlternateContent>
   <p:timing>
     <p:tnLst>
       <p:par>
-        <p:cTn xmlns:p14="http://schemas.microsoft.com/office/powerpoint/2010/main" id="1" dur="indefinite" restart="never" nodeType="tmRoot"/>
+        <p:cTn id="1" dur="indefinite" restart="never" nodeType="tmRoot"/>
       </p:par>
     </p:tnLst>
   </p:timing>
@@ -4901,13 +4997,13 @@
       <p:transition spd="slow" p14:dur="2000"/>
     </mc:Choice>
     <mc:Fallback>
-      <p:transition xmlns:p14="http://schemas.microsoft.com/office/powerpoint/2010/main" spd="slow"/>
+      <p:transition spd="slow"/>
     </mc:Fallback>
   </mc:AlternateContent>
   <p:timing>
     <p:tnLst>
       <p:par>
-        <p:cTn xmlns:p14="http://schemas.microsoft.com/office/powerpoint/2010/main" id="1" dur="indefinite" restart="never" nodeType="tmRoot"/>
+        <p:cTn id="1" dur="indefinite" restart="never" nodeType="tmRoot"/>
       </p:par>
     </p:tnLst>
   </p:timing>
@@ -5048,13 +5144,13 @@
       <p:transition spd="slow" p14:dur="2000"/>
     </mc:Choice>
     <mc:Fallback>
-      <p:transition xmlns:p14="http://schemas.microsoft.com/office/powerpoint/2010/main" spd="slow"/>
+      <p:transition spd="slow"/>
     </mc:Fallback>
   </mc:AlternateContent>
   <p:timing>
     <p:tnLst>
       <p:par>
-        <p:cTn xmlns:p14="http://schemas.microsoft.com/office/powerpoint/2010/main" id="1" dur="indefinite" restart="never" nodeType="tmRoot"/>
+        <p:cTn id="1" dur="indefinite" restart="never" nodeType="tmRoot"/>
       </p:par>
     </p:tnLst>
   </p:timing>
@@ -5295,13 +5391,13 @@
       <p:transition spd="slow" p14:dur="2000"/>
     </mc:Choice>
     <mc:Fallback>
-      <p:transition xmlns:p14="http://schemas.microsoft.com/office/powerpoint/2010/main" spd="slow"/>
+      <p:transition spd="slow"/>
     </mc:Fallback>
   </mc:AlternateContent>
   <p:timing>
     <p:tnLst>
       <p:par>
-        <p:cTn xmlns:p14="http://schemas.microsoft.com/office/powerpoint/2010/main" id="1" dur="indefinite" restart="never" nodeType="tmRoot"/>
+        <p:cTn id="1" dur="indefinite" restart="never" nodeType="tmRoot"/>
       </p:par>
     </p:tnLst>
   </p:timing>
@@ -5425,7 +5521,7 @@
   <p:timing>
     <p:tnLst>
       <p:par>
-        <p:cTn xmlns:p14="http://schemas.microsoft.com/office/powerpoint/2010/main" id="1" dur="indefinite" restart="never" nodeType="tmRoot"/>
+        <p:cTn id="1" dur="indefinite" restart="never" nodeType="tmRoot"/>
       </p:par>
     </p:tnLst>
   </p:timing>
@@ -5589,7 +5685,7 @@
   <p:timing>
     <p:tnLst>
       <p:par>
-        <p:cTn xmlns:p14="http://schemas.microsoft.com/office/powerpoint/2010/main" id="1" dur="indefinite" restart="never" nodeType="tmRoot"/>
+        <p:cTn id="1" dur="indefinite" restart="never" nodeType="tmRoot"/>
       </p:par>
     </p:tnLst>
   </p:timing>
@@ -5622,7 +5718,7 @@
           <p:nvPr/>
         </p:nvPicPr>
         <p:blipFill>
-          <a:blip r:embed="rId2">
+          <a:blip r:embed="rId3">
             <a:extLst>
               <a:ext uri="{28A0092B-C50C-407E-A947-70E740481C1C}">
                 <a14:useLocalDpi xmlns:a14="http://schemas.microsoft.com/office/drawing/2010/main" val="0"/>
@@ -5648,14 +5744,14 @@
           </a:ln>
           <a:extLst>
             <a:ext uri="{909E8E84-426E-40dd-AFC4-6F175D3DCCD1}">
-              <a14:hiddenFill xmlns:a14="http://schemas.microsoft.com/office/drawing/2010/main">
+              <a14:hiddenFill xmlns:a14="http://schemas.microsoft.com/office/drawing/2010/main" xmlns="">
                 <a:solidFill>
                   <a:srgbClr val="FFFFFF"/>
                 </a:solidFill>
               </a14:hiddenFill>
             </a:ext>
             <a:ext uri="{91240B29-F687-4f45-9708-019B960494DF}">
-              <a14:hiddenLine xmlns:a14="http://schemas.microsoft.com/office/drawing/2010/main" w="9525">
+              <a14:hiddenLine xmlns:a14="http://schemas.microsoft.com/office/drawing/2010/main" xmlns="" w="9525">
                 <a:solidFill>
                   <a:srgbClr val="000000"/>
                 </a:solidFill>
@@ -5804,7 +5900,7 @@
   <p:timing>
     <p:tnLst>
       <p:par>
-        <p:cTn xmlns:p14="http://schemas.microsoft.com/office/powerpoint/2010/main" id="1" dur="indefinite" restart="never" nodeType="tmRoot"/>
+        <p:cTn id="1" dur="indefinite" restart="never" nodeType="tmRoot"/>
       </p:par>
     </p:tnLst>
   </p:timing>
@@ -5890,7 +5986,7 @@
   <p:timing>
     <p:tnLst>
       <p:par>
-        <p:cTn xmlns:p14="http://schemas.microsoft.com/office/powerpoint/2010/main" id="1" dur="indefinite" restart="never" nodeType="tmRoot"/>
+        <p:cTn id="1" dur="indefinite" restart="never" nodeType="tmRoot"/>
       </p:par>
     </p:tnLst>
   </p:timing>
@@ -6016,36 +6112,219 @@
             <a:spLocks noGrp="1"/>
           </p:cNvSpPr>
           <p:nvPr>
-            <p:ph idx="1"/>
-          </p:nvPr>
-        </p:nvSpPr>
-        <p:spPr/>
-        <p:txBody>
-          <a:bodyPr/>
-          <a:lstStyle/>
-          <a:p>
-            <a:r>
-              <a:rPr lang="en-US" dirty="0" smtClean="0"/>
-              <a:t>Crystal Bog</a:t>
-            </a:r>
-          </a:p>
-          <a:p>
-            <a:r>
-              <a:rPr lang="en-US" dirty="0" smtClean="0"/>
-              <a:t>Mary Lake</a:t>
-            </a:r>
-          </a:p>
-          <a:p>
-            <a:r>
-              <a:rPr lang="en-US" dirty="0" smtClean="0"/>
-              <a:t>Mendota</a:t>
-            </a:r>
-          </a:p>
-          <a:p>
-            <a:r>
-              <a:rPr lang="en-US" dirty="0" smtClean="0"/>
-              <a:t>Trout Bog</a:t>
-            </a:r>
+            <p:ph sz="half" idx="1"/>
+          </p:nvPr>
+        </p:nvSpPr>
+        <p:spPr/>
+        <p:txBody>
+          <a:bodyPr>
+            <a:normAutofit fontScale="92500" lnSpcReduction="10000"/>
+          </a:bodyPr>
+          <a:lstStyle/>
+          <a:p>
+            <a:r>
+              <a:rPr lang="en-US" dirty="0" smtClean="0"/>
+              <a:t>Crystal </a:t>
+            </a:r>
+            <a:r>
+              <a:rPr lang="en-US" dirty="0" smtClean="0"/>
+              <a:t>Bog </a:t>
+            </a:r>
+          </a:p>
+          <a:p>
+            <a:pPr lvl="1"/>
+            <a:r>
+              <a:rPr lang="en-US" dirty="0" smtClean="0"/>
+              <a:t>2007-2009</a:t>
+            </a:r>
+          </a:p>
+          <a:p>
+            <a:pPr lvl="1"/>
+            <a:r>
+              <a:rPr lang="en-US" dirty="0" smtClean="0"/>
+              <a:t>82 metagenomes</a:t>
+            </a:r>
+          </a:p>
+          <a:p>
+            <a:pPr lvl="1"/>
+            <a:r>
+              <a:rPr lang="en-US" dirty="0" smtClean="0"/>
+              <a:t>20 </a:t>
+            </a:r>
+            <a:r>
+              <a:rPr lang="en-US" dirty="0" err="1" smtClean="0"/>
+              <a:t>Gbp</a:t>
+            </a:r>
+            <a:r>
+              <a:rPr lang="en-US" dirty="0" smtClean="0"/>
+              <a:t> assembled</a:t>
+            </a:r>
+            <a:endParaRPr lang="en-US" dirty="0" smtClean="0"/>
+          </a:p>
+          <a:p>
+            <a:r>
+              <a:rPr lang="en-US" dirty="0" smtClean="0"/>
+              <a:t>Mary </a:t>
+            </a:r>
+            <a:r>
+              <a:rPr lang="en-US" dirty="0" smtClean="0"/>
+              <a:t>Lake </a:t>
+            </a:r>
+          </a:p>
+          <a:p>
+            <a:pPr lvl="1"/>
+            <a:r>
+              <a:rPr lang="en-US" dirty="0" smtClean="0"/>
+              <a:t>2009, 12 depths</a:t>
+            </a:r>
+          </a:p>
+          <a:p>
+            <a:pPr lvl="1"/>
+            <a:r>
+              <a:rPr lang="en-US" dirty="0" smtClean="0"/>
+              <a:t>12 metagenomes</a:t>
+            </a:r>
+          </a:p>
+          <a:p>
+            <a:pPr lvl="1"/>
+            <a:r>
+              <a:rPr lang="en-US" dirty="0" smtClean="0"/>
+              <a:t>11 </a:t>
+            </a:r>
+            <a:r>
+              <a:rPr lang="en-US" dirty="0" err="1" smtClean="0"/>
+              <a:t>Mbp</a:t>
+            </a:r>
+            <a:r>
+              <a:rPr lang="en-US" dirty="0" smtClean="0"/>
+              <a:t> assembled</a:t>
+            </a:r>
+            <a:endParaRPr lang="en-US" dirty="0" smtClean="0"/>
+          </a:p>
+        </p:txBody>
+      </p:sp>
+      <p:sp>
+        <p:nvSpPr>
+          <p:cNvPr id="4" name="Content Placeholder 3"/>
+          <p:cNvSpPr>
+            <a:spLocks noGrp="1"/>
+          </p:cNvSpPr>
+          <p:nvPr>
+            <p:ph sz="half" idx="2"/>
+          </p:nvPr>
+        </p:nvSpPr>
+        <p:spPr/>
+        <p:txBody>
+          <a:bodyPr>
+            <a:normAutofit fontScale="92500" lnSpcReduction="10000"/>
+          </a:bodyPr>
+          <a:lstStyle/>
+          <a:p>
+            <a:r>
+              <a:rPr lang="en-US" dirty="0"/>
+              <a:t>Mendota </a:t>
+            </a:r>
+          </a:p>
+          <a:p>
+            <a:pPr lvl="1"/>
+            <a:r>
+              <a:rPr lang="en-US" dirty="0"/>
+              <a:t>2008-2012</a:t>
+            </a:r>
+          </a:p>
+          <a:p>
+            <a:pPr lvl="1"/>
+            <a:r>
+              <a:rPr lang="en-US" dirty="0"/>
+              <a:t>94 </a:t>
+            </a:r>
+            <a:r>
+              <a:rPr lang="en-US" dirty="0" smtClean="0"/>
+              <a:t>metagenomes</a:t>
+            </a:r>
+          </a:p>
+          <a:p>
+            <a:pPr lvl="1"/>
+            <a:r>
+              <a:rPr lang="en-US" dirty="0" smtClean="0"/>
+              <a:t>11 </a:t>
+            </a:r>
+            <a:r>
+              <a:rPr lang="en-US" dirty="0" err="1"/>
+              <a:t>Gbp</a:t>
+            </a:r>
+            <a:r>
+              <a:rPr lang="en-US" dirty="0"/>
+              <a:t> assembled</a:t>
+            </a:r>
+          </a:p>
+          <a:p>
+            <a:r>
+              <a:rPr lang="en-US" dirty="0"/>
+              <a:t>Trout Bog </a:t>
+            </a:r>
+          </a:p>
+          <a:p>
+            <a:pPr lvl="1"/>
+            <a:r>
+              <a:rPr lang="en-US" dirty="0" err="1"/>
+              <a:t>epilimnion</a:t>
+            </a:r>
+            <a:r>
+              <a:rPr lang="en-US" dirty="0"/>
+              <a:t> </a:t>
+            </a:r>
+          </a:p>
+          <a:p>
+            <a:pPr lvl="2"/>
+            <a:r>
+              <a:rPr lang="en-US" dirty="0" smtClean="0"/>
+              <a:t>2007-2009</a:t>
+            </a:r>
+          </a:p>
+          <a:p>
+            <a:pPr lvl="2"/>
+            <a:r>
+              <a:rPr lang="en-US" dirty="0" smtClean="0"/>
+              <a:t>47 metagenomes</a:t>
+            </a:r>
+            <a:endParaRPr lang="en-US" dirty="0"/>
+          </a:p>
+          <a:p>
+            <a:pPr lvl="1"/>
+            <a:r>
+              <a:rPr lang="en-US" dirty="0" err="1"/>
+              <a:t>hypolimnion</a:t>
+            </a:r>
+            <a:r>
+              <a:rPr lang="en-US" dirty="0"/>
+              <a:t> </a:t>
+            </a:r>
+          </a:p>
+          <a:p>
+            <a:pPr lvl="2"/>
+            <a:r>
+              <a:rPr lang="en-US" dirty="0"/>
+              <a:t>2005, 2007-2009, </a:t>
+            </a:r>
+            <a:r>
+              <a:rPr lang="en-US" dirty="0" smtClean="0"/>
+              <a:t>2012-2013</a:t>
+            </a:r>
+          </a:p>
+          <a:p>
+            <a:pPr lvl="2"/>
+            <a:r>
+              <a:rPr lang="en-US" dirty="0" smtClean="0"/>
+              <a:t>82 metagenomes</a:t>
+            </a:r>
+          </a:p>
+          <a:p>
+            <a:pPr lvl="2"/>
+            <a:endParaRPr lang="en-US" dirty="0"/>
+          </a:p>
+          <a:p>
+            <a:endParaRPr lang="en-US" dirty="0"/>
           </a:p>
         </p:txBody>
       </p:sp>
@@ -6063,106 +6342,6 @@
 </file>
 
 <file path=ppt/slides/slide8.xml><?xml version="1.0" encoding="utf-8"?>
-<p:sld xmlns:a="http://schemas.openxmlformats.org/drawingml/2006/main" xmlns:r="http://schemas.openxmlformats.org/officeDocument/2006/relationships" xmlns:p="http://schemas.openxmlformats.org/presentationml/2006/main">
-  <p:cSld>
-    <p:spTree>
-      <p:nvGrpSpPr>
-        <p:cNvPr id="1" name=""/>
-        <p:cNvGrpSpPr/>
-        <p:nvPr/>
-      </p:nvGrpSpPr>
-      <p:grpSpPr>
-        <a:xfrm>
-          <a:off x="0" y="0"/>
-          <a:ext cx="0" cy="0"/>
-          <a:chOff x="0" y="0"/>
-          <a:chExt cx="0" cy="0"/>
-        </a:xfrm>
-      </p:grpSpPr>
-      <p:sp>
-        <p:nvSpPr>
-          <p:cNvPr id="2" name="Title 1"/>
-          <p:cNvSpPr>
-            <a:spLocks noGrp="1"/>
-          </p:cNvSpPr>
-          <p:nvPr>
-            <p:ph type="title"/>
-          </p:nvPr>
-        </p:nvSpPr>
-        <p:spPr/>
-        <p:txBody>
-          <a:bodyPr/>
-          <a:lstStyle/>
-          <a:p>
-            <a:r>
-              <a:rPr lang="en-US" dirty="0" smtClean="0"/>
-              <a:t>Stats on MAGs so far</a:t>
-            </a:r>
-            <a:endParaRPr lang="en-US" dirty="0"/>
-          </a:p>
-        </p:txBody>
-      </p:sp>
-      <p:sp>
-        <p:nvSpPr>
-          <p:cNvPr id="3" name="Content Placeholder 2"/>
-          <p:cNvSpPr>
-            <a:spLocks noGrp="1"/>
-          </p:cNvSpPr>
-          <p:nvPr>
-            <p:ph idx="1"/>
-          </p:nvPr>
-        </p:nvSpPr>
-        <p:spPr/>
-        <p:txBody>
-          <a:bodyPr/>
-          <a:lstStyle/>
-          <a:p>
-            <a:r>
-              <a:rPr lang="en-US" dirty="0" smtClean="0"/>
-              <a:t>Crystal Bog</a:t>
-            </a:r>
-          </a:p>
-          <a:p>
-            <a:pPr lvl="1"/>
-            <a:r>
-              <a:rPr lang="en-US" dirty="0"/>
-              <a:t>2505 bins, 564 passed filtering</a:t>
-            </a:r>
-            <a:endParaRPr lang="en-US" dirty="0" smtClean="0"/>
-          </a:p>
-          <a:p>
-            <a:r>
-              <a:rPr lang="en-US" dirty="0" smtClean="0"/>
-              <a:t>Mary Lake</a:t>
-            </a:r>
-          </a:p>
-          <a:p>
-            <a:pPr lvl="1"/>
-            <a:r>
-              <a:rPr lang="en-US" dirty="0"/>
-              <a:t>352 bins, 104 passed filtering</a:t>
-            </a:r>
-            <a:endParaRPr lang="en-US" dirty="0" smtClean="0"/>
-          </a:p>
-          <a:p>
-            <a:endParaRPr lang="en-US" dirty="0"/>
-          </a:p>
-        </p:txBody>
-      </p:sp>
-    </p:spTree>
-    <p:extLst>
-      <p:ext uri="{BB962C8B-B14F-4D97-AF65-F5344CB8AC3E}">
-        <p14:creationId xmlns:p14="http://schemas.microsoft.com/office/powerpoint/2010/main" val="3930018211"/>
-      </p:ext>
-    </p:extLst>
-  </p:cSld>
-  <p:clrMapOvr>
-    <a:masterClrMapping/>
-  </p:clrMapOvr>
-</p:sld>
-</file>
-
-<file path=ppt/slides/slide9.xml><?xml version="1.0" encoding="utf-8"?>
 <p:sld xmlns:a="http://schemas.openxmlformats.org/drawingml/2006/main" xmlns:r="http://schemas.openxmlformats.org/officeDocument/2006/relationships" xmlns:p="http://schemas.openxmlformats.org/presentationml/2006/main">
   <p:cSld>
     <p:spTree>
@@ -6231,6 +6410,255 @@
     <p:extLst>
       <p:ext uri="{BB962C8B-B14F-4D97-AF65-F5344CB8AC3E}">
         <p14:creationId xmlns:p14="http://schemas.microsoft.com/office/powerpoint/2010/main" val="484787663"/>
+      </p:ext>
+    </p:extLst>
+  </p:cSld>
+  <p:clrMapOvr>
+    <a:masterClrMapping/>
+  </p:clrMapOvr>
+</p:sld>
+</file>
+
+<file path=ppt/slides/slide9.xml><?xml version="1.0" encoding="utf-8"?>
+<p:sld xmlns:a="http://schemas.openxmlformats.org/drawingml/2006/main" xmlns:r="http://schemas.openxmlformats.org/officeDocument/2006/relationships" xmlns:p="http://schemas.openxmlformats.org/presentationml/2006/main">
+  <p:cSld>
+    <p:spTree>
+      <p:nvGrpSpPr>
+        <p:cNvPr id="1" name=""/>
+        <p:cNvGrpSpPr/>
+        <p:nvPr/>
+      </p:nvGrpSpPr>
+      <p:grpSpPr>
+        <a:xfrm>
+          <a:off x="0" y="0"/>
+          <a:ext cx="0" cy="0"/>
+          <a:chOff x="0" y="0"/>
+          <a:chExt cx="0" cy="0"/>
+        </a:xfrm>
+      </p:grpSpPr>
+      <p:sp>
+        <p:nvSpPr>
+          <p:cNvPr id="2" name="Title 1"/>
+          <p:cNvSpPr>
+            <a:spLocks noGrp="1"/>
+          </p:cNvSpPr>
+          <p:nvPr>
+            <p:ph type="title"/>
+          </p:nvPr>
+        </p:nvSpPr>
+        <p:spPr/>
+        <p:txBody>
+          <a:bodyPr/>
+          <a:lstStyle/>
+          <a:p>
+            <a:r>
+              <a:rPr lang="en-US" dirty="0" smtClean="0"/>
+              <a:t>Stats on MAGs so far</a:t>
+            </a:r>
+            <a:endParaRPr lang="en-US" dirty="0"/>
+          </a:p>
+        </p:txBody>
+      </p:sp>
+      <p:sp>
+        <p:nvSpPr>
+          <p:cNvPr id="3" name="Content Placeholder 2"/>
+          <p:cNvSpPr>
+            <a:spLocks noGrp="1"/>
+          </p:cNvSpPr>
+          <p:nvPr>
+            <p:ph idx="1"/>
+          </p:nvPr>
+        </p:nvSpPr>
+        <p:spPr/>
+        <p:txBody>
+          <a:bodyPr>
+            <a:normAutofit fontScale="92500" lnSpcReduction="10000"/>
+          </a:bodyPr>
+          <a:lstStyle/>
+          <a:p>
+            <a:r>
+              <a:rPr lang="en-US" dirty="0" smtClean="0"/>
+              <a:t>Crystal Bog</a:t>
+            </a:r>
+          </a:p>
+          <a:p>
+            <a:pPr lvl="1"/>
+            <a:r>
+              <a:rPr lang="en-US" dirty="0"/>
+              <a:t>2505 bins, 564 passed </a:t>
+            </a:r>
+            <a:r>
+              <a:rPr lang="en-US" dirty="0" smtClean="0"/>
+              <a:t>filtering</a:t>
+            </a:r>
+          </a:p>
+          <a:p>
+            <a:pPr lvl="1"/>
+            <a:r>
+              <a:rPr lang="en-US" dirty="0"/>
+              <a:t>Phyla with &gt; 10 bins:  </a:t>
+            </a:r>
+            <a:endParaRPr lang="en-US" dirty="0" smtClean="0"/>
+          </a:p>
+          <a:p>
+            <a:pPr lvl="2"/>
+            <a:r>
+              <a:rPr lang="en-US" dirty="0" err="1" smtClean="0"/>
+              <a:t>Actinobacteria</a:t>
+            </a:r>
+            <a:r>
+              <a:rPr lang="en-US" dirty="0" smtClean="0"/>
+              <a:t>(342), </a:t>
+            </a:r>
+            <a:r>
+              <a:rPr lang="en-US" dirty="0" err="1" smtClean="0"/>
+              <a:t>Proteobacteria</a:t>
+            </a:r>
+            <a:r>
+              <a:rPr lang="en-US" dirty="0" smtClean="0"/>
+              <a:t>(267), </a:t>
+            </a:r>
+            <a:r>
+              <a:rPr lang="en-US" dirty="0" err="1" smtClean="0"/>
+              <a:t>Verrucomicrobia</a:t>
+            </a:r>
+            <a:r>
+              <a:rPr lang="en-US" dirty="0" smtClean="0"/>
+              <a:t>(113), </a:t>
+            </a:r>
+            <a:r>
+              <a:rPr lang="en-US" dirty="0" err="1" smtClean="0"/>
+              <a:t>Bacteroidetes</a:t>
+            </a:r>
+            <a:r>
+              <a:rPr lang="en-US" dirty="0" smtClean="0"/>
+              <a:t>(41), </a:t>
+            </a:r>
+            <a:r>
+              <a:rPr lang="en-US" dirty="0" err="1"/>
+              <a:t>Candidatus</a:t>
+            </a:r>
+            <a:r>
+              <a:rPr lang="en-US" dirty="0"/>
+              <a:t> </a:t>
+            </a:r>
+            <a:r>
+              <a:rPr lang="en-US" dirty="0" err="1" smtClean="0"/>
+              <a:t>Saccharibacteria</a:t>
+            </a:r>
+            <a:r>
+              <a:rPr lang="en-US" dirty="0" smtClean="0"/>
+              <a:t>(31), </a:t>
+            </a:r>
+            <a:r>
+              <a:rPr lang="en-US" dirty="0" err="1" smtClean="0"/>
+              <a:t>Chlorobi</a:t>
+            </a:r>
+            <a:r>
+              <a:rPr lang="en-US" dirty="0" smtClean="0"/>
+              <a:t>(29), </a:t>
+            </a:r>
+            <a:r>
+              <a:rPr lang="en-US" dirty="0" err="1" smtClean="0"/>
+              <a:t>Parcubacteria</a:t>
+            </a:r>
+            <a:r>
+              <a:rPr lang="en-US" dirty="0" smtClean="0"/>
+              <a:t> (10), </a:t>
+            </a:r>
+          </a:p>
+          <a:p>
+            <a:r>
+              <a:rPr lang="en-US" dirty="0" smtClean="0"/>
+              <a:t>Mary </a:t>
+            </a:r>
+            <a:r>
+              <a:rPr lang="en-US" dirty="0" smtClean="0"/>
+              <a:t>Lake</a:t>
+            </a:r>
+          </a:p>
+          <a:p>
+            <a:pPr lvl="1"/>
+            <a:r>
+              <a:rPr lang="en-US" dirty="0"/>
+              <a:t>352 bins, 104 passed </a:t>
+            </a:r>
+            <a:r>
+              <a:rPr lang="en-US" dirty="0" smtClean="0"/>
+              <a:t>filtering</a:t>
+            </a:r>
+          </a:p>
+          <a:p>
+            <a:pPr lvl="1"/>
+            <a:r>
+              <a:rPr lang="en-US" dirty="0" smtClean="0"/>
+              <a:t>Phyla </a:t>
+            </a:r>
+            <a:r>
+              <a:rPr lang="en-US" dirty="0"/>
+              <a:t>with &gt; 10 bins</a:t>
+            </a:r>
+            <a:r>
+              <a:rPr lang="en-US" dirty="0" smtClean="0"/>
+              <a:t>:</a:t>
+            </a:r>
+          </a:p>
+          <a:p>
+            <a:pPr lvl="2"/>
+            <a:r>
+              <a:rPr lang="en-US" dirty="0" err="1" smtClean="0"/>
+              <a:t>Proteobacteria</a:t>
+            </a:r>
+            <a:r>
+              <a:rPr lang="en-US" dirty="0" smtClean="0"/>
+              <a:t>(99), </a:t>
+            </a:r>
+            <a:r>
+              <a:rPr lang="en-US" dirty="0" err="1" smtClean="0"/>
+              <a:t>Actinobacteria</a:t>
+            </a:r>
+            <a:r>
+              <a:rPr lang="en-US" dirty="0" smtClean="0"/>
+              <a:t>(34), </a:t>
+            </a:r>
+            <a:r>
+              <a:rPr lang="en-US" dirty="0" err="1" smtClean="0"/>
+              <a:t>Planctomycetes</a:t>
+            </a:r>
+            <a:r>
+              <a:rPr lang="en-US" dirty="0" smtClean="0"/>
+              <a:t>(21), </a:t>
+            </a:r>
+            <a:r>
+              <a:rPr lang="en-US" dirty="0" err="1" smtClean="0"/>
+              <a:t>Verrucomicrobia</a:t>
+            </a:r>
+            <a:r>
+              <a:rPr lang="en-US" dirty="0" smtClean="0"/>
+              <a:t>(18), </a:t>
+            </a:r>
+            <a:r>
+              <a:rPr lang="en-US" dirty="0" err="1" smtClean="0"/>
+              <a:t>Bacteroidetes</a:t>
+            </a:r>
+            <a:r>
+              <a:rPr lang="en-US" dirty="0" smtClean="0"/>
+              <a:t>(18), Cyanobacteria(11)</a:t>
+            </a:r>
+          </a:p>
+          <a:p>
+            <a:pPr lvl="2"/>
+            <a:endParaRPr lang="en-US" dirty="0"/>
+          </a:p>
+          <a:p>
+            <a:endParaRPr lang="en-US" dirty="0"/>
+          </a:p>
+        </p:txBody>
+      </p:sp>
+    </p:spTree>
+    <p:extLst>
+      <p:ext uri="{BB962C8B-B14F-4D97-AF65-F5344CB8AC3E}">
+        <p14:creationId xmlns:p14="http://schemas.microsoft.com/office/powerpoint/2010/main" val="3930018211"/>
       </p:ext>
     </p:extLst>
   </p:cSld>

</xml_diff>

<commit_message>
Added Updates and reordered slides
Also made a pdf version
</commit_message>
<xml_diff>
--- a/5YCM/Slides_5YCM.pptx
+++ b/5YCM/Slides_5YCM.pptx
@@ -5,24 +5,26 @@
     <p:sldMasterId id="2147483648" r:id="rId1"/>
   </p:sldMasterIdLst>
   <p:notesMasterIdLst>
-    <p:notesMasterId r:id="rId17"/>
+    <p:notesMasterId r:id="rId19"/>
   </p:notesMasterIdLst>
   <p:sldIdLst>
     <p:sldId id="283" r:id="rId2"/>
-    <p:sldId id="279" r:id="rId3"/>
-    <p:sldId id="280" r:id="rId4"/>
-    <p:sldId id="271" r:id="rId5"/>
-    <p:sldId id="281" r:id="rId6"/>
-    <p:sldId id="284" r:id="rId7"/>
-    <p:sldId id="286" r:id="rId8"/>
-    <p:sldId id="285" r:id="rId9"/>
-    <p:sldId id="287" r:id="rId10"/>
-    <p:sldId id="288" r:id="rId11"/>
-    <p:sldId id="259" r:id="rId12"/>
-    <p:sldId id="260" r:id="rId13"/>
-    <p:sldId id="289" r:id="rId14"/>
-    <p:sldId id="290" r:id="rId15"/>
-    <p:sldId id="291" r:id="rId16"/>
+    <p:sldId id="292" r:id="rId3"/>
+    <p:sldId id="293" r:id="rId4"/>
+    <p:sldId id="279" r:id="rId5"/>
+    <p:sldId id="280" r:id="rId6"/>
+    <p:sldId id="271" r:id="rId7"/>
+    <p:sldId id="281" r:id="rId8"/>
+    <p:sldId id="287" r:id="rId9"/>
+    <p:sldId id="284" r:id="rId10"/>
+    <p:sldId id="286" r:id="rId11"/>
+    <p:sldId id="285" r:id="rId12"/>
+    <p:sldId id="288" r:id="rId13"/>
+    <p:sldId id="259" r:id="rId14"/>
+    <p:sldId id="260" r:id="rId15"/>
+    <p:sldId id="289" r:id="rId16"/>
+    <p:sldId id="290" r:id="rId17"/>
+    <p:sldId id="291" r:id="rId18"/>
   </p:sldIdLst>
   <p:sldSz cx="9144000" cy="6858000" type="screen4x3"/>
   <p:notesSz cx="6858000" cy="9144000"/>
@@ -127,6 +129,8 @@
         <p14:section name="Default Section" id="{758B7049-0ADF-8F49-B7F9-64A0A5BF8FB7}">
           <p14:sldIdLst>
             <p14:sldId id="283"/>
+            <p14:sldId id="292"/>
+            <p14:sldId id="293"/>
           </p14:sldIdLst>
         </p14:section>
         <p14:section name="Intro" id="{D8B685A9-0AAD-7543-883D-95E09FCFE2CC}">
@@ -139,10 +143,10 @@
         <p14:section name="newQ speciation" id="{D4EF7B4F-9358-EF46-9E72-ABD9447F9847}">
           <p14:sldIdLst>
             <p14:sldId id="281"/>
+            <p14:sldId id="287"/>
             <p14:sldId id="284"/>
             <p14:sldId id="286"/>
             <p14:sldId id="285"/>
-            <p14:sldId id="287"/>
             <p14:sldId id="288"/>
           </p14:sldIdLst>
         </p14:section>
@@ -660,7 +664,7 @@
           <a:p>
             <a:fld id="{35EF5441-D692-534E-884D-601F4C7E917A}" type="slidenum">
               <a:rPr lang="en-US" smtClean="0"/>
-              <a:t>2</a:t>
+              <a:t>4</a:t>
             </a:fld>
             <a:endParaRPr lang="en-US"/>
           </a:p>
@@ -744,7 +748,7 @@
           <a:p>
             <a:fld id="{03226FDB-C243-F04F-A3A4-63881AA9751B}" type="slidenum">
               <a:rPr lang="en-US" smtClean="0"/>
-              <a:t>3</a:t>
+              <a:t>5</a:t>
             </a:fld>
             <a:endParaRPr lang="en-US"/>
           </a:p>
@@ -828,7 +832,7 @@
           <a:p>
             <a:fld id="{03226FDB-C243-F04F-A3A4-63881AA9751B}" type="slidenum">
               <a:rPr lang="en-US" smtClean="0"/>
-              <a:t>6</a:t>
+              <a:t>9</a:t>
             </a:fld>
             <a:endParaRPr lang="en-US"/>
           </a:p>
@@ -923,7 +927,7 @@
           <a:p>
             <a:fld id="{03226FDB-C243-F04F-A3A4-63881AA9751B}" type="slidenum">
               <a:rPr lang="en-US" smtClean="0"/>
-              <a:t>8</a:t>
+              <a:t>11</a:t>
             </a:fld>
             <a:endParaRPr lang="en-US"/>
           </a:p>
@@ -1007,7 +1011,7 @@
           <a:p>
             <a:fld id="{03226FDB-C243-F04F-A3A4-63881AA9751B}" type="slidenum">
               <a:rPr lang="en-US" smtClean="0"/>
-              <a:t>10</a:t>
+              <a:t>12</a:t>
             </a:fld>
             <a:endParaRPr lang="en-US"/>
           </a:p>
@@ -1114,7 +1118,7 @@
           <a:p>
             <a:fld id="{E24C21EA-28B2-0442-AFB4-706342F125BD}" type="slidenum">
               <a:rPr lang="en-US" smtClean="0"/>
-              <a:t>11</a:t>
+              <a:t>13</a:t>
             </a:fld>
             <a:endParaRPr lang="en-US"/>
           </a:p>
@@ -1183,13 +1187,8 @@
             </a:r>
             <a:r>
               <a:rPr lang="en-US" baseline="0" dirty="0" smtClean="0"/>
-              <a:t> Lake never mixes-</a:t>
-            </a:r>
-            <a:r>
-              <a:rPr lang="en-US" baseline="0" smtClean="0"/>
-              <a:t>meromictic</a:t>
-            </a:r>
-            <a:endParaRPr lang="en-US" baseline="0" dirty="0" smtClean="0"/>
+              <a:t> Lake never mixes-meromictic</a:t>
+            </a:r>
           </a:p>
           <a:p>
             <a:r>
@@ -1217,7 +1216,7 @@
           <a:p>
             <a:fld id="{E24C21EA-28B2-0442-AFB4-706342F125BD}" type="slidenum">
               <a:rPr lang="en-US" smtClean="0"/>
-              <a:t>12</a:t>
+              <a:t>14</a:t>
             </a:fld>
             <a:endParaRPr lang="en-US"/>
           </a:p>
@@ -1305,7 +1304,7 @@
           <a:p>
             <a:fld id="{03226FDB-C243-F04F-A3A4-63881AA9751B}" type="slidenum">
               <a:rPr lang="en-US" smtClean="0"/>
-              <a:t>14</a:t>
+              <a:t>16</a:t>
             </a:fld>
             <a:endParaRPr lang="en-US"/>
           </a:p>
@@ -4478,6 +4477,337 @@
 </file>
 
 <file path=ppt/slides/slide10.xml><?xml version="1.0" encoding="utf-8"?>
+<p:sld xmlns:a="http://schemas.openxmlformats.org/drawingml/2006/main" xmlns:r="http://schemas.openxmlformats.org/officeDocument/2006/relationships" xmlns:p="http://schemas.openxmlformats.org/presentationml/2006/main">
+  <p:cSld>
+    <p:spTree>
+      <p:nvGrpSpPr>
+        <p:cNvPr id="1" name=""/>
+        <p:cNvGrpSpPr/>
+        <p:nvPr/>
+      </p:nvGrpSpPr>
+      <p:grpSpPr>
+        <a:xfrm>
+          <a:off x="0" y="0"/>
+          <a:ext cx="0" cy="0"/>
+          <a:chOff x="0" y="0"/>
+          <a:chExt cx="0" cy="0"/>
+        </a:xfrm>
+      </p:grpSpPr>
+      <p:sp>
+        <p:nvSpPr>
+          <p:cNvPr id="2" name="Title 1"/>
+          <p:cNvSpPr>
+            <a:spLocks noGrp="1"/>
+          </p:cNvSpPr>
+          <p:nvPr>
+            <p:ph type="title"/>
+          </p:nvPr>
+        </p:nvSpPr>
+        <p:spPr/>
+        <p:txBody>
+          <a:bodyPr/>
+          <a:lstStyle/>
+          <a:p>
+            <a:r>
+              <a:rPr lang="en-US" dirty="0" smtClean="0"/>
+              <a:t>Data Processing</a:t>
+            </a:r>
+            <a:endParaRPr lang="en-US" dirty="0"/>
+          </a:p>
+        </p:txBody>
+      </p:sp>
+      <p:pic>
+        <p:nvPicPr>
+          <p:cNvPr id="5" name="Picture 4" descr="binning_experimental_plan_diagram_to_mapping.png"/>
+          <p:cNvPicPr>
+            <a:picLocks noChangeAspect="1"/>
+          </p:cNvPicPr>
+          <p:nvPr/>
+        </p:nvPicPr>
+        <p:blipFill rotWithShape="1">
+          <a:blip r:embed="rId2">
+            <a:extLst>
+              <a:ext uri="{28A0092B-C50C-407E-A947-70E740481C1C}">
+                <a14:useLocalDpi xmlns:a14="http://schemas.microsoft.com/office/drawing/2010/main" val="0"/>
+              </a:ext>
+            </a:extLst>
+          </a:blip>
+          <a:srcRect l="700" t="1628" r="774" b="1603"/>
+          <a:stretch/>
+        </p:blipFill>
+        <p:spPr>
+          <a:xfrm>
+            <a:off x="63960" y="1763305"/>
+            <a:ext cx="9009227" cy="4129648"/>
+          </a:xfrm>
+          <a:prstGeom prst="rect">
+            <a:avLst/>
+          </a:prstGeom>
+        </p:spPr>
+      </p:pic>
+    </p:spTree>
+    <p:extLst>
+      <p:ext uri="{BB962C8B-B14F-4D97-AF65-F5344CB8AC3E}">
+        <p14:creationId xmlns:p14="http://schemas.microsoft.com/office/powerpoint/2010/main" val="484787663"/>
+      </p:ext>
+    </p:extLst>
+  </p:cSld>
+  <p:clrMapOvr>
+    <a:masterClrMapping/>
+  </p:clrMapOvr>
+</p:sld>
+</file>
+
+<file path=ppt/slides/slide11.xml><?xml version="1.0" encoding="utf-8"?>
+<p:sld xmlns:a="http://schemas.openxmlformats.org/drawingml/2006/main" xmlns:r="http://schemas.openxmlformats.org/officeDocument/2006/relationships" xmlns:p="http://schemas.openxmlformats.org/presentationml/2006/main">
+  <p:cSld>
+    <p:spTree>
+      <p:nvGrpSpPr>
+        <p:cNvPr id="1" name=""/>
+        <p:cNvGrpSpPr/>
+        <p:nvPr/>
+      </p:nvGrpSpPr>
+      <p:grpSpPr>
+        <a:xfrm>
+          <a:off x="0" y="0"/>
+          <a:ext cx="0" cy="0"/>
+          <a:chOff x="0" y="0"/>
+          <a:chExt cx="0" cy="0"/>
+        </a:xfrm>
+      </p:grpSpPr>
+      <p:sp>
+        <p:nvSpPr>
+          <p:cNvPr id="2" name="Title 1"/>
+          <p:cNvSpPr>
+            <a:spLocks noGrp="1"/>
+          </p:cNvSpPr>
+          <p:nvPr>
+            <p:ph type="title"/>
+          </p:nvPr>
+        </p:nvSpPr>
+        <p:spPr/>
+        <p:txBody>
+          <a:bodyPr/>
+          <a:lstStyle/>
+          <a:p>
+            <a:r>
+              <a:rPr lang="en-US" dirty="0" smtClean="0"/>
+              <a:t>Stats on MAGs so far</a:t>
+            </a:r>
+            <a:endParaRPr lang="en-US" dirty="0"/>
+          </a:p>
+        </p:txBody>
+      </p:sp>
+      <p:sp>
+        <p:nvSpPr>
+          <p:cNvPr id="3" name="Content Placeholder 2"/>
+          <p:cNvSpPr>
+            <a:spLocks noGrp="1"/>
+          </p:cNvSpPr>
+          <p:nvPr>
+            <p:ph idx="1"/>
+          </p:nvPr>
+        </p:nvSpPr>
+        <p:spPr/>
+        <p:txBody>
+          <a:bodyPr>
+            <a:normAutofit fontScale="92500" lnSpcReduction="10000"/>
+          </a:bodyPr>
+          <a:lstStyle/>
+          <a:p>
+            <a:r>
+              <a:rPr lang="en-US" dirty="0" smtClean="0"/>
+              <a:t>Crystal Bog</a:t>
+            </a:r>
+          </a:p>
+          <a:p>
+            <a:pPr lvl="1"/>
+            <a:r>
+              <a:rPr lang="en-US" dirty="0"/>
+              <a:t>2505 bins, 564 passed </a:t>
+            </a:r>
+            <a:r>
+              <a:rPr lang="en-US" dirty="0" smtClean="0"/>
+              <a:t>filtering</a:t>
+            </a:r>
+          </a:p>
+          <a:p>
+            <a:pPr lvl="1"/>
+            <a:r>
+              <a:rPr lang="en-US" dirty="0"/>
+              <a:t>Phyla with &gt; 10 bins:  </a:t>
+            </a:r>
+            <a:endParaRPr lang="en-US" dirty="0" smtClean="0"/>
+          </a:p>
+          <a:p>
+            <a:pPr lvl="2"/>
+            <a:r>
+              <a:rPr lang="en-US" dirty="0" err="1" smtClean="0"/>
+              <a:t>Actinobacteria</a:t>
+            </a:r>
+            <a:r>
+              <a:rPr lang="en-US" dirty="0" smtClean="0"/>
+              <a:t>(342), </a:t>
+            </a:r>
+            <a:r>
+              <a:rPr lang="en-US" dirty="0" err="1" smtClean="0"/>
+              <a:t>Proteobacteria</a:t>
+            </a:r>
+            <a:r>
+              <a:rPr lang="en-US" dirty="0" smtClean="0"/>
+              <a:t>(267), </a:t>
+            </a:r>
+            <a:r>
+              <a:rPr lang="en-US" dirty="0" err="1" smtClean="0"/>
+              <a:t>Verrucomicrobia</a:t>
+            </a:r>
+            <a:r>
+              <a:rPr lang="en-US" dirty="0" smtClean="0"/>
+              <a:t>(113), </a:t>
+            </a:r>
+            <a:r>
+              <a:rPr lang="en-US" dirty="0" err="1" smtClean="0"/>
+              <a:t>Bacteroidetes</a:t>
+            </a:r>
+            <a:r>
+              <a:rPr lang="en-US" dirty="0" smtClean="0"/>
+              <a:t>(41), </a:t>
+            </a:r>
+            <a:r>
+              <a:rPr lang="en-US" dirty="0" err="1"/>
+              <a:t>Candidatus</a:t>
+            </a:r>
+            <a:r>
+              <a:rPr lang="en-US" dirty="0"/>
+              <a:t> </a:t>
+            </a:r>
+            <a:r>
+              <a:rPr lang="en-US" dirty="0" err="1" smtClean="0"/>
+              <a:t>Saccharibacteria</a:t>
+            </a:r>
+            <a:r>
+              <a:rPr lang="en-US" dirty="0" smtClean="0"/>
+              <a:t>(31), </a:t>
+            </a:r>
+            <a:r>
+              <a:rPr lang="en-US" dirty="0" err="1" smtClean="0"/>
+              <a:t>Chlorobi</a:t>
+            </a:r>
+            <a:r>
+              <a:rPr lang="en-US" dirty="0" smtClean="0"/>
+              <a:t>(29), </a:t>
+            </a:r>
+            <a:r>
+              <a:rPr lang="en-US" dirty="0" err="1" smtClean="0"/>
+              <a:t>Parcubacteria</a:t>
+            </a:r>
+            <a:r>
+              <a:rPr lang="en-US" dirty="0" smtClean="0"/>
+              <a:t> (10), </a:t>
+            </a:r>
+          </a:p>
+          <a:p>
+            <a:r>
+              <a:rPr lang="en-US" dirty="0" smtClean="0"/>
+              <a:t>Mary </a:t>
+            </a:r>
+            <a:r>
+              <a:rPr lang="en-US" dirty="0" smtClean="0"/>
+              <a:t>Lake</a:t>
+            </a:r>
+          </a:p>
+          <a:p>
+            <a:pPr lvl="1"/>
+            <a:r>
+              <a:rPr lang="en-US" dirty="0"/>
+              <a:t>352 bins, 104 passed </a:t>
+            </a:r>
+            <a:r>
+              <a:rPr lang="en-US" dirty="0" smtClean="0"/>
+              <a:t>filtering</a:t>
+            </a:r>
+          </a:p>
+          <a:p>
+            <a:pPr lvl="1"/>
+            <a:r>
+              <a:rPr lang="en-US" dirty="0" smtClean="0"/>
+              <a:t>Phyla </a:t>
+            </a:r>
+            <a:r>
+              <a:rPr lang="en-US" dirty="0"/>
+              <a:t>with &gt; 10 bins</a:t>
+            </a:r>
+            <a:r>
+              <a:rPr lang="en-US" dirty="0" smtClean="0"/>
+              <a:t>:</a:t>
+            </a:r>
+          </a:p>
+          <a:p>
+            <a:pPr lvl="2"/>
+            <a:r>
+              <a:rPr lang="en-US" dirty="0" err="1" smtClean="0"/>
+              <a:t>Proteobacteria</a:t>
+            </a:r>
+            <a:r>
+              <a:rPr lang="en-US" dirty="0" smtClean="0"/>
+              <a:t>(99), </a:t>
+            </a:r>
+            <a:r>
+              <a:rPr lang="en-US" dirty="0" err="1" smtClean="0"/>
+              <a:t>Actinobacteria</a:t>
+            </a:r>
+            <a:r>
+              <a:rPr lang="en-US" dirty="0" smtClean="0"/>
+              <a:t>(34), </a:t>
+            </a:r>
+            <a:r>
+              <a:rPr lang="en-US" dirty="0" err="1" smtClean="0"/>
+              <a:t>Planctomycetes</a:t>
+            </a:r>
+            <a:r>
+              <a:rPr lang="en-US" dirty="0" smtClean="0"/>
+              <a:t>(21), </a:t>
+            </a:r>
+            <a:r>
+              <a:rPr lang="en-US" dirty="0" err="1" smtClean="0"/>
+              <a:t>Verrucomicrobia</a:t>
+            </a:r>
+            <a:r>
+              <a:rPr lang="en-US" dirty="0" smtClean="0"/>
+              <a:t>(18), </a:t>
+            </a:r>
+            <a:r>
+              <a:rPr lang="en-US" dirty="0" err="1" smtClean="0"/>
+              <a:t>Bacteroidetes</a:t>
+            </a:r>
+            <a:r>
+              <a:rPr lang="en-US" dirty="0" smtClean="0"/>
+              <a:t>(18), Cyanobacteria(11)</a:t>
+            </a:r>
+          </a:p>
+          <a:p>
+            <a:pPr lvl="2"/>
+            <a:endParaRPr lang="en-US" dirty="0"/>
+          </a:p>
+          <a:p>
+            <a:endParaRPr lang="en-US" dirty="0"/>
+          </a:p>
+        </p:txBody>
+      </p:sp>
+    </p:spTree>
+    <p:extLst>
+      <p:ext uri="{BB962C8B-B14F-4D97-AF65-F5344CB8AC3E}">
+        <p14:creationId xmlns:p14="http://schemas.microsoft.com/office/powerpoint/2010/main" val="3930018211"/>
+      </p:ext>
+    </p:extLst>
+  </p:cSld>
+  <p:clrMapOvr>
+    <a:masterClrMapping/>
+  </p:clrMapOvr>
+</p:sld>
+</file>
+
+<file path=ppt/slides/slide12.xml><?xml version="1.0" encoding="utf-8"?>
 <p:sld xmlns:a="http://schemas.openxmlformats.org/drawingml/2006/main" xmlns:r="http://schemas.openxmlformats.org/officeDocument/2006/relationships" xmlns:p="http://schemas.openxmlformats.org/presentationml/2006/main">
   <p:cSld>
     <p:spTree>
@@ -6099,285 +6429,6 @@
 </p:sld>
 </file>
 
-<file path=ppt/slides/slide11.xml><?xml version="1.0" encoding="utf-8"?>
-<p:sld xmlns:a="http://schemas.openxmlformats.org/drawingml/2006/main" xmlns:r="http://schemas.openxmlformats.org/officeDocument/2006/relationships" xmlns:p="http://schemas.openxmlformats.org/presentationml/2006/main" show="0">
-  <p:cSld>
-    <p:spTree>
-      <p:nvGrpSpPr>
-        <p:cNvPr id="1" name=""/>
-        <p:cNvGrpSpPr/>
-        <p:nvPr/>
-      </p:nvGrpSpPr>
-      <p:grpSpPr>
-        <a:xfrm>
-          <a:off x="0" y="0"/>
-          <a:ext cx="0" cy="0"/>
-          <a:chOff x="0" y="0"/>
-          <a:chExt cx="0" cy="0"/>
-        </a:xfrm>
-      </p:grpSpPr>
-      <p:sp>
-        <p:nvSpPr>
-          <p:cNvPr id="2" name="Title 1"/>
-          <p:cNvSpPr>
-            <a:spLocks noGrp="1"/>
-          </p:cNvSpPr>
-          <p:nvPr>
-            <p:ph type="title"/>
-          </p:nvPr>
-        </p:nvSpPr>
-        <p:spPr/>
-        <p:txBody>
-          <a:bodyPr/>
-          <a:lstStyle/>
-          <a:p>
-            <a:r>
-              <a:rPr lang="en-US" dirty="0" smtClean="0"/>
-              <a:t>Crystal Bog (CB) v. Trout Bog (TB)</a:t>
-            </a:r>
-            <a:endParaRPr lang="en-US" dirty="0"/>
-          </a:p>
-        </p:txBody>
-      </p:sp>
-      <p:sp>
-        <p:nvSpPr>
-          <p:cNvPr id="3" name="Content Placeholder 2"/>
-          <p:cNvSpPr>
-            <a:spLocks noGrp="1"/>
-          </p:cNvSpPr>
-          <p:nvPr>
-            <p:ph idx="1"/>
-          </p:nvPr>
-        </p:nvSpPr>
-        <p:spPr/>
-        <p:txBody>
-          <a:bodyPr>
-            <a:normAutofit lnSpcReduction="10000"/>
-          </a:bodyPr>
-          <a:lstStyle/>
-          <a:p>
-            <a:r>
-              <a:rPr lang="en-US" dirty="0" smtClean="0"/>
-              <a:t>Both dystrophic (high in DOC)</a:t>
-            </a:r>
-          </a:p>
-          <a:p>
-            <a:r>
-              <a:rPr lang="en-US" dirty="0" smtClean="0"/>
-              <a:t>Both seepage lakes</a:t>
-            </a:r>
-          </a:p>
-          <a:p>
-            <a:r>
-              <a:rPr lang="en-US" dirty="0" smtClean="0"/>
-              <a:t>Share 45-60% of their top 20 clades based on 16S tags</a:t>
-            </a:r>
-          </a:p>
-          <a:p>
-            <a:r>
-              <a:rPr lang="en-US" dirty="0" smtClean="0"/>
-              <a:t>Different mixing regimes </a:t>
-            </a:r>
-          </a:p>
-          <a:p>
-            <a:r>
-              <a:rPr lang="en-US" dirty="0" smtClean="0"/>
-              <a:t>CB has a smaller surface area</a:t>
-            </a:r>
-          </a:p>
-          <a:p>
-            <a:r>
-              <a:rPr lang="en-US" dirty="0" smtClean="0"/>
-              <a:t>TB is deeper</a:t>
-            </a:r>
-          </a:p>
-          <a:p>
-            <a:r>
-              <a:rPr lang="en-US" dirty="0" smtClean="0"/>
-              <a:t>About 5 miles apart</a:t>
-            </a:r>
-          </a:p>
-        </p:txBody>
-      </p:sp>
-    </p:spTree>
-    <p:extLst>
-      <p:ext uri="{BB962C8B-B14F-4D97-AF65-F5344CB8AC3E}">
-        <p14:creationId xmlns:p14="http://schemas.microsoft.com/office/powerpoint/2010/main" val="954074340"/>
-      </p:ext>
-    </p:extLst>
-  </p:cSld>
-  <p:clrMapOvr>
-    <a:masterClrMapping/>
-  </p:clrMapOvr>
-  <mc:AlternateContent xmlns:mc="http://schemas.openxmlformats.org/markup-compatibility/2006">
-    <mc:Choice xmlns:p14="http://schemas.microsoft.com/office/powerpoint/2010/main" Requires="p14">
-      <p:transition spd="slow" p14:dur="2000"/>
-    </mc:Choice>
-    <mc:Fallback>
-      <p:transition spd="slow"/>
-    </mc:Fallback>
-  </mc:AlternateContent>
-  <p:timing>
-    <p:tnLst>
-      <p:par>
-        <p:cTn id="1" dur="indefinite" restart="never" nodeType="tmRoot"/>
-      </p:par>
-    </p:tnLst>
-  </p:timing>
-</p:sld>
-</file>
-
-<file path=ppt/slides/slide12.xml><?xml version="1.0" encoding="utf-8"?>
-<p:sld xmlns:a="http://schemas.openxmlformats.org/drawingml/2006/main" xmlns:r="http://schemas.openxmlformats.org/officeDocument/2006/relationships" xmlns:p="http://schemas.openxmlformats.org/presentationml/2006/main" show="0">
-  <p:cSld>
-    <p:spTree>
-      <p:nvGrpSpPr>
-        <p:cNvPr id="1" name=""/>
-        <p:cNvGrpSpPr/>
-        <p:nvPr/>
-      </p:nvGrpSpPr>
-      <p:grpSpPr>
-        <a:xfrm>
-          <a:off x="0" y="0"/>
-          <a:ext cx="0" cy="0"/>
-          <a:chOff x="0" y="0"/>
-          <a:chExt cx="0" cy="0"/>
-        </a:xfrm>
-      </p:grpSpPr>
-      <p:sp>
-        <p:nvSpPr>
-          <p:cNvPr id="2" name="Title 1"/>
-          <p:cNvSpPr>
-            <a:spLocks noGrp="1"/>
-          </p:cNvSpPr>
-          <p:nvPr>
-            <p:ph type="title"/>
-          </p:nvPr>
-        </p:nvSpPr>
-        <p:spPr/>
-        <p:txBody>
-          <a:bodyPr/>
-          <a:lstStyle/>
-          <a:p>
-            <a:r>
-              <a:rPr lang="en-US" dirty="0" smtClean="0"/>
-              <a:t>Next Questions</a:t>
-            </a:r>
-            <a:endParaRPr lang="en-US" dirty="0"/>
-          </a:p>
-        </p:txBody>
-      </p:sp>
-      <p:sp>
-        <p:nvSpPr>
-          <p:cNvPr id="3" name="Content Placeholder 2"/>
-          <p:cNvSpPr>
-            <a:spLocks noGrp="1"/>
-          </p:cNvSpPr>
-          <p:nvPr>
-            <p:ph idx="1"/>
-          </p:nvPr>
-        </p:nvSpPr>
-        <p:spPr/>
-        <p:txBody>
-          <a:bodyPr>
-            <a:normAutofit fontScale="85000" lnSpcReduction="10000"/>
-          </a:bodyPr>
-          <a:lstStyle/>
-          <a:p>
-            <a:r>
-              <a:rPr lang="en-US" dirty="0" smtClean="0"/>
-              <a:t>Are there related sequence-discrete populations in TB and CB? </a:t>
-            </a:r>
-          </a:p>
-          <a:p>
-            <a:r>
-              <a:rPr lang="en-US" dirty="0" smtClean="0"/>
-              <a:t>How similar are they based on ANI?</a:t>
-            </a:r>
-          </a:p>
-          <a:p>
-            <a:pPr lvl="1"/>
-            <a:r>
-              <a:rPr lang="en-US" dirty="0" smtClean="0"/>
-              <a:t>ANI for reference MAGs to each other</a:t>
-            </a:r>
-          </a:p>
-          <a:p>
-            <a:pPr lvl="1"/>
-            <a:r>
-              <a:rPr lang="en-US" dirty="0" smtClean="0"/>
-              <a:t>ANI when mapping reads from same </a:t>
-            </a:r>
-            <a:r>
-              <a:rPr lang="en-US" dirty="0" err="1" smtClean="0"/>
-              <a:t>vs</a:t>
-            </a:r>
-            <a:r>
-              <a:rPr lang="en-US" dirty="0" smtClean="0"/>
-              <a:t> different lake</a:t>
-            </a:r>
-          </a:p>
-          <a:p>
-            <a:r>
-              <a:rPr lang="en-US" dirty="0" smtClean="0"/>
-              <a:t>For populations that are very similar between the two lakes:</a:t>
-            </a:r>
-          </a:p>
-          <a:p>
-            <a:pPr lvl="1"/>
-            <a:r>
-              <a:rPr lang="en-US" dirty="0"/>
-              <a:t>A</a:t>
-            </a:r>
-            <a:r>
-              <a:rPr lang="en-US" dirty="0" smtClean="0"/>
-              <a:t>re there genes present in one lake but not the other?</a:t>
-            </a:r>
-          </a:p>
-          <a:p>
-            <a:pPr lvl="1"/>
-            <a:r>
-              <a:rPr lang="en-US" dirty="0" smtClean="0"/>
-              <a:t>Is there evidence for (ecological or physical) barrier to recombination?</a:t>
-            </a:r>
-          </a:p>
-          <a:p>
-            <a:r>
-              <a:rPr lang="en-US" dirty="0" smtClean="0"/>
-              <a:t>Might also be able to compare MAGs from Mary Lake </a:t>
-            </a:r>
-            <a:endParaRPr lang="en-US" dirty="0"/>
-          </a:p>
-        </p:txBody>
-      </p:sp>
-    </p:spTree>
-    <p:extLst>
-      <p:ext uri="{BB962C8B-B14F-4D97-AF65-F5344CB8AC3E}">
-        <p14:creationId xmlns:p14="http://schemas.microsoft.com/office/powerpoint/2010/main" val="3843862250"/>
-      </p:ext>
-    </p:extLst>
-  </p:cSld>
-  <p:clrMapOvr>
-    <a:masterClrMapping/>
-  </p:clrMapOvr>
-  <mc:AlternateContent xmlns:mc="http://schemas.openxmlformats.org/markup-compatibility/2006">
-    <mc:Choice xmlns:p14="http://schemas.microsoft.com/office/powerpoint/2010/main" Requires="p14">
-      <p:transition spd="slow" p14:dur="2000"/>
-    </mc:Choice>
-    <mc:Fallback>
-      <p:transition spd="slow"/>
-    </mc:Fallback>
-  </mc:AlternateContent>
-  <p:timing>
-    <p:tnLst>
-      <p:par>
-        <p:cTn id="1" dur="indefinite" restart="never" nodeType="tmRoot"/>
-      </p:par>
-    </p:tnLst>
-  </p:timing>
-</p:sld>
-</file>
-
 <file path=ppt/slides/slide13.xml><?xml version="1.0" encoding="utf-8"?>
 <p:sld xmlns:a="http://schemas.openxmlformats.org/drawingml/2006/main" xmlns:r="http://schemas.openxmlformats.org/officeDocument/2006/relationships" xmlns:p="http://schemas.openxmlformats.org/presentationml/2006/main" show="0">
   <p:cSld>
@@ -6395,212 +6446,93 @@
           <a:chExt cx="0" cy="0"/>
         </a:xfrm>
       </p:grpSpPr>
-      <p:pic>
-        <p:nvPicPr>
-          <p:cNvPr id="4" name="Picture 3" descr="PTXSvB1_L06only.png"/>
-          <p:cNvPicPr>
-            <a:picLocks noChangeAspect="1"/>
-          </p:cNvPicPr>
-          <p:nvPr/>
-        </p:nvPicPr>
-        <p:blipFill>
-          <a:blip r:embed="rId2">
-            <a:extLst>
-              <a:ext uri="{28A0092B-C50C-407E-A947-70E740481C1C}">
-                <a14:useLocalDpi xmlns:a14="http://schemas.microsoft.com/office/drawing/2010/main" val="0"/>
-              </a:ext>
-            </a:extLst>
-          </a:blip>
-          <a:stretch>
-            <a:fillRect/>
-          </a:stretch>
-        </p:blipFill>
-        <p:spPr>
-          <a:xfrm>
-            <a:off x="1211149" y="1319006"/>
-            <a:ext cx="6721702" cy="5120640"/>
-          </a:xfrm>
-          <a:prstGeom prst="rect">
-            <a:avLst/>
-          </a:prstGeom>
-        </p:spPr>
-      </p:pic>
-      <p:sp>
-        <p:nvSpPr>
-          <p:cNvPr id="5" name="TextBox 4"/>
-          <p:cNvSpPr txBox="1"/>
-          <p:nvPr/>
-        </p:nvSpPr>
-        <p:spPr>
-          <a:xfrm>
-            <a:off x="5555570" y="6488668"/>
-            <a:ext cx="3588430" cy="369332"/>
-          </a:xfrm>
-          <a:prstGeom prst="rect">
-            <a:avLst/>
-          </a:prstGeom>
-          <a:noFill/>
-        </p:spPr>
-        <p:txBody>
-          <a:bodyPr wrap="none" rtlCol="0">
-            <a:spAutoFit/>
+      <p:sp>
+        <p:nvSpPr>
+          <p:cNvPr id="2" name="Title 1"/>
+          <p:cNvSpPr>
+            <a:spLocks noGrp="1"/>
+          </p:cNvSpPr>
+          <p:nvPr>
+            <p:ph type="title"/>
+          </p:nvPr>
+        </p:nvSpPr>
+        <p:spPr/>
+        <p:txBody>
+          <a:bodyPr/>
+          <a:lstStyle/>
+          <a:p>
+            <a:r>
+              <a:rPr lang="en-US" dirty="0" smtClean="0"/>
+              <a:t>Crystal Bog (CB) v. Trout Bog (TB)</a:t>
+            </a:r>
+            <a:endParaRPr lang="en-US" dirty="0"/>
+          </a:p>
+        </p:txBody>
+      </p:sp>
+      <p:sp>
+        <p:nvSpPr>
+          <p:cNvPr id="3" name="Content Placeholder 2"/>
+          <p:cNvSpPr>
+            <a:spLocks noGrp="1"/>
+          </p:cNvSpPr>
+          <p:nvPr>
+            <p:ph idx="1"/>
+          </p:nvPr>
+        </p:nvSpPr>
+        <p:spPr/>
+        <p:txBody>
+          <a:bodyPr>
+            <a:normAutofit lnSpcReduction="10000"/>
           </a:bodyPr>
           <a:lstStyle/>
           <a:p>
             <a:r>
               <a:rPr lang="en-US" dirty="0" smtClean="0"/>
-              <a:t>Mendota </a:t>
-            </a:r>
-            <a:r>
-              <a:rPr lang="en-US" dirty="0" err="1" smtClean="0"/>
-              <a:t>metagenome</a:t>
-            </a:r>
-            <a:r>
-              <a:rPr lang="en-US" dirty="0" smtClean="0"/>
-              <a:t>: 9 June 2009 </a:t>
-            </a:r>
-            <a:endParaRPr lang="en-US" dirty="0"/>
-          </a:p>
-        </p:txBody>
-      </p:sp>
-      <p:sp>
-        <p:nvSpPr>
-          <p:cNvPr id="6" name="TextBox 5"/>
-          <p:cNvSpPr txBox="1"/>
-          <p:nvPr/>
-        </p:nvSpPr>
-        <p:spPr>
-          <a:xfrm>
-            <a:off x="4783343" y="1664682"/>
-            <a:ext cx="3205099" cy="369332"/>
-          </a:xfrm>
-          <a:prstGeom prst="rect">
-            <a:avLst/>
-          </a:prstGeom>
-          <a:noFill/>
-        </p:spPr>
-        <p:txBody>
-          <a:bodyPr wrap="none" rtlCol="0">
-            <a:spAutoFit/>
-          </a:bodyPr>
-          <a:lstStyle/>
-          <a:p>
-            <a:r>
-              <a:rPr lang="en-US" dirty="0" smtClean="0"/>
-              <a:t>Subject: acI-B1 from L. Mendota</a:t>
-            </a:r>
-            <a:endParaRPr lang="en-US" dirty="0"/>
-          </a:p>
-        </p:txBody>
-      </p:sp>
-      <p:sp>
-        <p:nvSpPr>
-          <p:cNvPr id="8" name="Left Brace 7"/>
-          <p:cNvSpPr/>
-          <p:nvPr/>
-        </p:nvSpPr>
-        <p:spPr>
-          <a:xfrm rot="5400000">
-            <a:off x="5356347" y="4395594"/>
-            <a:ext cx="398445" cy="747127"/>
-          </a:xfrm>
-          <a:prstGeom prst="leftBrace">
-            <a:avLst/>
-          </a:prstGeom>
-          <a:ln>
-            <a:solidFill>
-              <a:schemeClr val="tx1"/>
-            </a:solidFill>
-          </a:ln>
-          <a:effectLst/>
-        </p:spPr>
-        <p:style>
-          <a:lnRef idx="2">
-            <a:schemeClr val="accent1"/>
-          </a:lnRef>
-          <a:fillRef idx="0">
-            <a:schemeClr val="accent1"/>
-          </a:fillRef>
-          <a:effectRef idx="1">
-            <a:schemeClr val="accent1"/>
-          </a:effectRef>
-          <a:fontRef idx="minor">
-            <a:schemeClr val="tx1"/>
-          </a:fontRef>
-        </p:style>
-        <p:txBody>
-          <a:bodyPr rtlCol="0" anchor="ctr"/>
-          <a:lstStyle/>
-          <a:p>
-            <a:pPr algn="ctr"/>
-            <a:endParaRPr lang="en-US"/>
-          </a:p>
-        </p:txBody>
-      </p:sp>
-      <p:sp>
-        <p:nvSpPr>
-          <p:cNvPr id="9" name="TextBox 8"/>
-          <p:cNvSpPr txBox="1"/>
-          <p:nvPr/>
-        </p:nvSpPr>
-        <p:spPr>
-          <a:xfrm>
-            <a:off x="4857696" y="4084292"/>
-            <a:ext cx="1395747" cy="369332"/>
-          </a:xfrm>
-          <a:prstGeom prst="rect">
-            <a:avLst/>
-          </a:prstGeom>
-          <a:noFill/>
-        </p:spPr>
-        <p:txBody>
-          <a:bodyPr wrap="none" rtlCol="0">
-            <a:spAutoFit/>
-          </a:bodyPr>
-          <a:lstStyle/>
-          <a:p>
-            <a:r>
-              <a:rPr lang="en-US" dirty="0" smtClean="0"/>
-              <a:t>discontinuity</a:t>
-            </a:r>
-            <a:endParaRPr lang="en-US" dirty="0"/>
-          </a:p>
-        </p:txBody>
-      </p:sp>
-      <p:sp>
-        <p:nvSpPr>
-          <p:cNvPr id="2" name="Title 1"/>
-          <p:cNvSpPr>
-            <a:spLocks noGrp="1"/>
-          </p:cNvSpPr>
-          <p:nvPr>
-            <p:ph type="title"/>
-          </p:nvPr>
-        </p:nvSpPr>
-        <p:spPr>
-          <a:xfrm>
-            <a:off x="457200" y="161877"/>
-            <a:ext cx="8229600" cy="1255761"/>
-          </a:xfrm>
-        </p:spPr>
-        <p:txBody>
-          <a:bodyPr>
-            <a:normAutofit fontScale="90000"/>
-          </a:bodyPr>
-          <a:lstStyle/>
-          <a:p>
-            <a:r>
-              <a:rPr lang="en-US" dirty="0" smtClean="0"/>
-              <a:t>SAGs allow us to capture sequence discrete populations</a:t>
-            </a:r>
-            <a:endParaRPr lang="en-US" dirty="0"/>
+              <a:t>Both dystrophic (high in DOC)</a:t>
+            </a:r>
+          </a:p>
+          <a:p>
+            <a:r>
+              <a:rPr lang="en-US" dirty="0" smtClean="0"/>
+              <a:t>Both seepage lakes</a:t>
+            </a:r>
+          </a:p>
+          <a:p>
+            <a:r>
+              <a:rPr lang="en-US" dirty="0" smtClean="0"/>
+              <a:t>Share 45-60% of their top 20 clades based on 16S tags</a:t>
+            </a:r>
+          </a:p>
+          <a:p>
+            <a:r>
+              <a:rPr lang="en-US" dirty="0" smtClean="0"/>
+              <a:t>Different mixing regimes </a:t>
+            </a:r>
+          </a:p>
+          <a:p>
+            <a:r>
+              <a:rPr lang="en-US" dirty="0" smtClean="0"/>
+              <a:t>CB has a smaller surface area</a:t>
+            </a:r>
+          </a:p>
+          <a:p>
+            <a:r>
+              <a:rPr lang="en-US" dirty="0" smtClean="0"/>
+              <a:t>TB is deeper</a:t>
+            </a:r>
+          </a:p>
+          <a:p>
+            <a:r>
+              <a:rPr lang="en-US" dirty="0" smtClean="0"/>
+              <a:t>About 5 miles apart</a:t>
+            </a:r>
           </a:p>
         </p:txBody>
       </p:sp>
     </p:spTree>
     <p:extLst>
       <p:ext uri="{BB962C8B-B14F-4D97-AF65-F5344CB8AC3E}">
-        <p14:creationId xmlns:p14="http://schemas.microsoft.com/office/powerpoint/2010/main" val="1499778607"/>
+        <p14:creationId xmlns:p14="http://schemas.microsoft.com/office/powerpoint/2010/main" val="954074340"/>
       </p:ext>
     </p:extLst>
   </p:cSld>
@@ -6652,102 +6584,106 @@
             <p:ph type="title"/>
           </p:nvPr>
         </p:nvSpPr>
-        <p:spPr>
-          <a:xfrm>
-            <a:off x="457200" y="274638"/>
-            <a:ext cx="8229600" cy="833600"/>
-          </a:xfrm>
-        </p:spPr>
+        <p:spPr/>
         <p:txBody>
           <a:bodyPr/>
           <a:lstStyle/>
           <a:p>
             <a:r>
               <a:rPr lang="en-US" dirty="0" smtClean="0"/>
-              <a:t>Sequence discrete populations</a:t>
+              <a:t>Next Questions</a:t>
             </a:r>
             <a:endParaRPr lang="en-US" dirty="0"/>
           </a:p>
         </p:txBody>
       </p:sp>
-      <p:pic>
-        <p:nvPicPr>
-          <p:cNvPr id="4" name="Picture 2"/>
-          <p:cNvPicPr>
-            <a:picLocks noChangeAspect="1" noChangeArrowheads="1"/>
-          </p:cNvPicPr>
-          <p:nvPr/>
-        </p:nvPicPr>
-        <p:blipFill>
-          <a:blip r:embed="rId3" cstate="print"/>
-          <a:srcRect/>
-          <a:stretch>
-            <a:fillRect/>
-          </a:stretch>
-        </p:blipFill>
-        <p:spPr bwMode="auto">
-          <a:xfrm>
-            <a:off x="1538688" y="1163788"/>
-            <a:ext cx="6094023" cy="5015850"/>
-          </a:xfrm>
-          <a:prstGeom prst="rect">
-            <a:avLst/>
-          </a:prstGeom>
-          <a:noFill/>
-          <a:ln w="9525">
-            <a:noFill/>
-            <a:round/>
-            <a:headEnd/>
-            <a:tailEnd/>
-          </a:ln>
-        </p:spPr>
-      </p:pic>
-      <p:sp>
-        <p:nvSpPr>
-          <p:cNvPr id="5" name="TextBox 4"/>
-          <p:cNvSpPr txBox="1"/>
-          <p:nvPr/>
-        </p:nvSpPr>
-        <p:spPr>
-          <a:xfrm>
-            <a:off x="5181385" y="6439857"/>
-            <a:ext cx="3783270" cy="307777"/>
-          </a:xfrm>
-          <a:prstGeom prst="rect">
-            <a:avLst/>
-          </a:prstGeom>
-          <a:noFill/>
-        </p:spPr>
-        <p:txBody>
-          <a:bodyPr wrap="none" rtlCol="0">
-            <a:spAutoFit/>
+      <p:sp>
+        <p:nvSpPr>
+          <p:cNvPr id="3" name="Content Placeholder 2"/>
+          <p:cNvSpPr>
+            <a:spLocks noGrp="1"/>
+          </p:cNvSpPr>
+          <p:nvPr>
+            <p:ph idx="1"/>
+          </p:nvPr>
+        </p:nvSpPr>
+        <p:spPr/>
+        <p:txBody>
+          <a:bodyPr>
+            <a:normAutofit fontScale="85000" lnSpcReduction="10000"/>
           </a:bodyPr>
           <a:lstStyle/>
           <a:p>
             <a:r>
-              <a:rPr lang="en-US" sz="1400" i="1" dirty="0" smtClean="0"/>
-              <a:t>Caro-Quintero and </a:t>
-            </a:r>
-            <a:r>
-              <a:rPr lang="en-US" sz="1400" i="1" dirty="0" err="1" smtClean="0"/>
-              <a:t>Konstantinidis</a:t>
-            </a:r>
-            <a:r>
-              <a:rPr lang="en-US" sz="1400" i="1" dirty="0" smtClean="0"/>
-              <a:t> 2012 </a:t>
-            </a:r>
-            <a:r>
-              <a:rPr lang="en-US" sz="1400" i="1" dirty="0" err="1" smtClean="0"/>
-              <a:t>EnvMicro</a:t>
-            </a:r>
-            <a:endParaRPr lang="en-US" sz="1400" i="1" dirty="0"/>
+              <a:rPr lang="en-US" dirty="0" smtClean="0"/>
+              <a:t>Are there related sequence-discrete populations in TB and CB? </a:t>
+            </a:r>
+          </a:p>
+          <a:p>
+            <a:r>
+              <a:rPr lang="en-US" dirty="0" smtClean="0"/>
+              <a:t>How similar are they based on ANI?</a:t>
+            </a:r>
+          </a:p>
+          <a:p>
+            <a:pPr lvl="1"/>
+            <a:r>
+              <a:rPr lang="en-US" dirty="0" smtClean="0"/>
+              <a:t>ANI for reference MAGs to each other</a:t>
+            </a:r>
+          </a:p>
+          <a:p>
+            <a:pPr lvl="1"/>
+            <a:r>
+              <a:rPr lang="en-US" dirty="0" smtClean="0"/>
+              <a:t>ANI when mapping reads from same </a:t>
+            </a:r>
+            <a:r>
+              <a:rPr lang="en-US" dirty="0" err="1" smtClean="0"/>
+              <a:t>vs</a:t>
+            </a:r>
+            <a:r>
+              <a:rPr lang="en-US" dirty="0" smtClean="0"/>
+              <a:t> different lake</a:t>
+            </a:r>
+          </a:p>
+          <a:p>
+            <a:r>
+              <a:rPr lang="en-US" dirty="0" smtClean="0"/>
+              <a:t>For populations that are very similar between the two lakes:</a:t>
+            </a:r>
+          </a:p>
+          <a:p>
+            <a:pPr lvl="1"/>
+            <a:r>
+              <a:rPr lang="en-US" dirty="0"/>
+              <a:t>A</a:t>
+            </a:r>
+            <a:r>
+              <a:rPr lang="en-US" dirty="0" smtClean="0"/>
+              <a:t>re there genes present in one lake but not the other?</a:t>
+            </a:r>
+          </a:p>
+          <a:p>
+            <a:pPr lvl="1"/>
+            <a:r>
+              <a:rPr lang="en-US" dirty="0" smtClean="0"/>
+              <a:t>Is there evidence for (ecological or physical) barrier to recombination?</a:t>
+            </a:r>
+          </a:p>
+          <a:p>
+            <a:r>
+              <a:rPr lang="en-US" dirty="0" smtClean="0"/>
+              <a:t>Might also be able to compare MAGs from Mary Lake </a:t>
+            </a:r>
+            <a:endParaRPr lang="en-US" dirty="0"/>
           </a:p>
         </p:txBody>
       </p:sp>
     </p:spTree>
     <p:extLst>
       <p:ext uri="{BB962C8B-B14F-4D97-AF65-F5344CB8AC3E}">
-        <p14:creationId xmlns:p14="http://schemas.microsoft.com/office/powerpoint/2010/main" val="1763483010"/>
+        <p14:creationId xmlns:p14="http://schemas.microsoft.com/office/powerpoint/2010/main" val="3843862250"/>
       </p:ext>
     </p:extLst>
   </p:cSld>
@@ -6994,6 +6930,400 @@
     </p:spTree>
     <p:extLst>
       <p:ext uri="{BB962C8B-B14F-4D97-AF65-F5344CB8AC3E}">
+        <p14:creationId xmlns:p14="http://schemas.microsoft.com/office/powerpoint/2010/main" val="1499778607"/>
+      </p:ext>
+    </p:extLst>
+  </p:cSld>
+  <p:clrMapOvr>
+    <a:masterClrMapping/>
+  </p:clrMapOvr>
+  <mc:AlternateContent xmlns:mc="http://schemas.openxmlformats.org/markup-compatibility/2006">
+    <mc:Choice xmlns:p14="http://schemas.microsoft.com/office/powerpoint/2010/main" Requires="p14">
+      <p:transition spd="slow" p14:dur="2000"/>
+    </mc:Choice>
+    <mc:Fallback>
+      <p:transition spd="slow"/>
+    </mc:Fallback>
+  </mc:AlternateContent>
+  <p:timing>
+    <p:tnLst>
+      <p:par>
+        <p:cTn id="1" dur="indefinite" restart="never" nodeType="tmRoot"/>
+      </p:par>
+    </p:tnLst>
+  </p:timing>
+</p:sld>
+</file>
+
+<file path=ppt/slides/slide16.xml><?xml version="1.0" encoding="utf-8"?>
+<p:sld xmlns:a="http://schemas.openxmlformats.org/drawingml/2006/main" xmlns:r="http://schemas.openxmlformats.org/officeDocument/2006/relationships" xmlns:p="http://schemas.openxmlformats.org/presentationml/2006/main" show="0">
+  <p:cSld>
+    <p:spTree>
+      <p:nvGrpSpPr>
+        <p:cNvPr id="1" name=""/>
+        <p:cNvGrpSpPr/>
+        <p:nvPr/>
+      </p:nvGrpSpPr>
+      <p:grpSpPr>
+        <a:xfrm>
+          <a:off x="0" y="0"/>
+          <a:ext cx="0" cy="0"/>
+          <a:chOff x="0" y="0"/>
+          <a:chExt cx="0" cy="0"/>
+        </a:xfrm>
+      </p:grpSpPr>
+      <p:sp>
+        <p:nvSpPr>
+          <p:cNvPr id="2" name="Title 1"/>
+          <p:cNvSpPr>
+            <a:spLocks noGrp="1"/>
+          </p:cNvSpPr>
+          <p:nvPr>
+            <p:ph type="title"/>
+          </p:nvPr>
+        </p:nvSpPr>
+        <p:spPr>
+          <a:xfrm>
+            <a:off x="457200" y="274638"/>
+            <a:ext cx="8229600" cy="833600"/>
+          </a:xfrm>
+        </p:spPr>
+        <p:txBody>
+          <a:bodyPr/>
+          <a:lstStyle/>
+          <a:p>
+            <a:r>
+              <a:rPr lang="en-US" dirty="0" smtClean="0"/>
+              <a:t>Sequence discrete populations</a:t>
+            </a:r>
+            <a:endParaRPr lang="en-US" dirty="0"/>
+          </a:p>
+        </p:txBody>
+      </p:sp>
+      <p:pic>
+        <p:nvPicPr>
+          <p:cNvPr id="4" name="Picture 2"/>
+          <p:cNvPicPr>
+            <a:picLocks noChangeAspect="1" noChangeArrowheads="1"/>
+          </p:cNvPicPr>
+          <p:nvPr/>
+        </p:nvPicPr>
+        <p:blipFill>
+          <a:blip r:embed="rId3" cstate="print"/>
+          <a:srcRect/>
+          <a:stretch>
+            <a:fillRect/>
+          </a:stretch>
+        </p:blipFill>
+        <p:spPr bwMode="auto">
+          <a:xfrm>
+            <a:off x="1538688" y="1163788"/>
+            <a:ext cx="6094023" cy="5015850"/>
+          </a:xfrm>
+          <a:prstGeom prst="rect">
+            <a:avLst/>
+          </a:prstGeom>
+          <a:noFill/>
+          <a:ln w="9525">
+            <a:noFill/>
+            <a:round/>
+            <a:headEnd/>
+            <a:tailEnd/>
+          </a:ln>
+        </p:spPr>
+      </p:pic>
+      <p:sp>
+        <p:nvSpPr>
+          <p:cNvPr id="5" name="TextBox 4"/>
+          <p:cNvSpPr txBox="1"/>
+          <p:nvPr/>
+        </p:nvSpPr>
+        <p:spPr>
+          <a:xfrm>
+            <a:off x="5181385" y="6439857"/>
+            <a:ext cx="3783270" cy="307777"/>
+          </a:xfrm>
+          <a:prstGeom prst="rect">
+            <a:avLst/>
+          </a:prstGeom>
+          <a:noFill/>
+        </p:spPr>
+        <p:txBody>
+          <a:bodyPr wrap="none" rtlCol="0">
+            <a:spAutoFit/>
+          </a:bodyPr>
+          <a:lstStyle/>
+          <a:p>
+            <a:r>
+              <a:rPr lang="en-US" sz="1400" i="1" dirty="0" smtClean="0"/>
+              <a:t>Caro-Quintero and </a:t>
+            </a:r>
+            <a:r>
+              <a:rPr lang="en-US" sz="1400" i="1" dirty="0" err="1" smtClean="0"/>
+              <a:t>Konstantinidis</a:t>
+            </a:r>
+            <a:r>
+              <a:rPr lang="en-US" sz="1400" i="1" dirty="0" smtClean="0"/>
+              <a:t> 2012 </a:t>
+            </a:r>
+            <a:r>
+              <a:rPr lang="en-US" sz="1400" i="1" dirty="0" err="1" smtClean="0"/>
+              <a:t>EnvMicro</a:t>
+            </a:r>
+            <a:endParaRPr lang="en-US" sz="1400" i="1" dirty="0"/>
+          </a:p>
+        </p:txBody>
+      </p:sp>
+    </p:spTree>
+    <p:extLst>
+      <p:ext uri="{BB962C8B-B14F-4D97-AF65-F5344CB8AC3E}">
+        <p14:creationId xmlns:p14="http://schemas.microsoft.com/office/powerpoint/2010/main" val="1763483010"/>
+      </p:ext>
+    </p:extLst>
+  </p:cSld>
+  <p:clrMapOvr>
+    <a:masterClrMapping/>
+  </p:clrMapOvr>
+  <mc:AlternateContent xmlns:mc="http://schemas.openxmlformats.org/markup-compatibility/2006">
+    <mc:Choice xmlns:p14="http://schemas.microsoft.com/office/powerpoint/2010/main" Requires="p14">
+      <p:transition spd="slow" p14:dur="2000"/>
+    </mc:Choice>
+    <mc:Fallback>
+      <p:transition spd="slow"/>
+    </mc:Fallback>
+  </mc:AlternateContent>
+  <p:timing>
+    <p:tnLst>
+      <p:par>
+        <p:cTn id="1" dur="indefinite" restart="never" nodeType="tmRoot"/>
+      </p:par>
+    </p:tnLst>
+  </p:timing>
+</p:sld>
+</file>
+
+<file path=ppt/slides/slide17.xml><?xml version="1.0" encoding="utf-8"?>
+<p:sld xmlns:a="http://schemas.openxmlformats.org/drawingml/2006/main" xmlns:r="http://schemas.openxmlformats.org/officeDocument/2006/relationships" xmlns:p="http://schemas.openxmlformats.org/presentationml/2006/main" show="0">
+  <p:cSld>
+    <p:spTree>
+      <p:nvGrpSpPr>
+        <p:cNvPr id="1" name=""/>
+        <p:cNvGrpSpPr/>
+        <p:nvPr/>
+      </p:nvGrpSpPr>
+      <p:grpSpPr>
+        <a:xfrm>
+          <a:off x="0" y="0"/>
+          <a:ext cx="0" cy="0"/>
+          <a:chOff x="0" y="0"/>
+          <a:chExt cx="0" cy="0"/>
+        </a:xfrm>
+      </p:grpSpPr>
+      <p:pic>
+        <p:nvPicPr>
+          <p:cNvPr id="4" name="Picture 3" descr="PTXSvB1_L06only.png"/>
+          <p:cNvPicPr>
+            <a:picLocks noChangeAspect="1"/>
+          </p:cNvPicPr>
+          <p:nvPr/>
+        </p:nvPicPr>
+        <p:blipFill>
+          <a:blip r:embed="rId2">
+            <a:extLst>
+              <a:ext uri="{28A0092B-C50C-407E-A947-70E740481C1C}">
+                <a14:useLocalDpi xmlns:a14="http://schemas.microsoft.com/office/drawing/2010/main" val="0"/>
+              </a:ext>
+            </a:extLst>
+          </a:blip>
+          <a:stretch>
+            <a:fillRect/>
+          </a:stretch>
+        </p:blipFill>
+        <p:spPr>
+          <a:xfrm>
+            <a:off x="1211149" y="1319006"/>
+            <a:ext cx="6721702" cy="5120640"/>
+          </a:xfrm>
+          <a:prstGeom prst="rect">
+            <a:avLst/>
+          </a:prstGeom>
+        </p:spPr>
+      </p:pic>
+      <p:sp>
+        <p:nvSpPr>
+          <p:cNvPr id="5" name="TextBox 4"/>
+          <p:cNvSpPr txBox="1"/>
+          <p:nvPr/>
+        </p:nvSpPr>
+        <p:spPr>
+          <a:xfrm>
+            <a:off x="5555570" y="6488668"/>
+            <a:ext cx="3588430" cy="369332"/>
+          </a:xfrm>
+          <a:prstGeom prst="rect">
+            <a:avLst/>
+          </a:prstGeom>
+          <a:noFill/>
+        </p:spPr>
+        <p:txBody>
+          <a:bodyPr wrap="none" rtlCol="0">
+            <a:spAutoFit/>
+          </a:bodyPr>
+          <a:lstStyle/>
+          <a:p>
+            <a:r>
+              <a:rPr lang="en-US" dirty="0" smtClean="0"/>
+              <a:t>Mendota </a:t>
+            </a:r>
+            <a:r>
+              <a:rPr lang="en-US" dirty="0" err="1" smtClean="0"/>
+              <a:t>metagenome</a:t>
+            </a:r>
+            <a:r>
+              <a:rPr lang="en-US" dirty="0" smtClean="0"/>
+              <a:t>: 9 June 2009 </a:t>
+            </a:r>
+            <a:endParaRPr lang="en-US" dirty="0"/>
+          </a:p>
+        </p:txBody>
+      </p:sp>
+      <p:sp>
+        <p:nvSpPr>
+          <p:cNvPr id="6" name="TextBox 5"/>
+          <p:cNvSpPr txBox="1"/>
+          <p:nvPr/>
+        </p:nvSpPr>
+        <p:spPr>
+          <a:xfrm>
+            <a:off x="4783343" y="1664682"/>
+            <a:ext cx="3205099" cy="369332"/>
+          </a:xfrm>
+          <a:prstGeom prst="rect">
+            <a:avLst/>
+          </a:prstGeom>
+          <a:noFill/>
+        </p:spPr>
+        <p:txBody>
+          <a:bodyPr wrap="none" rtlCol="0">
+            <a:spAutoFit/>
+          </a:bodyPr>
+          <a:lstStyle/>
+          <a:p>
+            <a:r>
+              <a:rPr lang="en-US" dirty="0" smtClean="0"/>
+              <a:t>Subject: acI-B1 from L. Mendota</a:t>
+            </a:r>
+            <a:endParaRPr lang="en-US" dirty="0"/>
+          </a:p>
+        </p:txBody>
+      </p:sp>
+      <p:sp>
+        <p:nvSpPr>
+          <p:cNvPr id="8" name="Left Brace 7"/>
+          <p:cNvSpPr/>
+          <p:nvPr/>
+        </p:nvSpPr>
+        <p:spPr>
+          <a:xfrm rot="5400000">
+            <a:off x="5356347" y="4395594"/>
+            <a:ext cx="398445" cy="747127"/>
+          </a:xfrm>
+          <a:prstGeom prst="leftBrace">
+            <a:avLst/>
+          </a:prstGeom>
+          <a:ln>
+            <a:solidFill>
+              <a:schemeClr val="tx1"/>
+            </a:solidFill>
+          </a:ln>
+          <a:effectLst/>
+        </p:spPr>
+        <p:style>
+          <a:lnRef idx="2">
+            <a:schemeClr val="accent1"/>
+          </a:lnRef>
+          <a:fillRef idx="0">
+            <a:schemeClr val="accent1"/>
+          </a:fillRef>
+          <a:effectRef idx="1">
+            <a:schemeClr val="accent1"/>
+          </a:effectRef>
+          <a:fontRef idx="minor">
+            <a:schemeClr val="tx1"/>
+          </a:fontRef>
+        </p:style>
+        <p:txBody>
+          <a:bodyPr rtlCol="0" anchor="ctr"/>
+          <a:lstStyle/>
+          <a:p>
+            <a:pPr algn="ctr"/>
+            <a:endParaRPr lang="en-US"/>
+          </a:p>
+        </p:txBody>
+      </p:sp>
+      <p:sp>
+        <p:nvSpPr>
+          <p:cNvPr id="9" name="TextBox 8"/>
+          <p:cNvSpPr txBox="1"/>
+          <p:nvPr/>
+        </p:nvSpPr>
+        <p:spPr>
+          <a:xfrm>
+            <a:off x="4857696" y="4084292"/>
+            <a:ext cx="1395747" cy="369332"/>
+          </a:xfrm>
+          <a:prstGeom prst="rect">
+            <a:avLst/>
+          </a:prstGeom>
+          <a:noFill/>
+        </p:spPr>
+        <p:txBody>
+          <a:bodyPr wrap="none" rtlCol="0">
+            <a:spAutoFit/>
+          </a:bodyPr>
+          <a:lstStyle/>
+          <a:p>
+            <a:r>
+              <a:rPr lang="en-US" dirty="0" smtClean="0"/>
+              <a:t>discontinuity</a:t>
+            </a:r>
+            <a:endParaRPr lang="en-US" dirty="0"/>
+          </a:p>
+        </p:txBody>
+      </p:sp>
+      <p:sp>
+        <p:nvSpPr>
+          <p:cNvPr id="2" name="Title 1"/>
+          <p:cNvSpPr>
+            <a:spLocks noGrp="1"/>
+          </p:cNvSpPr>
+          <p:nvPr>
+            <p:ph type="title"/>
+          </p:nvPr>
+        </p:nvSpPr>
+        <p:spPr>
+          <a:xfrm>
+            <a:off x="457200" y="161877"/>
+            <a:ext cx="8229600" cy="1255761"/>
+          </a:xfrm>
+        </p:spPr>
+        <p:txBody>
+          <a:bodyPr>
+            <a:normAutofit fontScale="90000"/>
+          </a:bodyPr>
+          <a:lstStyle/>
+          <a:p>
+            <a:r>
+              <a:rPr lang="en-US" dirty="0" smtClean="0"/>
+              <a:t>SAGs allow us to capture sequence discrete populations</a:t>
+            </a:r>
+            <a:endParaRPr lang="en-US" dirty="0"/>
+          </a:p>
+        </p:txBody>
+      </p:sp>
+    </p:spTree>
+    <p:extLst>
+      <p:ext uri="{BB962C8B-B14F-4D97-AF65-F5344CB8AC3E}">
         <p14:creationId xmlns:p14="http://schemas.microsoft.com/office/powerpoint/2010/main" val="1210006352"/>
       </p:ext>
     </p:extLst>
@@ -7046,6 +7376,248 @@
             <p:ph type="title"/>
           </p:nvPr>
         </p:nvSpPr>
+        <p:spPr/>
+        <p:txBody>
+          <a:bodyPr/>
+          <a:lstStyle/>
+          <a:p>
+            <a:r>
+              <a:rPr lang="en-US" dirty="0" smtClean="0"/>
+              <a:t>Agenda</a:t>
+            </a:r>
+            <a:endParaRPr lang="en-US" dirty="0"/>
+          </a:p>
+        </p:txBody>
+      </p:sp>
+      <p:sp>
+        <p:nvSpPr>
+          <p:cNvPr id="3" name="Content Placeholder 2"/>
+          <p:cNvSpPr>
+            <a:spLocks noGrp="1"/>
+          </p:cNvSpPr>
+          <p:nvPr>
+            <p:ph idx="1"/>
+          </p:nvPr>
+        </p:nvSpPr>
+        <p:spPr/>
+        <p:txBody>
+          <a:bodyPr>
+            <a:normAutofit/>
+          </a:bodyPr>
+          <a:lstStyle/>
+          <a:p>
+            <a:r>
+              <a:rPr lang="en-US" sz="4400" dirty="0" smtClean="0"/>
+              <a:t>Updates</a:t>
+            </a:r>
+          </a:p>
+          <a:p>
+            <a:r>
+              <a:rPr lang="en-US" sz="4400" dirty="0" smtClean="0"/>
+              <a:t>Short Intro</a:t>
+            </a:r>
+          </a:p>
+          <a:p>
+            <a:r>
+              <a:rPr lang="en-US" sz="4400" dirty="0" smtClean="0"/>
+              <a:t>Current Project</a:t>
+            </a:r>
+          </a:p>
+          <a:p>
+            <a:r>
+              <a:rPr lang="en-US" sz="4400" dirty="0" smtClean="0"/>
+              <a:t>Goals/Timeline</a:t>
+            </a:r>
+            <a:endParaRPr lang="en-US" sz="4400" dirty="0"/>
+          </a:p>
+        </p:txBody>
+      </p:sp>
+    </p:spTree>
+    <p:extLst>
+      <p:ext uri="{BB962C8B-B14F-4D97-AF65-F5344CB8AC3E}">
+        <p14:creationId xmlns:p14="http://schemas.microsoft.com/office/powerpoint/2010/main" val="1864072568"/>
+      </p:ext>
+    </p:extLst>
+  </p:cSld>
+  <p:clrMapOvr>
+    <a:masterClrMapping/>
+  </p:clrMapOvr>
+</p:sld>
+</file>
+
+<file path=ppt/slides/slide3.xml><?xml version="1.0" encoding="utf-8"?>
+<p:sld xmlns:a="http://schemas.openxmlformats.org/drawingml/2006/main" xmlns:r="http://schemas.openxmlformats.org/officeDocument/2006/relationships" xmlns:p="http://schemas.openxmlformats.org/presentationml/2006/main">
+  <p:cSld>
+    <p:spTree>
+      <p:nvGrpSpPr>
+        <p:cNvPr id="1" name=""/>
+        <p:cNvGrpSpPr/>
+        <p:nvPr/>
+      </p:nvGrpSpPr>
+      <p:grpSpPr>
+        <a:xfrm>
+          <a:off x="0" y="0"/>
+          <a:ext cx="0" cy="0"/>
+          <a:chOff x="0" y="0"/>
+          <a:chExt cx="0" cy="0"/>
+        </a:xfrm>
+      </p:grpSpPr>
+      <p:sp>
+        <p:nvSpPr>
+          <p:cNvPr id="2" name="Title 1"/>
+          <p:cNvSpPr>
+            <a:spLocks noGrp="1"/>
+          </p:cNvSpPr>
+          <p:nvPr>
+            <p:ph type="title"/>
+          </p:nvPr>
+        </p:nvSpPr>
+        <p:spPr/>
+        <p:txBody>
+          <a:bodyPr/>
+          <a:lstStyle/>
+          <a:p>
+            <a:r>
+              <a:rPr lang="en-US" dirty="0" smtClean="0"/>
+              <a:t>Updates</a:t>
+            </a:r>
+            <a:endParaRPr lang="en-US" dirty="0"/>
+          </a:p>
+        </p:txBody>
+      </p:sp>
+      <p:sp>
+        <p:nvSpPr>
+          <p:cNvPr id="3" name="Content Placeholder 2"/>
+          <p:cNvSpPr>
+            <a:spLocks noGrp="1"/>
+          </p:cNvSpPr>
+          <p:nvPr>
+            <p:ph idx="1"/>
+          </p:nvPr>
+        </p:nvSpPr>
+        <p:spPr/>
+        <p:txBody>
+          <a:bodyPr>
+            <a:normAutofit fontScale="92500" lnSpcReduction="10000"/>
+          </a:bodyPr>
+          <a:lstStyle/>
+          <a:p>
+            <a:r>
+              <a:rPr lang="en-US" dirty="0" smtClean="0"/>
+              <a:t>2nd Paper accepted in ISME</a:t>
+            </a:r>
+          </a:p>
+          <a:p>
+            <a:pPr lvl="1"/>
+            <a:r>
+              <a:rPr lang="en-US" dirty="0"/>
+              <a:t>Contrasting patterns of genome-level diversity across distinct co-occurring </a:t>
+            </a:r>
+            <a:r>
+              <a:rPr lang="en-US" dirty="0" smtClean="0"/>
+              <a:t>populations</a:t>
+            </a:r>
+            <a:endParaRPr lang="en-US" dirty="0"/>
+          </a:p>
+          <a:p>
+            <a:r>
+              <a:rPr lang="en-US" dirty="0" smtClean="0"/>
+              <a:t>Taught 4 Data/Software Carpentry Workshops</a:t>
+            </a:r>
+          </a:p>
+          <a:p>
+            <a:r>
+              <a:rPr lang="en-US" dirty="0" smtClean="0"/>
+              <a:t>Attended </a:t>
+            </a:r>
+            <a:r>
+              <a:rPr lang="en-US" dirty="0" err="1" smtClean="0"/>
+              <a:t>Anvi’o</a:t>
+            </a:r>
+            <a:r>
+              <a:rPr lang="en-US" dirty="0" smtClean="0"/>
+              <a:t> Workshop</a:t>
+            </a:r>
+          </a:p>
+          <a:p>
+            <a:r>
+              <a:rPr lang="en-US" dirty="0" smtClean="0"/>
+              <a:t>Taught </a:t>
+            </a:r>
+            <a:r>
+              <a:rPr lang="en-US" dirty="0" err="1" smtClean="0"/>
+              <a:t>Anvi’o</a:t>
+            </a:r>
+            <a:r>
+              <a:rPr lang="en-US" dirty="0" smtClean="0"/>
+              <a:t> Workshop</a:t>
+            </a:r>
+          </a:p>
+          <a:p>
+            <a:r>
+              <a:rPr lang="en-US" dirty="0" smtClean="0"/>
+              <a:t>Attended Open Science Grid User School</a:t>
+            </a:r>
+          </a:p>
+          <a:p>
+            <a:r>
+              <a:rPr lang="en-US" dirty="0" smtClean="0"/>
+              <a:t>Attended Microbial Population Biology GRC</a:t>
+            </a:r>
+          </a:p>
+          <a:p>
+            <a:r>
+              <a:rPr lang="en-US" dirty="0" smtClean="0"/>
+              <a:t>‘Retired’ from leading </a:t>
+            </a:r>
+            <a:r>
+              <a:rPr lang="en-US" dirty="0" err="1" smtClean="0"/>
+              <a:t>ComBEE</a:t>
+            </a:r>
+            <a:endParaRPr lang="en-US" dirty="0"/>
+          </a:p>
+        </p:txBody>
+      </p:sp>
+    </p:spTree>
+    <p:extLst>
+      <p:ext uri="{BB962C8B-B14F-4D97-AF65-F5344CB8AC3E}">
+        <p14:creationId xmlns:p14="http://schemas.microsoft.com/office/powerpoint/2010/main" val="1184281434"/>
+      </p:ext>
+    </p:extLst>
+  </p:cSld>
+  <p:clrMapOvr>
+    <a:masterClrMapping/>
+  </p:clrMapOvr>
+</p:sld>
+</file>
+
+<file path=ppt/slides/slide4.xml><?xml version="1.0" encoding="utf-8"?>
+<p:sld xmlns:a="http://schemas.openxmlformats.org/drawingml/2006/main" xmlns:r="http://schemas.openxmlformats.org/officeDocument/2006/relationships" xmlns:p="http://schemas.openxmlformats.org/presentationml/2006/main">
+  <p:cSld>
+    <p:spTree>
+      <p:nvGrpSpPr>
+        <p:cNvPr id="1" name=""/>
+        <p:cNvGrpSpPr/>
+        <p:nvPr/>
+      </p:nvGrpSpPr>
+      <p:grpSpPr>
+        <a:xfrm>
+          <a:off x="0" y="0"/>
+          <a:ext cx="0" cy="0"/>
+          <a:chOff x="0" y="0"/>
+          <a:chExt cx="0" cy="0"/>
+        </a:xfrm>
+      </p:grpSpPr>
+      <p:sp>
+        <p:nvSpPr>
+          <p:cNvPr id="2" name="Title 1"/>
+          <p:cNvSpPr>
+            <a:spLocks noGrp="1"/>
+          </p:cNvSpPr>
+          <p:nvPr>
+            <p:ph type="title"/>
+          </p:nvPr>
+        </p:nvSpPr>
         <p:spPr>
           <a:xfrm>
             <a:off x="457200" y="147633"/>
@@ -7183,7 +7755,7 @@
 </p:sld>
 </file>
 
-<file path=ppt/slides/slide3.xml><?xml version="1.0" encoding="utf-8"?>
+<file path=ppt/slides/slide5.xml><?xml version="1.0" encoding="utf-8"?>
 <p:sld xmlns:a="http://schemas.openxmlformats.org/drawingml/2006/main" xmlns:r="http://schemas.openxmlformats.org/officeDocument/2006/relationships" xmlns:p="http://schemas.openxmlformats.org/presentationml/2006/main">
   <p:cSld>
     <p:spTree>
@@ -7398,7 +7970,7 @@
 </p:sld>
 </file>
 
-<file path=ppt/slides/slide4.xml><?xml version="1.0" encoding="utf-8"?>
+<file path=ppt/slides/slide6.xml><?xml version="1.0" encoding="utf-8"?>
 <p:sld xmlns:a="http://schemas.openxmlformats.org/drawingml/2006/main" xmlns:r="http://schemas.openxmlformats.org/officeDocument/2006/relationships" xmlns:p="http://schemas.openxmlformats.org/presentationml/2006/main">
   <p:cSld>
     <p:spTree>
@@ -7484,354 +8056,6 @@
 </p:sld>
 </file>
 
-<file path=ppt/slides/slide5.xml><?xml version="1.0" encoding="utf-8"?>
-<p:sld xmlns:a="http://schemas.openxmlformats.org/drawingml/2006/main" xmlns:r="http://schemas.openxmlformats.org/officeDocument/2006/relationships" xmlns:p="http://schemas.openxmlformats.org/presentationml/2006/main">
-  <p:cSld>
-    <p:spTree>
-      <p:nvGrpSpPr>
-        <p:cNvPr id="1" name=""/>
-        <p:cNvGrpSpPr/>
-        <p:nvPr/>
-      </p:nvGrpSpPr>
-      <p:grpSpPr>
-        <a:xfrm>
-          <a:off x="0" y="0"/>
-          <a:ext cx="0" cy="0"/>
-          <a:chOff x="0" y="0"/>
-          <a:chExt cx="0" cy="0"/>
-        </a:xfrm>
-      </p:grpSpPr>
-      <p:sp>
-        <p:nvSpPr>
-          <p:cNvPr id="3" name="Title 2"/>
-          <p:cNvSpPr>
-            <a:spLocks noGrp="1"/>
-          </p:cNvSpPr>
-          <p:nvPr>
-            <p:ph type="ctrTitle"/>
-          </p:nvPr>
-        </p:nvSpPr>
-        <p:spPr/>
-        <p:txBody>
-          <a:bodyPr/>
-          <a:lstStyle/>
-          <a:p>
-            <a:r>
-              <a:rPr lang="en-US" dirty="0" smtClean="0"/>
-              <a:t>Current Project</a:t>
-            </a:r>
-            <a:endParaRPr lang="en-US" dirty="0"/>
-          </a:p>
-        </p:txBody>
-      </p:sp>
-      <p:sp>
-        <p:nvSpPr>
-          <p:cNvPr id="4" name="Subtitle 3"/>
-          <p:cNvSpPr>
-            <a:spLocks noGrp="1"/>
-          </p:cNvSpPr>
-          <p:nvPr>
-            <p:ph type="subTitle" idx="1"/>
-          </p:nvPr>
-        </p:nvSpPr>
-        <p:spPr/>
-        <p:txBody>
-          <a:bodyPr/>
-          <a:lstStyle/>
-          <a:p>
-            <a:endParaRPr lang="en-US"/>
-          </a:p>
-        </p:txBody>
-      </p:sp>
-    </p:spTree>
-    <p:extLst>
-      <p:ext uri="{BB962C8B-B14F-4D97-AF65-F5344CB8AC3E}">
-        <p14:creationId xmlns:p14="http://schemas.microsoft.com/office/powerpoint/2010/main" val="2024700940"/>
-      </p:ext>
-    </p:extLst>
-  </p:cSld>
-  <p:clrMapOvr>
-    <a:masterClrMapping/>
-  </p:clrMapOvr>
-</p:sld>
-</file>
-
-<file path=ppt/slides/slide6.xml><?xml version="1.0" encoding="utf-8"?>
-<p:sld xmlns:a="http://schemas.openxmlformats.org/drawingml/2006/main" xmlns:r="http://schemas.openxmlformats.org/officeDocument/2006/relationships" xmlns:p="http://schemas.openxmlformats.org/presentationml/2006/main">
-  <p:cSld>
-    <p:spTree>
-      <p:nvGrpSpPr>
-        <p:cNvPr id="1" name=""/>
-        <p:cNvGrpSpPr/>
-        <p:nvPr/>
-      </p:nvGrpSpPr>
-      <p:grpSpPr>
-        <a:xfrm>
-          <a:off x="0" y="0"/>
-          <a:ext cx="0" cy="0"/>
-          <a:chOff x="0" y="0"/>
-          <a:chExt cx="0" cy="0"/>
-        </a:xfrm>
-      </p:grpSpPr>
-      <p:sp>
-        <p:nvSpPr>
-          <p:cNvPr id="2" name="Title 1"/>
-          <p:cNvSpPr>
-            <a:spLocks noGrp="1"/>
-          </p:cNvSpPr>
-          <p:nvPr>
-            <p:ph type="title"/>
-          </p:nvPr>
-        </p:nvSpPr>
-        <p:spPr/>
-        <p:txBody>
-          <a:bodyPr/>
-          <a:lstStyle/>
-          <a:p>
-            <a:r>
-              <a:rPr lang="en-US" dirty="0" smtClean="0"/>
-              <a:t>Stats on Metagenomes</a:t>
-            </a:r>
-            <a:endParaRPr lang="en-US" dirty="0"/>
-          </a:p>
-        </p:txBody>
-      </p:sp>
-      <p:sp>
-        <p:nvSpPr>
-          <p:cNvPr id="3" name="Content Placeholder 2"/>
-          <p:cNvSpPr>
-            <a:spLocks noGrp="1"/>
-          </p:cNvSpPr>
-          <p:nvPr>
-            <p:ph sz="half" idx="1"/>
-          </p:nvPr>
-        </p:nvSpPr>
-        <p:spPr/>
-        <p:txBody>
-          <a:bodyPr>
-            <a:normAutofit fontScale="92500" lnSpcReduction="10000"/>
-          </a:bodyPr>
-          <a:lstStyle/>
-          <a:p>
-            <a:r>
-              <a:rPr lang="en-US" dirty="0" smtClean="0"/>
-              <a:t>Crystal </a:t>
-            </a:r>
-            <a:r>
-              <a:rPr lang="en-US" dirty="0" smtClean="0"/>
-              <a:t>Bog </a:t>
-            </a:r>
-          </a:p>
-          <a:p>
-            <a:pPr lvl="1"/>
-            <a:r>
-              <a:rPr lang="en-US" dirty="0" smtClean="0"/>
-              <a:t>2007-2009</a:t>
-            </a:r>
-          </a:p>
-          <a:p>
-            <a:pPr lvl="1"/>
-            <a:r>
-              <a:rPr lang="en-US" dirty="0" smtClean="0"/>
-              <a:t>82 metagenomes</a:t>
-            </a:r>
-          </a:p>
-          <a:p>
-            <a:pPr lvl="1"/>
-            <a:r>
-              <a:rPr lang="en-US" dirty="0" smtClean="0"/>
-              <a:t>20 </a:t>
-            </a:r>
-            <a:r>
-              <a:rPr lang="en-US" dirty="0" err="1" smtClean="0"/>
-              <a:t>Gbp</a:t>
-            </a:r>
-            <a:r>
-              <a:rPr lang="en-US" dirty="0" smtClean="0"/>
-              <a:t> assembled</a:t>
-            </a:r>
-            <a:endParaRPr lang="en-US" dirty="0" smtClean="0"/>
-          </a:p>
-          <a:p>
-            <a:r>
-              <a:rPr lang="en-US" dirty="0" smtClean="0"/>
-              <a:t>Mary </a:t>
-            </a:r>
-            <a:r>
-              <a:rPr lang="en-US" dirty="0" smtClean="0"/>
-              <a:t>Lake </a:t>
-            </a:r>
-          </a:p>
-          <a:p>
-            <a:pPr lvl="1"/>
-            <a:r>
-              <a:rPr lang="en-US" dirty="0" smtClean="0"/>
-              <a:t>2009, 12 depths</a:t>
-            </a:r>
-          </a:p>
-          <a:p>
-            <a:pPr lvl="1"/>
-            <a:r>
-              <a:rPr lang="en-US" dirty="0" smtClean="0"/>
-              <a:t>12 metagenomes</a:t>
-            </a:r>
-          </a:p>
-          <a:p>
-            <a:pPr lvl="1"/>
-            <a:r>
-              <a:rPr lang="en-US" dirty="0" smtClean="0"/>
-              <a:t>11 </a:t>
-            </a:r>
-            <a:r>
-              <a:rPr lang="en-US" dirty="0" err="1" smtClean="0"/>
-              <a:t>Mbp</a:t>
-            </a:r>
-            <a:r>
-              <a:rPr lang="en-US" dirty="0" smtClean="0"/>
-              <a:t> assembled</a:t>
-            </a:r>
-            <a:endParaRPr lang="en-US" dirty="0" smtClean="0"/>
-          </a:p>
-        </p:txBody>
-      </p:sp>
-      <p:sp>
-        <p:nvSpPr>
-          <p:cNvPr id="4" name="Content Placeholder 3"/>
-          <p:cNvSpPr>
-            <a:spLocks noGrp="1"/>
-          </p:cNvSpPr>
-          <p:nvPr>
-            <p:ph sz="half" idx="2"/>
-          </p:nvPr>
-        </p:nvSpPr>
-        <p:spPr/>
-        <p:txBody>
-          <a:bodyPr>
-            <a:normAutofit fontScale="92500" lnSpcReduction="10000"/>
-          </a:bodyPr>
-          <a:lstStyle/>
-          <a:p>
-            <a:r>
-              <a:rPr lang="en-US" dirty="0"/>
-              <a:t>Mendota </a:t>
-            </a:r>
-          </a:p>
-          <a:p>
-            <a:pPr lvl="1"/>
-            <a:r>
-              <a:rPr lang="en-US" dirty="0"/>
-              <a:t>2008-2012</a:t>
-            </a:r>
-          </a:p>
-          <a:p>
-            <a:pPr lvl="1"/>
-            <a:r>
-              <a:rPr lang="en-US" dirty="0"/>
-              <a:t>94 </a:t>
-            </a:r>
-            <a:r>
-              <a:rPr lang="en-US" dirty="0" smtClean="0"/>
-              <a:t>metagenomes</a:t>
-            </a:r>
-          </a:p>
-          <a:p>
-            <a:pPr lvl="1"/>
-            <a:r>
-              <a:rPr lang="en-US" dirty="0" smtClean="0"/>
-              <a:t>11 </a:t>
-            </a:r>
-            <a:r>
-              <a:rPr lang="en-US" dirty="0" err="1"/>
-              <a:t>Gbp</a:t>
-            </a:r>
-            <a:r>
-              <a:rPr lang="en-US" dirty="0"/>
-              <a:t> assembled</a:t>
-            </a:r>
-          </a:p>
-          <a:p>
-            <a:r>
-              <a:rPr lang="en-US" dirty="0"/>
-              <a:t>Trout Bog </a:t>
-            </a:r>
-          </a:p>
-          <a:p>
-            <a:pPr lvl="1"/>
-            <a:r>
-              <a:rPr lang="en-US" dirty="0" err="1"/>
-              <a:t>epilimnion</a:t>
-            </a:r>
-            <a:r>
-              <a:rPr lang="en-US" dirty="0"/>
-              <a:t> </a:t>
-            </a:r>
-          </a:p>
-          <a:p>
-            <a:pPr lvl="2"/>
-            <a:r>
-              <a:rPr lang="en-US" dirty="0" smtClean="0"/>
-              <a:t>2007-2009</a:t>
-            </a:r>
-          </a:p>
-          <a:p>
-            <a:pPr lvl="2"/>
-            <a:r>
-              <a:rPr lang="en-US" dirty="0" smtClean="0"/>
-              <a:t>47 metagenomes</a:t>
-            </a:r>
-            <a:endParaRPr lang="en-US" dirty="0"/>
-          </a:p>
-          <a:p>
-            <a:pPr lvl="1"/>
-            <a:r>
-              <a:rPr lang="en-US" dirty="0" err="1"/>
-              <a:t>hypolimnion</a:t>
-            </a:r>
-            <a:r>
-              <a:rPr lang="en-US" dirty="0"/>
-              <a:t> </a:t>
-            </a:r>
-          </a:p>
-          <a:p>
-            <a:pPr lvl="2"/>
-            <a:r>
-              <a:rPr lang="en-US" dirty="0"/>
-              <a:t>2005, 2007-2009, </a:t>
-            </a:r>
-            <a:r>
-              <a:rPr lang="en-US" dirty="0" smtClean="0"/>
-              <a:t>2012-2013</a:t>
-            </a:r>
-          </a:p>
-          <a:p>
-            <a:pPr lvl="2"/>
-            <a:r>
-              <a:rPr lang="en-US" dirty="0" smtClean="0"/>
-              <a:t>82 metagenomes</a:t>
-            </a:r>
-          </a:p>
-          <a:p>
-            <a:pPr lvl="2"/>
-            <a:endParaRPr lang="en-US" dirty="0"/>
-          </a:p>
-          <a:p>
-            <a:endParaRPr lang="en-US" dirty="0"/>
-          </a:p>
-        </p:txBody>
-      </p:sp>
-    </p:spTree>
-    <p:extLst>
-      <p:ext uri="{BB962C8B-B14F-4D97-AF65-F5344CB8AC3E}">
-        <p14:creationId xmlns:p14="http://schemas.microsoft.com/office/powerpoint/2010/main" val="2510057821"/>
-      </p:ext>
-    </p:extLst>
-  </p:cSld>
-  <p:clrMapOvr>
-    <a:masterClrMapping/>
-  </p:clrMapOvr>
-</p:sld>
-</file>
-
 <file path=ppt/slides/slide7.xml><?xml version="1.0" encoding="utf-8"?>
 <p:sld xmlns:a="http://schemas.openxmlformats.org/drawingml/2006/main" xmlns:r="http://schemas.openxmlformats.org/officeDocument/2006/relationships" xmlns:p="http://schemas.openxmlformats.org/presentationml/2006/main">
   <p:cSld>
@@ -7851,12 +8075,12 @@
       </p:grpSpPr>
       <p:sp>
         <p:nvSpPr>
-          <p:cNvPr id="2" name="Title 1"/>
-          <p:cNvSpPr>
-            <a:spLocks noGrp="1"/>
-          </p:cNvSpPr>
-          <p:nvPr>
-            <p:ph type="title"/>
+          <p:cNvPr id="3" name="Title 2"/>
+          <p:cNvSpPr>
+            <a:spLocks noGrp="1"/>
+          </p:cNvSpPr>
+          <p:nvPr>
+            <p:ph type="ctrTitle"/>
           </p:nvPr>
         </p:nvSpPr>
         <p:spPr/>
@@ -7866,45 +8090,35 @@
           <a:p>
             <a:r>
               <a:rPr lang="en-US" dirty="0" smtClean="0"/>
-              <a:t>Data Processing</a:t>
+              <a:t>Current Project</a:t>
             </a:r>
             <a:endParaRPr lang="en-US" dirty="0"/>
           </a:p>
         </p:txBody>
       </p:sp>
-      <p:pic>
-        <p:nvPicPr>
-          <p:cNvPr id="5" name="Picture 4" descr="binning_experimental_plan_diagram_to_mapping.png"/>
-          <p:cNvPicPr>
-            <a:picLocks noChangeAspect="1"/>
-          </p:cNvPicPr>
-          <p:nvPr/>
-        </p:nvPicPr>
-        <p:blipFill rotWithShape="1">
-          <a:blip r:embed="rId2">
-            <a:extLst>
-              <a:ext uri="{28A0092B-C50C-407E-A947-70E740481C1C}">
-                <a14:useLocalDpi xmlns:a14="http://schemas.microsoft.com/office/drawing/2010/main" val="0"/>
-              </a:ext>
-            </a:extLst>
-          </a:blip>
-          <a:srcRect l="700" t="1628" r="774" b="1603"/>
-          <a:stretch/>
-        </p:blipFill>
-        <p:spPr>
-          <a:xfrm>
-            <a:off x="63960" y="1763305"/>
-            <a:ext cx="9009227" cy="4129648"/>
-          </a:xfrm>
-          <a:prstGeom prst="rect">
-            <a:avLst/>
-          </a:prstGeom>
-        </p:spPr>
-      </p:pic>
+      <p:sp>
+        <p:nvSpPr>
+          <p:cNvPr id="4" name="Subtitle 3"/>
+          <p:cNvSpPr>
+            <a:spLocks noGrp="1"/>
+          </p:cNvSpPr>
+          <p:nvPr>
+            <p:ph type="subTitle" idx="1"/>
+          </p:nvPr>
+        </p:nvSpPr>
+        <p:spPr/>
+        <p:txBody>
+          <a:bodyPr/>
+          <a:lstStyle/>
+          <a:p>
+            <a:endParaRPr lang="en-US"/>
+          </a:p>
+        </p:txBody>
+      </p:sp>
     </p:spTree>
     <p:extLst>
       <p:ext uri="{BB962C8B-B14F-4D97-AF65-F5344CB8AC3E}">
-        <p14:creationId xmlns:p14="http://schemas.microsoft.com/office/powerpoint/2010/main" val="484787663"/>
+        <p14:creationId xmlns:p14="http://schemas.microsoft.com/office/powerpoint/2010/main" val="2024700940"/>
       </p:ext>
     </p:extLst>
   </p:cSld>
@@ -7948,7 +8162,7 @@
           <a:p>
             <a:r>
               <a:rPr lang="en-US" dirty="0" smtClean="0"/>
-              <a:t>Stats on MAGs so far</a:t>
+              <a:t>Questions</a:t>
             </a:r>
             <a:endParaRPr lang="en-US" dirty="0"/>
           </a:p>
@@ -7966,186 +8180,38 @@
         </p:nvSpPr>
         <p:spPr/>
         <p:txBody>
-          <a:bodyPr>
-            <a:normAutofit fontScale="92500" lnSpcReduction="10000"/>
-          </a:bodyPr>
-          <a:lstStyle/>
-          <a:p>
-            <a:r>
-              <a:rPr lang="en-US" dirty="0" smtClean="0"/>
-              <a:t>Crystal Bog</a:t>
-            </a:r>
-          </a:p>
-          <a:p>
-            <a:pPr lvl="1"/>
+          <a:bodyPr/>
+          <a:lstStyle/>
+          <a:p>
+            <a:r>
+              <a:rPr lang="en-US" dirty="0" smtClean="0"/>
+              <a:t>Are </a:t>
+            </a:r>
             <a:r>
               <a:rPr lang="en-US" dirty="0"/>
-              <a:t>2505 bins, 564 passed </a:t>
-            </a:r>
-            <a:r>
-              <a:rPr lang="en-US" dirty="0" smtClean="0"/>
-              <a:t>filtering</a:t>
-            </a:r>
-          </a:p>
-          <a:p>
-            <a:pPr lvl="1"/>
+              <a:t>there ecologically distinct strains/genotypes within previously defined sequence-discrete populations?</a:t>
+            </a:r>
+          </a:p>
+          <a:p>
             <a:r>
               <a:rPr lang="en-US" dirty="0"/>
-              <a:t>Phyla with &gt; 10 bins:  </a:t>
+              <a:t>What stage of speciation are these distinct strains/genotypes at in their separation? </a:t>
             </a:r>
             <a:endParaRPr lang="en-US" dirty="0" smtClean="0"/>
           </a:p>
           <a:p>
-            <a:pPr lvl="2"/>
-            <a:r>
-              <a:rPr lang="en-US" dirty="0" err="1" smtClean="0"/>
-              <a:t>Actinobacteria</a:t>
-            </a:r>
-            <a:r>
-              <a:rPr lang="en-US" dirty="0" smtClean="0"/>
-              <a:t>(342), </a:t>
-            </a:r>
-            <a:r>
-              <a:rPr lang="en-US" dirty="0" err="1" smtClean="0"/>
-              <a:t>Proteobacteria</a:t>
-            </a:r>
-            <a:r>
-              <a:rPr lang="en-US" dirty="0" smtClean="0"/>
-              <a:t>(267), </a:t>
-            </a:r>
-            <a:r>
-              <a:rPr lang="en-US" dirty="0" err="1" smtClean="0"/>
-              <a:t>Verrucomicrobia</a:t>
-            </a:r>
-            <a:r>
-              <a:rPr lang="en-US" dirty="0" smtClean="0"/>
-              <a:t>(113), </a:t>
-            </a:r>
-            <a:r>
-              <a:rPr lang="en-US" dirty="0" err="1" smtClean="0"/>
-              <a:t>Bacteroidetes</a:t>
-            </a:r>
-            <a:r>
-              <a:rPr lang="en-US" dirty="0" smtClean="0"/>
-              <a:t>(41), </a:t>
-            </a:r>
-            <a:r>
-              <a:rPr lang="en-US" dirty="0" err="1"/>
-              <a:t>Candidatus</a:t>
+            <a:r>
+              <a:rPr lang="en-US" dirty="0" smtClean="0"/>
+              <a:t>Is </a:t>
             </a:r>
             <a:r>
               <a:rPr lang="en-US" dirty="0"/>
-              <a:t> </a:t>
-            </a:r>
-            <a:r>
-              <a:rPr lang="en-US" dirty="0" err="1" smtClean="0"/>
-              <a:t>Saccharibacteria</a:t>
-            </a:r>
-            <a:r>
-              <a:rPr lang="en-US" dirty="0" smtClean="0"/>
-              <a:t>(31), </a:t>
-            </a:r>
-            <a:r>
-              <a:rPr lang="en-US" dirty="0" err="1" smtClean="0"/>
-              <a:t>Chlorobi</a:t>
-            </a:r>
-            <a:r>
-              <a:rPr lang="en-US" dirty="0" smtClean="0"/>
-              <a:t>(29), </a:t>
-            </a:r>
-            <a:r>
-              <a:rPr lang="en-US" dirty="0" err="1" smtClean="0"/>
-              <a:t>Parcubacteria</a:t>
-            </a:r>
-            <a:r>
-              <a:rPr lang="en-US" dirty="0" smtClean="0"/>
-              <a:t> (10), </a:t>
-            </a:r>
-          </a:p>
-          <a:p>
-            <a:r>
-              <a:rPr lang="en-US" dirty="0" smtClean="0"/>
-              <a:t>Mary </a:t>
-            </a:r>
-            <a:r>
-              <a:rPr lang="en-US" dirty="0" smtClean="0"/>
-              <a:t>Lake</a:t>
-            </a:r>
-          </a:p>
-          <a:p>
-            <a:pPr lvl="1"/>
-            <a:r>
-              <a:rPr lang="en-US" dirty="0"/>
-              <a:t>352 bins, 104 passed </a:t>
-            </a:r>
-            <a:r>
-              <a:rPr lang="en-US" dirty="0" smtClean="0"/>
-              <a:t>filtering</a:t>
-            </a:r>
-          </a:p>
-          <a:p>
-            <a:pPr lvl="1"/>
-            <a:r>
-              <a:rPr lang="en-US" dirty="0" smtClean="0"/>
-              <a:t>Phyla </a:t>
-            </a:r>
-            <a:r>
-              <a:rPr lang="en-US" dirty="0"/>
-              <a:t>with &gt; 10 bins</a:t>
-            </a:r>
-            <a:r>
-              <a:rPr lang="en-US" dirty="0" smtClean="0"/>
-              <a:t>:</a:t>
-            </a:r>
-          </a:p>
-          <a:p>
-            <a:pPr lvl="2"/>
-            <a:r>
-              <a:rPr lang="en-US" dirty="0" err="1" smtClean="0"/>
-              <a:t>Proteobacteria</a:t>
-            </a:r>
-            <a:r>
-              <a:rPr lang="en-US" dirty="0" smtClean="0"/>
-              <a:t>(99), </a:t>
-            </a:r>
-            <a:r>
-              <a:rPr lang="en-US" dirty="0" err="1" smtClean="0"/>
-              <a:t>Actinobacteria</a:t>
-            </a:r>
-            <a:r>
-              <a:rPr lang="en-US" dirty="0" smtClean="0"/>
-              <a:t>(34), </a:t>
-            </a:r>
-            <a:r>
-              <a:rPr lang="en-US" dirty="0" err="1" smtClean="0"/>
-              <a:t>Planctomycetes</a:t>
-            </a:r>
-            <a:r>
-              <a:rPr lang="en-US" dirty="0" smtClean="0"/>
-              <a:t>(21), </a:t>
-            </a:r>
-            <a:r>
-              <a:rPr lang="en-US" dirty="0" err="1" smtClean="0"/>
-              <a:t>Verrucomicrobia</a:t>
-            </a:r>
-            <a:r>
-              <a:rPr lang="en-US" dirty="0" smtClean="0"/>
-              <a:t>(18), </a:t>
-            </a:r>
-            <a:r>
-              <a:rPr lang="en-US" dirty="0" err="1" smtClean="0"/>
-              <a:t>Bacteroidetes</a:t>
-            </a:r>
-            <a:r>
-              <a:rPr lang="en-US" dirty="0" smtClean="0"/>
-              <a:t>(18), Cyanobacteria(11)</a:t>
-            </a:r>
-          </a:p>
-          <a:p>
-            <a:pPr lvl="2"/>
-            <a:endParaRPr lang="en-US" dirty="0"/>
-          </a:p>
-          <a:p>
+              <a:t>there a barrier </a:t>
+            </a:r>
+            <a:r>
+              <a:rPr lang="en-US" dirty="0" smtClean="0"/>
+              <a:t>to recombination between co-exiting strains?</a:t>
+            </a:r>
             <a:endParaRPr lang="en-US" dirty="0"/>
           </a:p>
         </p:txBody>
@@ -8153,7 +8219,7 @@
     </p:spTree>
     <p:extLst>
       <p:ext uri="{BB962C8B-B14F-4D97-AF65-F5344CB8AC3E}">
-        <p14:creationId xmlns:p14="http://schemas.microsoft.com/office/powerpoint/2010/main" val="3930018211"/>
+        <p14:creationId xmlns:p14="http://schemas.microsoft.com/office/powerpoint/2010/main" val="2491628351"/>
       </p:ext>
     </p:extLst>
   </p:cSld>
@@ -8197,7 +8263,7 @@
           <a:p>
             <a:r>
               <a:rPr lang="en-US" dirty="0" smtClean="0"/>
-              <a:t>Questions</a:t>
+              <a:t>Stats on Metagenomes</a:t>
             </a:r>
             <a:endParaRPr lang="en-US" dirty="0"/>
           </a:p>
@@ -8210,43 +8276,218 @@
             <a:spLocks noGrp="1"/>
           </p:cNvSpPr>
           <p:nvPr>
-            <p:ph idx="1"/>
+            <p:ph sz="half" idx="1"/>
           </p:nvPr>
         </p:nvSpPr>
         <p:spPr/>
         <p:txBody>
-          <a:bodyPr/>
-          <a:lstStyle/>
-          <a:p>
-            <a:r>
-              <a:rPr lang="en-US" dirty="0" smtClean="0"/>
-              <a:t>Are </a:t>
-            </a:r>
+          <a:bodyPr>
+            <a:normAutofit fontScale="92500" lnSpcReduction="10000"/>
+          </a:bodyPr>
+          <a:lstStyle/>
+          <a:p>
+            <a:r>
+              <a:rPr lang="en-US" dirty="0" smtClean="0"/>
+              <a:t>Crystal </a:t>
+            </a:r>
+            <a:r>
+              <a:rPr lang="en-US" dirty="0" smtClean="0"/>
+              <a:t>Bog </a:t>
+            </a:r>
+          </a:p>
+          <a:p>
+            <a:pPr lvl="1"/>
+            <a:r>
+              <a:rPr lang="en-US" dirty="0" smtClean="0"/>
+              <a:t>2007-2009</a:t>
+            </a:r>
+          </a:p>
+          <a:p>
+            <a:pPr lvl="1"/>
+            <a:r>
+              <a:rPr lang="en-US" dirty="0" smtClean="0"/>
+              <a:t>82 metagenomes</a:t>
+            </a:r>
+          </a:p>
+          <a:p>
+            <a:pPr lvl="1"/>
+            <a:r>
+              <a:rPr lang="en-US" dirty="0" smtClean="0"/>
+              <a:t>20 </a:t>
+            </a:r>
+            <a:r>
+              <a:rPr lang="en-US" dirty="0" err="1" smtClean="0"/>
+              <a:t>Gbp</a:t>
+            </a:r>
+            <a:r>
+              <a:rPr lang="en-US" dirty="0" smtClean="0"/>
+              <a:t> assembled</a:t>
+            </a:r>
+            <a:endParaRPr lang="en-US" dirty="0" smtClean="0"/>
+          </a:p>
+          <a:p>
+            <a:r>
+              <a:rPr lang="en-US" dirty="0" smtClean="0"/>
+              <a:t>Mary </a:t>
+            </a:r>
+            <a:r>
+              <a:rPr lang="en-US" dirty="0" smtClean="0"/>
+              <a:t>Lake </a:t>
+            </a:r>
+          </a:p>
+          <a:p>
+            <a:pPr lvl="1"/>
+            <a:r>
+              <a:rPr lang="en-US" dirty="0" smtClean="0"/>
+              <a:t>2009, 12 depths</a:t>
+            </a:r>
+          </a:p>
+          <a:p>
+            <a:pPr lvl="1"/>
+            <a:r>
+              <a:rPr lang="en-US" dirty="0" smtClean="0"/>
+              <a:t>12 metagenomes</a:t>
+            </a:r>
+          </a:p>
+          <a:p>
+            <a:pPr lvl="1"/>
+            <a:r>
+              <a:rPr lang="en-US" dirty="0" smtClean="0"/>
+              <a:t>11 </a:t>
+            </a:r>
+            <a:r>
+              <a:rPr lang="en-US" dirty="0" err="1" smtClean="0"/>
+              <a:t>Mbp</a:t>
+            </a:r>
+            <a:r>
+              <a:rPr lang="en-US" dirty="0" smtClean="0"/>
+              <a:t> assembled</a:t>
+            </a:r>
+            <a:endParaRPr lang="en-US" dirty="0" smtClean="0"/>
+          </a:p>
+        </p:txBody>
+      </p:sp>
+      <p:sp>
+        <p:nvSpPr>
+          <p:cNvPr id="4" name="Content Placeholder 3"/>
+          <p:cNvSpPr>
+            <a:spLocks noGrp="1"/>
+          </p:cNvSpPr>
+          <p:nvPr>
+            <p:ph sz="half" idx="2"/>
+          </p:nvPr>
+        </p:nvSpPr>
+        <p:spPr/>
+        <p:txBody>
+          <a:bodyPr>
+            <a:normAutofit fontScale="92500" lnSpcReduction="10000"/>
+          </a:bodyPr>
+          <a:lstStyle/>
+          <a:p>
             <a:r>
               <a:rPr lang="en-US" dirty="0"/>
-              <a:t>there ecologically distinct strains/genotypes within previously defined sequence-discrete populations?</a:t>
-            </a:r>
-          </a:p>
-          <a:p>
+              <a:t>Mendota </a:t>
+            </a:r>
+          </a:p>
+          <a:p>
+            <a:pPr lvl="1"/>
             <a:r>
               <a:rPr lang="en-US" dirty="0"/>
-              <a:t>What stage of speciation are these distinct strains/genotypes at in their separation? </a:t>
-            </a:r>
-            <a:endParaRPr lang="en-US" dirty="0" smtClean="0"/>
-          </a:p>
-          <a:p>
-            <a:r>
-              <a:rPr lang="en-US" dirty="0" smtClean="0"/>
-              <a:t>Is </a:t>
-            </a:r>
+              <a:t>2008-2012</a:t>
+            </a:r>
+          </a:p>
+          <a:p>
+            <a:pPr lvl="1"/>
             <a:r>
               <a:rPr lang="en-US" dirty="0"/>
-              <a:t>there a barrier </a:t>
-            </a:r>
-            <a:r>
-              <a:rPr lang="en-US" dirty="0" smtClean="0"/>
-              <a:t>to recombination between co-exiting strains?</a:t>
-            </a:r>
+              <a:t>94 </a:t>
+            </a:r>
+            <a:r>
+              <a:rPr lang="en-US" dirty="0" smtClean="0"/>
+              <a:t>metagenomes</a:t>
+            </a:r>
+          </a:p>
+          <a:p>
+            <a:pPr lvl="1"/>
+            <a:r>
+              <a:rPr lang="en-US" dirty="0" smtClean="0"/>
+              <a:t>11 </a:t>
+            </a:r>
+            <a:r>
+              <a:rPr lang="en-US" dirty="0" err="1"/>
+              <a:t>Gbp</a:t>
+            </a:r>
+            <a:r>
+              <a:rPr lang="en-US" dirty="0"/>
+              <a:t> assembled</a:t>
+            </a:r>
+          </a:p>
+          <a:p>
+            <a:r>
+              <a:rPr lang="en-US" dirty="0"/>
+              <a:t>Trout Bog </a:t>
+            </a:r>
+          </a:p>
+          <a:p>
+            <a:pPr lvl="1"/>
+            <a:r>
+              <a:rPr lang="en-US" dirty="0" err="1"/>
+              <a:t>epilimnion</a:t>
+            </a:r>
+            <a:r>
+              <a:rPr lang="en-US" dirty="0"/>
+              <a:t> </a:t>
+            </a:r>
+          </a:p>
+          <a:p>
+            <a:pPr lvl="2"/>
+            <a:r>
+              <a:rPr lang="en-US" dirty="0" smtClean="0"/>
+              <a:t>2007-2009</a:t>
+            </a:r>
+          </a:p>
+          <a:p>
+            <a:pPr lvl="2"/>
+            <a:r>
+              <a:rPr lang="en-US" dirty="0" smtClean="0"/>
+              <a:t>47 metagenomes</a:t>
+            </a:r>
+            <a:endParaRPr lang="en-US" dirty="0"/>
+          </a:p>
+          <a:p>
+            <a:pPr lvl="1"/>
+            <a:r>
+              <a:rPr lang="en-US" dirty="0" err="1"/>
+              <a:t>hypolimnion</a:t>
+            </a:r>
+            <a:r>
+              <a:rPr lang="en-US" dirty="0"/>
+              <a:t> </a:t>
+            </a:r>
+          </a:p>
+          <a:p>
+            <a:pPr lvl="2"/>
+            <a:r>
+              <a:rPr lang="en-US" dirty="0"/>
+              <a:t>2005, 2007-2009, </a:t>
+            </a:r>
+            <a:r>
+              <a:rPr lang="en-US" dirty="0" smtClean="0"/>
+              <a:t>2012-2013</a:t>
+            </a:r>
+          </a:p>
+          <a:p>
+            <a:pPr lvl="2"/>
+            <a:r>
+              <a:rPr lang="en-US" dirty="0" smtClean="0"/>
+              <a:t>82 metagenomes</a:t>
+            </a:r>
+          </a:p>
+          <a:p>
+            <a:pPr lvl="2"/>
+            <a:endParaRPr lang="en-US" dirty="0"/>
+          </a:p>
+          <a:p>
             <a:endParaRPr lang="en-US" dirty="0"/>
           </a:p>
         </p:txBody>
@@ -8254,7 +8495,7 @@
     </p:spTree>
     <p:extLst>
       <p:ext uri="{BB962C8B-B14F-4D97-AF65-F5344CB8AC3E}">
-        <p14:creationId xmlns:p14="http://schemas.microsoft.com/office/powerpoint/2010/main" val="2491628351"/>
+        <p14:creationId xmlns:p14="http://schemas.microsoft.com/office/powerpoint/2010/main" val="2510057821"/>
       </p:ext>
     </p:extLst>
   </p:cSld>

</xml_diff>

<commit_message>
Added Shapiro table to slides
</commit_message>
<xml_diff>
--- a/5YCM/Slides_5YCM.pptx
+++ b/5YCM/Slides_5YCM.pptx
@@ -5,7 +5,7 @@
     <p:sldMasterId id="2147483648" r:id="rId1"/>
   </p:sldMasterIdLst>
   <p:notesMasterIdLst>
-    <p:notesMasterId r:id="rId19"/>
+    <p:notesMasterId r:id="rId20"/>
   </p:notesMasterIdLst>
   <p:sldIdLst>
     <p:sldId id="283" r:id="rId2"/>
@@ -15,16 +15,17 @@
     <p:sldId id="280" r:id="rId6"/>
     <p:sldId id="271" r:id="rId7"/>
     <p:sldId id="281" r:id="rId8"/>
-    <p:sldId id="287" r:id="rId9"/>
-    <p:sldId id="284" r:id="rId10"/>
-    <p:sldId id="286" r:id="rId11"/>
-    <p:sldId id="285" r:id="rId12"/>
-    <p:sldId id="288" r:id="rId13"/>
-    <p:sldId id="259" r:id="rId14"/>
-    <p:sldId id="260" r:id="rId15"/>
-    <p:sldId id="289" r:id="rId16"/>
-    <p:sldId id="290" r:id="rId17"/>
-    <p:sldId id="291" r:id="rId18"/>
+    <p:sldId id="294" r:id="rId9"/>
+    <p:sldId id="287" r:id="rId10"/>
+    <p:sldId id="284" r:id="rId11"/>
+    <p:sldId id="286" r:id="rId12"/>
+    <p:sldId id="285" r:id="rId13"/>
+    <p:sldId id="288" r:id="rId14"/>
+    <p:sldId id="259" r:id="rId15"/>
+    <p:sldId id="260" r:id="rId16"/>
+    <p:sldId id="289" r:id="rId17"/>
+    <p:sldId id="290" r:id="rId18"/>
+    <p:sldId id="291" r:id="rId19"/>
   </p:sldIdLst>
   <p:sldSz cx="9144000" cy="6858000" type="screen4x3"/>
   <p:notesSz cx="6858000" cy="9144000"/>
@@ -143,6 +144,7 @@
         <p14:section name="newQ speciation" id="{D4EF7B4F-9358-EF46-9E72-ABD9447F9847}">
           <p14:sldIdLst>
             <p14:sldId id="281"/>
+            <p14:sldId id="294"/>
             <p14:sldId id="287"/>
             <p14:sldId id="284"/>
             <p14:sldId id="286"/>
@@ -166,7 +168,7 @@
       </p14:sectionLst>
     </p:ext>
     <p:ext uri="{EFAFB233-063F-42B5-8137-9DF3F51BA10A}">
-      <p15:sldGuideLst xmlns:p15="http://schemas.microsoft.com/office/powerpoint/2012/main">
+      <p15:sldGuideLst xmlns:p15="http://schemas.microsoft.com/office/powerpoint/2012/main" xmlns="">
         <p15:guide id="1" orient="horz" pos="2160">
           <p15:clr>
             <a:srgbClr val="A4A3A4"/>
@@ -265,7 +267,7 @@
           <a:p>
             <a:fld id="{8DD126E3-FD87-804E-9B94-9466551D12C6}" type="datetimeFigureOut">
               <a:rPr lang="en-US" smtClean="0"/>
-              <a:t>10/24/17</a:t>
+              <a:t>10/26/17</a:t>
             </a:fld>
             <a:endParaRPr lang="en-US"/>
           </a:p>
@@ -832,7 +834,7 @@
           <a:p>
             <a:fld id="{03226FDB-C243-F04F-A3A4-63881AA9751B}" type="slidenum">
               <a:rPr lang="en-US" smtClean="0"/>
-              <a:t>9</a:t>
+              <a:t>10</a:t>
             </a:fld>
             <a:endParaRPr lang="en-US"/>
           </a:p>
@@ -901,11 +903,7 @@
             </a:r>
             <a:r>
               <a:rPr lang="en-US" baseline="0" dirty="0" smtClean="0"/>
-              <a:t> with &gt; 50% completion and less than 10% redundancy using 139 single copy </a:t>
-            </a:r>
-            <a:r>
-              <a:rPr lang="en-US" baseline="0" dirty="0" smtClean="0"/>
-              <a:t>genes</a:t>
+              <a:t> with &gt; 50% completion and less than 10% redundancy using 139 single copy genes</a:t>
             </a:r>
           </a:p>
         </p:txBody>
@@ -927,7 +925,7 @@
           <a:p>
             <a:fld id="{03226FDB-C243-F04F-A3A4-63881AA9751B}" type="slidenum">
               <a:rPr lang="en-US" smtClean="0"/>
-              <a:t>11</a:t>
+              <a:t>12</a:t>
             </a:fld>
             <a:endParaRPr lang="en-US"/>
           </a:p>
@@ -1011,7 +1009,7 @@
           <a:p>
             <a:fld id="{03226FDB-C243-F04F-A3A4-63881AA9751B}" type="slidenum">
               <a:rPr lang="en-US" smtClean="0"/>
-              <a:t>12</a:t>
+              <a:t>13</a:t>
             </a:fld>
             <a:endParaRPr lang="en-US"/>
           </a:p>
@@ -1118,7 +1116,7 @@
           <a:p>
             <a:fld id="{E24C21EA-28B2-0442-AFB4-706342F125BD}" type="slidenum">
               <a:rPr lang="en-US" smtClean="0"/>
-              <a:t>13</a:t>
+              <a:t>14</a:t>
             </a:fld>
             <a:endParaRPr lang="en-US"/>
           </a:p>
@@ -1216,7 +1214,7 @@
           <a:p>
             <a:fld id="{E24C21EA-28B2-0442-AFB4-706342F125BD}" type="slidenum">
               <a:rPr lang="en-US" smtClean="0"/>
-              <a:t>14</a:t>
+              <a:t>15</a:t>
             </a:fld>
             <a:endParaRPr lang="en-US"/>
           </a:p>
@@ -1304,7 +1302,7 @@
           <a:p>
             <a:fld id="{03226FDB-C243-F04F-A3A4-63881AA9751B}" type="slidenum">
               <a:rPr lang="en-US" smtClean="0"/>
-              <a:t>16</a:t>
+              <a:t>17</a:t>
             </a:fld>
             <a:endParaRPr lang="en-US"/>
           </a:p>
@@ -1504,7 +1502,7 @@
           <a:p>
             <a:fld id="{C2CEE717-EDC7-3148-8218-36A4F68267A5}" type="datetimeFigureOut">
               <a:rPr lang="en-US" smtClean="0"/>
-              <a:t>10/24/17</a:t>
+              <a:t>10/26/17</a:t>
             </a:fld>
             <a:endParaRPr lang="en-US"/>
           </a:p>
@@ -1674,7 +1672,7 @@
           <a:p>
             <a:fld id="{C2CEE717-EDC7-3148-8218-36A4F68267A5}" type="datetimeFigureOut">
               <a:rPr lang="en-US" smtClean="0"/>
-              <a:t>10/24/17</a:t>
+              <a:t>10/26/17</a:t>
             </a:fld>
             <a:endParaRPr lang="en-US"/>
           </a:p>
@@ -1854,7 +1852,7 @@
           <a:p>
             <a:fld id="{C2CEE717-EDC7-3148-8218-36A4F68267A5}" type="datetimeFigureOut">
               <a:rPr lang="en-US" smtClean="0"/>
-              <a:t>10/24/17</a:t>
+              <a:t>10/26/17</a:t>
             </a:fld>
             <a:endParaRPr lang="en-US"/>
           </a:p>
@@ -2024,7 +2022,7 @@
           <a:p>
             <a:fld id="{C2CEE717-EDC7-3148-8218-36A4F68267A5}" type="datetimeFigureOut">
               <a:rPr lang="en-US" smtClean="0"/>
-              <a:t>10/24/17</a:t>
+              <a:t>10/26/17</a:t>
             </a:fld>
             <a:endParaRPr lang="en-US"/>
           </a:p>
@@ -2270,7 +2268,7 @@
           <a:p>
             <a:fld id="{C2CEE717-EDC7-3148-8218-36A4F68267A5}" type="datetimeFigureOut">
               <a:rPr lang="en-US" smtClean="0"/>
-              <a:t>10/24/17</a:t>
+              <a:t>10/26/17</a:t>
             </a:fld>
             <a:endParaRPr lang="en-US"/>
           </a:p>
@@ -2558,7 +2556,7 @@
           <a:p>
             <a:fld id="{C2CEE717-EDC7-3148-8218-36A4F68267A5}" type="datetimeFigureOut">
               <a:rPr lang="en-US" smtClean="0"/>
-              <a:t>10/24/17</a:t>
+              <a:t>10/26/17</a:t>
             </a:fld>
             <a:endParaRPr lang="en-US"/>
           </a:p>
@@ -2980,7 +2978,7 @@
           <a:p>
             <a:fld id="{C2CEE717-EDC7-3148-8218-36A4F68267A5}" type="datetimeFigureOut">
               <a:rPr lang="en-US" smtClean="0"/>
-              <a:t>10/24/17</a:t>
+              <a:t>10/26/17</a:t>
             </a:fld>
             <a:endParaRPr lang="en-US"/>
           </a:p>
@@ -3098,7 +3096,7 @@
           <a:p>
             <a:fld id="{C2CEE717-EDC7-3148-8218-36A4F68267A5}" type="datetimeFigureOut">
               <a:rPr lang="en-US" smtClean="0"/>
-              <a:t>10/24/17</a:t>
+              <a:t>10/26/17</a:t>
             </a:fld>
             <a:endParaRPr lang="en-US"/>
           </a:p>
@@ -3193,7 +3191,7 @@
           <a:p>
             <a:fld id="{C2CEE717-EDC7-3148-8218-36A4F68267A5}" type="datetimeFigureOut">
               <a:rPr lang="en-US" smtClean="0"/>
-              <a:t>10/24/17</a:t>
+              <a:t>10/26/17</a:t>
             </a:fld>
             <a:endParaRPr lang="en-US"/>
           </a:p>
@@ -3470,7 +3468,7 @@
           <a:p>
             <a:fld id="{C2CEE717-EDC7-3148-8218-36A4F68267A5}" type="datetimeFigureOut">
               <a:rPr lang="en-US" smtClean="0"/>
-              <a:t>10/24/17</a:t>
+              <a:t>10/26/17</a:t>
             </a:fld>
             <a:endParaRPr lang="en-US"/>
           </a:p>
@@ -3723,7 +3721,7 @@
           <a:p>
             <a:fld id="{C2CEE717-EDC7-3148-8218-36A4F68267A5}" type="datetimeFigureOut">
               <a:rPr lang="en-US" smtClean="0"/>
-              <a:t>10/24/17</a:t>
+              <a:t>10/26/17</a:t>
             </a:fld>
             <a:endParaRPr lang="en-US"/>
           </a:p>
@@ -3936,7 +3934,7 @@
           <a:p>
             <a:fld id="{C2CEE717-EDC7-3148-8218-36A4F68267A5}" type="datetimeFigureOut">
               <a:rPr lang="en-US" smtClean="0"/>
-              <a:t>10/24/17</a:t>
+              <a:t>10/26/17</a:t>
             </a:fld>
             <a:endParaRPr lang="en-US"/>
           </a:p>
@@ -4469,7 +4467,7 @@
   <p:timing>
     <p:tnLst>
       <p:par>
-        <p:cTn id="1" dur="indefinite" restart="never" nodeType="tmRoot"/>
+        <p:cTn xmlns:p14="http://schemas.microsoft.com/office/powerpoint/2010/main" id="1" dur="indefinite" restart="never" nodeType="tmRoot"/>
       </p:par>
     </p:tnLst>
   </p:timing>
@@ -4477,6 +4475,272 @@
 </file>
 
 <file path=ppt/slides/slide10.xml><?xml version="1.0" encoding="utf-8"?>
+<p:sld xmlns:a="http://schemas.openxmlformats.org/drawingml/2006/main" xmlns:r="http://schemas.openxmlformats.org/officeDocument/2006/relationships" xmlns:p="http://schemas.openxmlformats.org/presentationml/2006/main">
+  <p:cSld>
+    <p:spTree>
+      <p:nvGrpSpPr>
+        <p:cNvPr id="1" name=""/>
+        <p:cNvGrpSpPr/>
+        <p:nvPr/>
+      </p:nvGrpSpPr>
+      <p:grpSpPr>
+        <a:xfrm>
+          <a:off x="0" y="0"/>
+          <a:ext cx="0" cy="0"/>
+          <a:chOff x="0" y="0"/>
+          <a:chExt cx="0" cy="0"/>
+        </a:xfrm>
+      </p:grpSpPr>
+      <p:sp>
+        <p:nvSpPr>
+          <p:cNvPr id="2" name="Title 1"/>
+          <p:cNvSpPr>
+            <a:spLocks noGrp="1"/>
+          </p:cNvSpPr>
+          <p:nvPr>
+            <p:ph type="title"/>
+          </p:nvPr>
+        </p:nvSpPr>
+        <p:spPr/>
+        <p:txBody>
+          <a:bodyPr/>
+          <a:lstStyle/>
+          <a:p>
+            <a:r>
+              <a:rPr lang="en-US" dirty="0" smtClean="0"/>
+              <a:t>Stats on Metagenomes</a:t>
+            </a:r>
+            <a:endParaRPr lang="en-US" dirty="0"/>
+          </a:p>
+        </p:txBody>
+      </p:sp>
+      <p:sp>
+        <p:nvSpPr>
+          <p:cNvPr id="3" name="Content Placeholder 2"/>
+          <p:cNvSpPr>
+            <a:spLocks noGrp="1"/>
+          </p:cNvSpPr>
+          <p:nvPr>
+            <p:ph sz="half" idx="1"/>
+          </p:nvPr>
+        </p:nvSpPr>
+        <p:spPr/>
+        <p:txBody>
+          <a:bodyPr>
+            <a:normAutofit fontScale="92500" lnSpcReduction="10000"/>
+          </a:bodyPr>
+          <a:lstStyle/>
+          <a:p>
+            <a:r>
+              <a:rPr lang="en-US" dirty="0" smtClean="0"/>
+              <a:t>Crystal Bog </a:t>
+            </a:r>
+          </a:p>
+          <a:p>
+            <a:pPr lvl="1"/>
+            <a:r>
+              <a:rPr lang="en-US" dirty="0" smtClean="0"/>
+              <a:t>2007-2009</a:t>
+            </a:r>
+          </a:p>
+          <a:p>
+            <a:pPr lvl="1"/>
+            <a:r>
+              <a:rPr lang="en-US" dirty="0" smtClean="0"/>
+              <a:t>82 metagenomes</a:t>
+            </a:r>
+          </a:p>
+          <a:p>
+            <a:pPr lvl="1"/>
+            <a:r>
+              <a:rPr lang="en-US" dirty="0" smtClean="0"/>
+              <a:t>20 </a:t>
+            </a:r>
+            <a:r>
+              <a:rPr lang="en-US" dirty="0" err="1" smtClean="0"/>
+              <a:t>Gbp</a:t>
+            </a:r>
+            <a:r>
+              <a:rPr lang="en-US" dirty="0" smtClean="0"/>
+              <a:t> assembled</a:t>
+            </a:r>
+          </a:p>
+          <a:p>
+            <a:r>
+              <a:rPr lang="en-US" dirty="0" smtClean="0"/>
+              <a:t>Mary Lake </a:t>
+            </a:r>
+          </a:p>
+          <a:p>
+            <a:pPr lvl="1"/>
+            <a:r>
+              <a:rPr lang="en-US" dirty="0" smtClean="0"/>
+              <a:t>2009, 12 depths</a:t>
+            </a:r>
+          </a:p>
+          <a:p>
+            <a:pPr lvl="1"/>
+            <a:r>
+              <a:rPr lang="en-US" dirty="0" smtClean="0"/>
+              <a:t>12 metagenomes</a:t>
+            </a:r>
+          </a:p>
+          <a:p>
+            <a:pPr lvl="1"/>
+            <a:r>
+              <a:rPr lang="en-US" dirty="0" smtClean="0"/>
+              <a:t>11 </a:t>
+            </a:r>
+            <a:r>
+              <a:rPr lang="en-US" dirty="0" err="1" smtClean="0"/>
+              <a:t>Mbp</a:t>
+            </a:r>
+            <a:r>
+              <a:rPr lang="en-US" dirty="0" smtClean="0"/>
+              <a:t> assembled</a:t>
+            </a:r>
+          </a:p>
+        </p:txBody>
+      </p:sp>
+      <p:sp>
+        <p:nvSpPr>
+          <p:cNvPr id="4" name="Content Placeholder 3"/>
+          <p:cNvSpPr>
+            <a:spLocks noGrp="1"/>
+          </p:cNvSpPr>
+          <p:nvPr>
+            <p:ph sz="half" idx="2"/>
+          </p:nvPr>
+        </p:nvSpPr>
+        <p:spPr/>
+        <p:txBody>
+          <a:bodyPr>
+            <a:normAutofit fontScale="92500" lnSpcReduction="10000"/>
+          </a:bodyPr>
+          <a:lstStyle/>
+          <a:p>
+            <a:r>
+              <a:rPr lang="en-US" dirty="0"/>
+              <a:t>Mendota </a:t>
+            </a:r>
+          </a:p>
+          <a:p>
+            <a:pPr lvl="1"/>
+            <a:r>
+              <a:rPr lang="en-US" dirty="0"/>
+              <a:t>2008-2012</a:t>
+            </a:r>
+          </a:p>
+          <a:p>
+            <a:pPr lvl="1"/>
+            <a:r>
+              <a:rPr lang="en-US" dirty="0"/>
+              <a:t>94 </a:t>
+            </a:r>
+            <a:r>
+              <a:rPr lang="en-US" dirty="0" smtClean="0"/>
+              <a:t>metagenomes</a:t>
+            </a:r>
+          </a:p>
+          <a:p>
+            <a:pPr lvl="1"/>
+            <a:r>
+              <a:rPr lang="en-US" dirty="0" smtClean="0"/>
+              <a:t>11 </a:t>
+            </a:r>
+            <a:r>
+              <a:rPr lang="en-US" dirty="0" err="1"/>
+              <a:t>Gbp</a:t>
+            </a:r>
+            <a:r>
+              <a:rPr lang="en-US" dirty="0"/>
+              <a:t> assembled</a:t>
+            </a:r>
+          </a:p>
+          <a:p>
+            <a:r>
+              <a:rPr lang="en-US" dirty="0"/>
+              <a:t>Trout Bog </a:t>
+            </a:r>
+          </a:p>
+          <a:p>
+            <a:pPr lvl="1"/>
+            <a:r>
+              <a:rPr lang="en-US" dirty="0" err="1"/>
+              <a:t>epilimnion</a:t>
+            </a:r>
+            <a:r>
+              <a:rPr lang="en-US" dirty="0"/>
+              <a:t> </a:t>
+            </a:r>
+          </a:p>
+          <a:p>
+            <a:pPr lvl="2"/>
+            <a:r>
+              <a:rPr lang="en-US" dirty="0" smtClean="0"/>
+              <a:t>2007-2009</a:t>
+            </a:r>
+          </a:p>
+          <a:p>
+            <a:pPr lvl="2"/>
+            <a:r>
+              <a:rPr lang="en-US" dirty="0" smtClean="0"/>
+              <a:t>47 metagenomes</a:t>
+            </a:r>
+            <a:endParaRPr lang="en-US" dirty="0"/>
+          </a:p>
+          <a:p>
+            <a:pPr lvl="1"/>
+            <a:r>
+              <a:rPr lang="en-US" dirty="0" err="1"/>
+              <a:t>hypolimnion</a:t>
+            </a:r>
+            <a:r>
+              <a:rPr lang="en-US" dirty="0"/>
+              <a:t> </a:t>
+            </a:r>
+          </a:p>
+          <a:p>
+            <a:pPr lvl="2"/>
+            <a:r>
+              <a:rPr lang="en-US" dirty="0"/>
+              <a:t>2005, 2007-2009, </a:t>
+            </a:r>
+            <a:r>
+              <a:rPr lang="en-US" dirty="0" smtClean="0"/>
+              <a:t>2012-2013</a:t>
+            </a:r>
+          </a:p>
+          <a:p>
+            <a:pPr lvl="2"/>
+            <a:r>
+              <a:rPr lang="en-US" dirty="0" smtClean="0"/>
+              <a:t>82 metagenomes</a:t>
+            </a:r>
+          </a:p>
+          <a:p>
+            <a:pPr lvl="2"/>
+            <a:endParaRPr lang="en-US" dirty="0"/>
+          </a:p>
+          <a:p>
+            <a:endParaRPr lang="en-US" dirty="0"/>
+          </a:p>
+        </p:txBody>
+      </p:sp>
+    </p:spTree>
+    <p:extLst>
+      <p:ext uri="{BB962C8B-B14F-4D97-AF65-F5344CB8AC3E}">
+        <p14:creationId xmlns:p14="http://schemas.microsoft.com/office/powerpoint/2010/main" val="2510057821"/>
+      </p:ext>
+    </p:extLst>
+  </p:cSld>
+  <p:clrMapOvr>
+    <a:masterClrMapping/>
+  </p:clrMapOvr>
+</p:sld>
+</file>
+
+<file path=ppt/slides/slide11.xml><?xml version="1.0" encoding="utf-8"?>
 <p:sld xmlns:a="http://schemas.openxmlformats.org/drawingml/2006/main" xmlns:r="http://schemas.openxmlformats.org/officeDocument/2006/relationships" xmlns:p="http://schemas.openxmlformats.org/presentationml/2006/main">
   <p:cSld>
     <p:spTree>
@@ -4558,7 +4822,7 @@
 </p:sld>
 </file>
 
-<file path=ppt/slides/slide11.xml><?xml version="1.0" encoding="utf-8"?>
+<file path=ppt/slides/slide12.xml><?xml version="1.0" encoding="utf-8"?>
 <p:sld xmlns:a="http://schemas.openxmlformats.org/drawingml/2006/main" xmlns:r="http://schemas.openxmlformats.org/officeDocument/2006/relationships" xmlns:p="http://schemas.openxmlformats.org/presentationml/2006/main">
   <p:cSld>
     <p:spTree>
@@ -4709,11 +4973,7 @@
           <a:p>
             <a:r>
               <a:rPr lang="en-US" dirty="0" smtClean="0"/>
-              <a:t>Mary </a:t>
-            </a:r>
-            <a:r>
-              <a:rPr lang="en-US" dirty="0" smtClean="0"/>
-              <a:t>Lake</a:t>
+              <a:t>Mary Lake</a:t>
             </a:r>
           </a:p>
           <a:p>
@@ -4807,7 +5067,7 @@
 </p:sld>
 </file>
 
-<file path=ppt/slides/slide12.xml><?xml version="1.0" encoding="utf-8"?>
+<file path=ppt/slides/slide13.xml><?xml version="1.0" encoding="utf-8"?>
 <p:sld xmlns:a="http://schemas.openxmlformats.org/drawingml/2006/main" xmlns:r="http://schemas.openxmlformats.org/officeDocument/2006/relationships" xmlns:p="http://schemas.openxmlformats.org/presentationml/2006/main">
   <p:cSld>
     <p:spTree>
@@ -6429,134 +6689,6 @@
 </p:sld>
 </file>
 
-<file path=ppt/slides/slide13.xml><?xml version="1.0" encoding="utf-8"?>
-<p:sld xmlns:a="http://schemas.openxmlformats.org/drawingml/2006/main" xmlns:r="http://schemas.openxmlformats.org/officeDocument/2006/relationships" xmlns:p="http://schemas.openxmlformats.org/presentationml/2006/main" show="0">
-  <p:cSld>
-    <p:spTree>
-      <p:nvGrpSpPr>
-        <p:cNvPr id="1" name=""/>
-        <p:cNvGrpSpPr/>
-        <p:nvPr/>
-      </p:nvGrpSpPr>
-      <p:grpSpPr>
-        <a:xfrm>
-          <a:off x="0" y="0"/>
-          <a:ext cx="0" cy="0"/>
-          <a:chOff x="0" y="0"/>
-          <a:chExt cx="0" cy="0"/>
-        </a:xfrm>
-      </p:grpSpPr>
-      <p:sp>
-        <p:nvSpPr>
-          <p:cNvPr id="2" name="Title 1"/>
-          <p:cNvSpPr>
-            <a:spLocks noGrp="1"/>
-          </p:cNvSpPr>
-          <p:nvPr>
-            <p:ph type="title"/>
-          </p:nvPr>
-        </p:nvSpPr>
-        <p:spPr/>
-        <p:txBody>
-          <a:bodyPr/>
-          <a:lstStyle/>
-          <a:p>
-            <a:r>
-              <a:rPr lang="en-US" dirty="0" smtClean="0"/>
-              <a:t>Crystal Bog (CB) v. Trout Bog (TB)</a:t>
-            </a:r>
-            <a:endParaRPr lang="en-US" dirty="0"/>
-          </a:p>
-        </p:txBody>
-      </p:sp>
-      <p:sp>
-        <p:nvSpPr>
-          <p:cNvPr id="3" name="Content Placeholder 2"/>
-          <p:cNvSpPr>
-            <a:spLocks noGrp="1"/>
-          </p:cNvSpPr>
-          <p:nvPr>
-            <p:ph idx="1"/>
-          </p:nvPr>
-        </p:nvSpPr>
-        <p:spPr/>
-        <p:txBody>
-          <a:bodyPr>
-            <a:normAutofit lnSpcReduction="10000"/>
-          </a:bodyPr>
-          <a:lstStyle/>
-          <a:p>
-            <a:r>
-              <a:rPr lang="en-US" dirty="0" smtClean="0"/>
-              <a:t>Both dystrophic (high in DOC)</a:t>
-            </a:r>
-          </a:p>
-          <a:p>
-            <a:r>
-              <a:rPr lang="en-US" dirty="0" smtClean="0"/>
-              <a:t>Both seepage lakes</a:t>
-            </a:r>
-          </a:p>
-          <a:p>
-            <a:r>
-              <a:rPr lang="en-US" dirty="0" smtClean="0"/>
-              <a:t>Share 45-60% of their top 20 clades based on 16S tags</a:t>
-            </a:r>
-          </a:p>
-          <a:p>
-            <a:r>
-              <a:rPr lang="en-US" dirty="0" smtClean="0"/>
-              <a:t>Different mixing regimes </a:t>
-            </a:r>
-          </a:p>
-          <a:p>
-            <a:r>
-              <a:rPr lang="en-US" dirty="0" smtClean="0"/>
-              <a:t>CB has a smaller surface area</a:t>
-            </a:r>
-          </a:p>
-          <a:p>
-            <a:r>
-              <a:rPr lang="en-US" dirty="0" smtClean="0"/>
-              <a:t>TB is deeper</a:t>
-            </a:r>
-          </a:p>
-          <a:p>
-            <a:r>
-              <a:rPr lang="en-US" dirty="0" smtClean="0"/>
-              <a:t>About 5 miles apart</a:t>
-            </a:r>
-          </a:p>
-        </p:txBody>
-      </p:sp>
-    </p:spTree>
-    <p:extLst>
-      <p:ext uri="{BB962C8B-B14F-4D97-AF65-F5344CB8AC3E}">
-        <p14:creationId xmlns:p14="http://schemas.microsoft.com/office/powerpoint/2010/main" val="954074340"/>
-      </p:ext>
-    </p:extLst>
-  </p:cSld>
-  <p:clrMapOvr>
-    <a:masterClrMapping/>
-  </p:clrMapOvr>
-  <mc:AlternateContent xmlns:mc="http://schemas.openxmlformats.org/markup-compatibility/2006">
-    <mc:Choice xmlns:p14="http://schemas.microsoft.com/office/powerpoint/2010/main" Requires="p14">
-      <p:transition spd="slow" p14:dur="2000"/>
-    </mc:Choice>
-    <mc:Fallback>
-      <p:transition spd="slow"/>
-    </mc:Fallback>
-  </mc:AlternateContent>
-  <p:timing>
-    <p:tnLst>
-      <p:par>
-        <p:cTn id="1" dur="indefinite" restart="never" nodeType="tmRoot"/>
-      </p:par>
-    </p:tnLst>
-  </p:timing>
-</p:sld>
-</file>
-
 <file path=ppt/slides/slide14.xml><?xml version="1.0" encoding="utf-8"?>
 <p:sld xmlns:a="http://schemas.openxmlformats.org/drawingml/2006/main" xmlns:r="http://schemas.openxmlformats.org/officeDocument/2006/relationships" xmlns:p="http://schemas.openxmlformats.org/presentationml/2006/main" show="0">
   <p:cSld>
@@ -6591,6 +6723,134 @@
           <a:p>
             <a:r>
               <a:rPr lang="en-US" dirty="0" smtClean="0"/>
+              <a:t>Crystal Bog (CB) v. Trout Bog (TB)</a:t>
+            </a:r>
+            <a:endParaRPr lang="en-US" dirty="0"/>
+          </a:p>
+        </p:txBody>
+      </p:sp>
+      <p:sp>
+        <p:nvSpPr>
+          <p:cNvPr id="3" name="Content Placeholder 2"/>
+          <p:cNvSpPr>
+            <a:spLocks noGrp="1"/>
+          </p:cNvSpPr>
+          <p:nvPr>
+            <p:ph idx="1"/>
+          </p:nvPr>
+        </p:nvSpPr>
+        <p:spPr/>
+        <p:txBody>
+          <a:bodyPr>
+            <a:normAutofit lnSpcReduction="10000"/>
+          </a:bodyPr>
+          <a:lstStyle/>
+          <a:p>
+            <a:r>
+              <a:rPr lang="en-US" dirty="0" smtClean="0"/>
+              <a:t>Both dystrophic (high in DOC)</a:t>
+            </a:r>
+          </a:p>
+          <a:p>
+            <a:r>
+              <a:rPr lang="en-US" dirty="0" smtClean="0"/>
+              <a:t>Both seepage lakes</a:t>
+            </a:r>
+          </a:p>
+          <a:p>
+            <a:r>
+              <a:rPr lang="en-US" dirty="0" smtClean="0"/>
+              <a:t>Share 45-60% of their top 20 clades based on 16S tags</a:t>
+            </a:r>
+          </a:p>
+          <a:p>
+            <a:r>
+              <a:rPr lang="en-US" dirty="0" smtClean="0"/>
+              <a:t>Different mixing regimes </a:t>
+            </a:r>
+          </a:p>
+          <a:p>
+            <a:r>
+              <a:rPr lang="en-US" dirty="0" smtClean="0"/>
+              <a:t>CB has a smaller surface area</a:t>
+            </a:r>
+          </a:p>
+          <a:p>
+            <a:r>
+              <a:rPr lang="en-US" dirty="0" smtClean="0"/>
+              <a:t>TB is deeper</a:t>
+            </a:r>
+          </a:p>
+          <a:p>
+            <a:r>
+              <a:rPr lang="en-US" dirty="0" smtClean="0"/>
+              <a:t>About 5 miles apart</a:t>
+            </a:r>
+          </a:p>
+        </p:txBody>
+      </p:sp>
+    </p:spTree>
+    <p:extLst>
+      <p:ext uri="{BB962C8B-B14F-4D97-AF65-F5344CB8AC3E}">
+        <p14:creationId xmlns:p14="http://schemas.microsoft.com/office/powerpoint/2010/main" val="954074340"/>
+      </p:ext>
+    </p:extLst>
+  </p:cSld>
+  <p:clrMapOvr>
+    <a:masterClrMapping/>
+  </p:clrMapOvr>
+  <mc:AlternateContent xmlns:mc="http://schemas.openxmlformats.org/markup-compatibility/2006">
+    <mc:Choice xmlns:p14="http://schemas.microsoft.com/office/powerpoint/2010/main" Requires="p14">
+      <p:transition spd="slow" p14:dur="2000"/>
+    </mc:Choice>
+    <mc:Fallback>
+      <p:transition xmlns:p14="http://schemas.microsoft.com/office/powerpoint/2010/main" spd="slow"/>
+    </mc:Fallback>
+  </mc:AlternateContent>
+  <p:timing>
+    <p:tnLst>
+      <p:par>
+        <p:cTn xmlns:p14="http://schemas.microsoft.com/office/powerpoint/2010/main" id="1" dur="indefinite" restart="never" nodeType="tmRoot"/>
+      </p:par>
+    </p:tnLst>
+  </p:timing>
+</p:sld>
+</file>
+
+<file path=ppt/slides/slide15.xml><?xml version="1.0" encoding="utf-8"?>
+<p:sld xmlns:a="http://schemas.openxmlformats.org/drawingml/2006/main" xmlns:r="http://schemas.openxmlformats.org/officeDocument/2006/relationships" xmlns:p="http://schemas.openxmlformats.org/presentationml/2006/main" show="0">
+  <p:cSld>
+    <p:spTree>
+      <p:nvGrpSpPr>
+        <p:cNvPr id="1" name=""/>
+        <p:cNvGrpSpPr/>
+        <p:nvPr/>
+      </p:nvGrpSpPr>
+      <p:grpSpPr>
+        <a:xfrm>
+          <a:off x="0" y="0"/>
+          <a:ext cx="0" cy="0"/>
+          <a:chOff x="0" y="0"/>
+          <a:chExt cx="0" cy="0"/>
+        </a:xfrm>
+      </p:grpSpPr>
+      <p:sp>
+        <p:nvSpPr>
+          <p:cNvPr id="2" name="Title 1"/>
+          <p:cNvSpPr>
+            <a:spLocks noGrp="1"/>
+          </p:cNvSpPr>
+          <p:nvPr>
+            <p:ph type="title"/>
+          </p:nvPr>
+        </p:nvSpPr>
+        <p:spPr/>
+        <p:txBody>
+          <a:bodyPr/>
+          <a:lstStyle/>
+          <a:p>
+            <a:r>
+              <a:rPr lang="en-US" dirty="0" smtClean="0"/>
               <a:t>Next Questions</a:t>
             </a:r>
             <a:endParaRPr lang="en-US" dirty="0"/>
@@ -6695,20 +6955,20 @@
       <p:transition spd="slow" p14:dur="2000"/>
     </mc:Choice>
     <mc:Fallback>
-      <p:transition spd="slow"/>
+      <p:transition xmlns:p14="http://schemas.microsoft.com/office/powerpoint/2010/main" spd="slow"/>
     </mc:Fallback>
   </mc:AlternateContent>
   <p:timing>
     <p:tnLst>
       <p:par>
-        <p:cTn id="1" dur="indefinite" restart="never" nodeType="tmRoot"/>
+        <p:cTn xmlns:p14="http://schemas.microsoft.com/office/powerpoint/2010/main" id="1" dur="indefinite" restart="never" nodeType="tmRoot"/>
       </p:par>
     </p:tnLst>
   </p:timing>
 </p:sld>
 </file>
 
-<file path=ppt/slides/slide15.xml><?xml version="1.0" encoding="utf-8"?>
+<file path=ppt/slides/slide16.xml><?xml version="1.0" encoding="utf-8"?>
 <p:sld xmlns:a="http://schemas.openxmlformats.org/drawingml/2006/main" xmlns:r="http://schemas.openxmlformats.org/officeDocument/2006/relationships" xmlns:p="http://schemas.openxmlformats.org/presentationml/2006/main" show="0">
   <p:cSld>
     <p:spTree>
@@ -6942,20 +7202,20 @@
       <p:transition spd="slow" p14:dur="2000"/>
     </mc:Choice>
     <mc:Fallback>
-      <p:transition spd="slow"/>
+      <p:transition xmlns:p14="http://schemas.microsoft.com/office/powerpoint/2010/main" spd="slow"/>
     </mc:Fallback>
   </mc:AlternateContent>
   <p:timing>
     <p:tnLst>
       <p:par>
-        <p:cTn id="1" dur="indefinite" restart="never" nodeType="tmRoot"/>
+        <p:cTn xmlns:p14="http://schemas.microsoft.com/office/powerpoint/2010/main" id="1" dur="indefinite" restart="never" nodeType="tmRoot"/>
       </p:par>
     </p:tnLst>
   </p:timing>
 </p:sld>
 </file>
 
-<file path=ppt/slides/slide16.xml><?xml version="1.0" encoding="utf-8"?>
+<file path=ppt/slides/slide17.xml><?xml version="1.0" encoding="utf-8"?>
 <p:sld xmlns:a="http://schemas.openxmlformats.org/drawingml/2006/main" xmlns:r="http://schemas.openxmlformats.org/officeDocument/2006/relationships" xmlns:p="http://schemas.openxmlformats.org/presentationml/2006/main" show="0">
   <p:cSld>
     <p:spTree>
@@ -7089,20 +7349,20 @@
       <p:transition spd="slow" p14:dur="2000"/>
     </mc:Choice>
     <mc:Fallback>
-      <p:transition spd="slow"/>
+      <p:transition xmlns:p14="http://schemas.microsoft.com/office/powerpoint/2010/main" spd="slow"/>
     </mc:Fallback>
   </mc:AlternateContent>
   <p:timing>
     <p:tnLst>
       <p:par>
-        <p:cTn id="1" dur="indefinite" restart="never" nodeType="tmRoot"/>
+        <p:cTn xmlns:p14="http://schemas.microsoft.com/office/powerpoint/2010/main" id="1" dur="indefinite" restart="never" nodeType="tmRoot"/>
       </p:par>
     </p:tnLst>
   </p:timing>
 </p:sld>
 </file>
 
-<file path=ppt/slides/slide17.xml><?xml version="1.0" encoding="utf-8"?>
+<file path=ppt/slides/slide18.xml><?xml version="1.0" encoding="utf-8"?>
 <p:sld xmlns:a="http://schemas.openxmlformats.org/drawingml/2006/main" xmlns:r="http://schemas.openxmlformats.org/officeDocument/2006/relationships" xmlns:p="http://schemas.openxmlformats.org/presentationml/2006/main" show="0">
   <p:cSld>
     <p:spTree>
@@ -7336,13 +7596,13 @@
       <p:transition spd="slow" p14:dur="2000"/>
     </mc:Choice>
     <mc:Fallback>
-      <p:transition spd="slow"/>
+      <p:transition xmlns:p14="http://schemas.microsoft.com/office/powerpoint/2010/main" spd="slow"/>
     </mc:Fallback>
   </mc:AlternateContent>
   <p:timing>
     <p:tnLst>
       <p:par>
-        <p:cTn id="1" dur="indefinite" restart="never" nodeType="tmRoot"/>
+        <p:cTn xmlns:p14="http://schemas.microsoft.com/office/powerpoint/2010/main" id="1" dur="indefinite" restart="never" nodeType="tmRoot"/>
       </p:par>
     </p:tnLst>
   </p:timing>
@@ -7748,7 +8008,7 @@
   <p:timing>
     <p:tnLst>
       <p:par>
-        <p:cTn id="1" dur="indefinite" restart="never" nodeType="tmRoot"/>
+        <p:cTn xmlns:p14="http://schemas.microsoft.com/office/powerpoint/2010/main" id="1" dur="indefinite" restart="never" nodeType="tmRoot"/>
       </p:par>
     </p:tnLst>
   </p:timing>
@@ -7807,14 +8067,14 @@
           </a:ln>
           <a:extLst>
             <a:ext uri="{909E8E84-426E-40dd-AFC4-6F175D3DCCD1}">
-              <a14:hiddenFill xmlns:a14="http://schemas.microsoft.com/office/drawing/2010/main" xmlns="">
+              <a14:hiddenFill xmlns:a14="http://schemas.microsoft.com/office/drawing/2010/main">
                 <a:solidFill>
                   <a:srgbClr val="FFFFFF"/>
                 </a:solidFill>
               </a14:hiddenFill>
             </a:ext>
             <a:ext uri="{91240B29-F687-4f45-9708-019B960494DF}">
-              <a14:hiddenLine xmlns:a14="http://schemas.microsoft.com/office/drawing/2010/main" xmlns="" w="9525">
+              <a14:hiddenLine xmlns:a14="http://schemas.microsoft.com/office/drawing/2010/main" w="9525">
                 <a:solidFill>
                   <a:srgbClr val="000000"/>
                 </a:solidFill>
@@ -7963,7 +8223,7 @@
   <p:timing>
     <p:tnLst>
       <p:par>
-        <p:cTn id="1" dur="indefinite" restart="never" nodeType="tmRoot"/>
+        <p:cTn xmlns:p14="http://schemas.microsoft.com/office/powerpoint/2010/main" id="1" dur="indefinite" restart="never" nodeType="tmRoot"/>
       </p:par>
     </p:tnLst>
   </p:timing>
@@ -8049,7 +8309,7 @@
   <p:timing>
     <p:tnLst>
       <p:par>
-        <p:cTn id="1" dur="indefinite" restart="never" nodeType="tmRoot"/>
+        <p:cTn xmlns:p14="http://schemas.microsoft.com/office/powerpoint/2010/main" id="1" dur="indefinite" restart="never" nodeType="tmRoot"/>
       </p:par>
     </p:tnLst>
   </p:timing>
@@ -8125,6 +8385,13 @@
   <p:clrMapOvr>
     <a:masterClrMapping/>
   </p:clrMapOvr>
+  <p:timing>
+    <p:tnLst>
+      <p:par>
+        <p:cTn xmlns:p14="http://schemas.microsoft.com/office/powerpoint/2010/main" id="1" dur="indefinite" restart="never" nodeType="tmRoot"/>
+      </p:par>
+    </p:tnLst>
+  </p:timing>
 </p:sld>
 </file>
 
@@ -8160,11 +8427,7 @@
           <a:bodyPr/>
           <a:lstStyle/>
           <a:p>
-            <a:r>
-              <a:rPr lang="en-US" dirty="0" smtClean="0"/>
-              <a:t>Questions</a:t>
-            </a:r>
-            <a:endParaRPr lang="en-US" dirty="0"/>
+            <a:endParaRPr lang="en-US"/>
           </a:p>
         </p:txBody>
       </p:sp>
@@ -8183,49 +8446,111 @@
           <a:bodyPr/>
           <a:lstStyle/>
           <a:p>
-            <a:r>
-              <a:rPr lang="en-US" dirty="0" smtClean="0"/>
-              <a:t>Are </a:t>
-            </a:r>
-            <a:r>
-              <a:rPr lang="en-US" dirty="0"/>
-              <a:t>there ecologically distinct strains/genotypes within previously defined sequence-discrete populations?</a:t>
-            </a:r>
-          </a:p>
-          <a:p>
-            <a:r>
-              <a:rPr lang="en-US" dirty="0"/>
-              <a:t>What stage of speciation are these distinct strains/genotypes at in their separation? </a:t>
-            </a:r>
-            <a:endParaRPr lang="en-US" dirty="0" smtClean="0"/>
-          </a:p>
-          <a:p>
-            <a:r>
-              <a:rPr lang="en-US" dirty="0" smtClean="0"/>
-              <a:t>Is </a:t>
-            </a:r>
-            <a:r>
-              <a:rPr lang="en-US" dirty="0"/>
-              <a:t>there a barrier </a:t>
-            </a:r>
-            <a:r>
-              <a:rPr lang="en-US" dirty="0" smtClean="0"/>
-              <a:t>to recombination between co-exiting strains?</a:t>
-            </a:r>
-            <a:endParaRPr lang="en-US" dirty="0"/>
+            <a:endParaRPr lang="en-US"/>
+          </a:p>
+        </p:txBody>
+      </p:sp>
+      <p:pic>
+        <p:nvPicPr>
+          <p:cNvPr id="4" name="Picture 3" descr="Shapiro2014_table1.png"/>
+          <p:cNvPicPr>
+            <a:picLocks noChangeAspect="1"/>
+          </p:cNvPicPr>
+          <p:nvPr/>
+        </p:nvPicPr>
+        <p:blipFill>
+          <a:blip r:embed="rId2">
+            <a:extLst>
+              <a:ext uri="{28A0092B-C50C-407E-A947-70E740481C1C}">
+                <a14:useLocalDpi xmlns:a14="http://schemas.microsoft.com/office/drawing/2010/main" val="0"/>
+              </a:ext>
+            </a:extLst>
+          </a:blip>
+          <a:stretch>
+            <a:fillRect/>
+          </a:stretch>
+        </p:blipFill>
+        <p:spPr>
+          <a:xfrm>
+            <a:off x="274115" y="2140691"/>
+            <a:ext cx="8598055" cy="2692321"/>
+          </a:xfrm>
+          <a:prstGeom prst="rect">
+            <a:avLst/>
+          </a:prstGeom>
+        </p:spPr>
+      </p:pic>
+      <p:sp>
+        <p:nvSpPr>
+          <p:cNvPr id="5" name="TextBox 4"/>
+          <p:cNvSpPr txBox="1"/>
+          <p:nvPr/>
+        </p:nvSpPr>
+        <p:spPr>
+          <a:xfrm>
+            <a:off x="5517955" y="6417697"/>
+            <a:ext cx="3641692" cy="307777"/>
+          </a:xfrm>
+          <a:prstGeom prst="rect">
+            <a:avLst/>
+          </a:prstGeom>
+          <a:noFill/>
+        </p:spPr>
+        <p:txBody>
+          <a:bodyPr wrap="none" rtlCol="0">
+            <a:spAutoFit/>
+          </a:bodyPr>
+          <a:lstStyle/>
+          <a:p>
+            <a:r>
+              <a:rPr lang="en-US" sz="1400" dirty="0" smtClean="0"/>
+              <a:t>Shapiro </a:t>
+            </a:r>
+            <a:r>
+              <a:rPr lang="en-US" sz="1400" dirty="0" smtClean="0"/>
+              <a:t>and </a:t>
+            </a:r>
+            <a:r>
+              <a:rPr lang="en-US" sz="1400" dirty="0" err="1" smtClean="0"/>
+              <a:t>Polz</a:t>
+            </a:r>
+            <a:r>
+              <a:rPr lang="en-US" sz="1400" dirty="0" smtClean="0"/>
+              <a:t> 2014 </a:t>
+            </a:r>
+            <a:r>
+              <a:rPr lang="en-US" sz="1400" i="1" dirty="0" smtClean="0"/>
+              <a:t>Trends </a:t>
+            </a:r>
+            <a:r>
+              <a:rPr lang="en-US" sz="1400" i="1" dirty="0"/>
+              <a:t>in </a:t>
+            </a:r>
+            <a:r>
+              <a:rPr lang="en-US" sz="1400" i="1" dirty="0" smtClean="0"/>
+              <a:t>Microbiology</a:t>
+            </a:r>
+            <a:endParaRPr lang="en-US" sz="1400" i="1" dirty="0"/>
           </a:p>
         </p:txBody>
       </p:sp>
     </p:spTree>
     <p:extLst>
       <p:ext uri="{BB962C8B-B14F-4D97-AF65-F5344CB8AC3E}">
-        <p14:creationId xmlns:p14="http://schemas.microsoft.com/office/powerpoint/2010/main" val="2491628351"/>
+        <p14:creationId xmlns:p14="http://schemas.microsoft.com/office/powerpoint/2010/main" val="1661310416"/>
       </p:ext>
     </p:extLst>
   </p:cSld>
   <p:clrMapOvr>
     <a:masterClrMapping/>
   </p:clrMapOvr>
+  <p:timing>
+    <p:tnLst>
+      <p:par>
+        <p:cTn xmlns:p14="http://schemas.microsoft.com/office/powerpoint/2010/main" id="1" dur="indefinite" restart="never" nodeType="tmRoot"/>
+      </p:par>
+    </p:tnLst>
+  </p:timing>
 </p:sld>
 </file>
 
@@ -8263,7 +8588,7 @@
           <a:p>
             <a:r>
               <a:rPr lang="en-US" dirty="0" smtClean="0"/>
-              <a:t>Stats on Metagenomes</a:t>
+              <a:t>Questions</a:t>
             </a:r>
             <a:endParaRPr lang="en-US" dirty="0"/>
           </a:p>
@@ -8276,218 +8601,43 @@
             <a:spLocks noGrp="1"/>
           </p:cNvSpPr>
           <p:nvPr>
-            <p:ph sz="half" idx="1"/>
+            <p:ph idx="1"/>
           </p:nvPr>
         </p:nvSpPr>
         <p:spPr/>
         <p:txBody>
-          <a:bodyPr>
-            <a:normAutofit fontScale="92500" lnSpcReduction="10000"/>
-          </a:bodyPr>
-          <a:lstStyle/>
-          <a:p>
-            <a:r>
-              <a:rPr lang="en-US" dirty="0" smtClean="0"/>
-              <a:t>Crystal </a:t>
-            </a:r>
-            <a:r>
-              <a:rPr lang="en-US" dirty="0" smtClean="0"/>
-              <a:t>Bog </a:t>
-            </a:r>
-          </a:p>
-          <a:p>
-            <a:pPr lvl="1"/>
-            <a:r>
-              <a:rPr lang="en-US" dirty="0" smtClean="0"/>
-              <a:t>2007-2009</a:t>
-            </a:r>
-          </a:p>
-          <a:p>
-            <a:pPr lvl="1"/>
-            <a:r>
-              <a:rPr lang="en-US" dirty="0" smtClean="0"/>
-              <a:t>82 metagenomes</a:t>
-            </a:r>
-          </a:p>
-          <a:p>
-            <a:pPr lvl="1"/>
-            <a:r>
-              <a:rPr lang="en-US" dirty="0" smtClean="0"/>
-              <a:t>20 </a:t>
-            </a:r>
-            <a:r>
-              <a:rPr lang="en-US" dirty="0" err="1" smtClean="0"/>
-              <a:t>Gbp</a:t>
-            </a:r>
-            <a:r>
-              <a:rPr lang="en-US" dirty="0" smtClean="0"/>
-              <a:t> assembled</a:t>
+          <a:bodyPr/>
+          <a:lstStyle/>
+          <a:p>
+            <a:r>
+              <a:rPr lang="en-US" dirty="0" smtClean="0"/>
+              <a:t>Are </a:t>
+            </a:r>
+            <a:r>
+              <a:rPr lang="en-US" dirty="0"/>
+              <a:t>there ecologically distinct strains/genotypes within previously defined sequence-discrete populations?</a:t>
+            </a:r>
+          </a:p>
+          <a:p>
+            <a:r>
+              <a:rPr lang="en-US" dirty="0"/>
+              <a:t>What stage of speciation are these distinct strains/genotypes at in their separation? </a:t>
             </a:r>
             <a:endParaRPr lang="en-US" dirty="0" smtClean="0"/>
           </a:p>
           <a:p>
             <a:r>
               <a:rPr lang="en-US" dirty="0" smtClean="0"/>
-              <a:t>Mary </a:t>
-            </a:r>
-            <a:r>
-              <a:rPr lang="en-US" dirty="0" smtClean="0"/>
-              <a:t>Lake </a:t>
-            </a:r>
-          </a:p>
-          <a:p>
-            <a:pPr lvl="1"/>
-            <a:r>
-              <a:rPr lang="en-US" dirty="0" smtClean="0"/>
-              <a:t>2009, 12 depths</a:t>
-            </a:r>
-          </a:p>
-          <a:p>
-            <a:pPr lvl="1"/>
-            <a:r>
-              <a:rPr lang="en-US" dirty="0" smtClean="0"/>
-              <a:t>12 metagenomes</a:t>
-            </a:r>
-          </a:p>
-          <a:p>
-            <a:pPr lvl="1"/>
-            <a:r>
-              <a:rPr lang="en-US" dirty="0" smtClean="0"/>
-              <a:t>11 </a:t>
-            </a:r>
-            <a:r>
-              <a:rPr lang="en-US" dirty="0" err="1" smtClean="0"/>
-              <a:t>Mbp</a:t>
-            </a:r>
-            <a:r>
-              <a:rPr lang="en-US" dirty="0" smtClean="0"/>
-              <a:t> assembled</a:t>
-            </a:r>
-            <a:endParaRPr lang="en-US" dirty="0" smtClean="0"/>
-          </a:p>
-        </p:txBody>
-      </p:sp>
-      <p:sp>
-        <p:nvSpPr>
-          <p:cNvPr id="4" name="Content Placeholder 3"/>
-          <p:cNvSpPr>
-            <a:spLocks noGrp="1"/>
-          </p:cNvSpPr>
-          <p:nvPr>
-            <p:ph sz="half" idx="2"/>
-          </p:nvPr>
-        </p:nvSpPr>
-        <p:spPr/>
-        <p:txBody>
-          <a:bodyPr>
-            <a:normAutofit fontScale="92500" lnSpcReduction="10000"/>
-          </a:bodyPr>
-          <a:lstStyle/>
-          <a:p>
+              <a:t>Is </a:t>
+            </a:r>
             <a:r>
               <a:rPr lang="en-US" dirty="0"/>
-              <a:t>Mendota </a:t>
-            </a:r>
-          </a:p>
-          <a:p>
-            <a:pPr lvl="1"/>
-            <a:r>
-              <a:rPr lang="en-US" dirty="0"/>
-              <a:t>2008-2012</a:t>
-            </a:r>
-          </a:p>
-          <a:p>
-            <a:pPr lvl="1"/>
-            <a:r>
-              <a:rPr lang="en-US" dirty="0"/>
-              <a:t>94 </a:t>
-            </a:r>
-            <a:r>
-              <a:rPr lang="en-US" dirty="0" smtClean="0"/>
-              <a:t>metagenomes</a:t>
-            </a:r>
-          </a:p>
-          <a:p>
-            <a:pPr lvl="1"/>
-            <a:r>
-              <a:rPr lang="en-US" dirty="0" smtClean="0"/>
-              <a:t>11 </a:t>
-            </a:r>
-            <a:r>
-              <a:rPr lang="en-US" dirty="0" err="1"/>
-              <a:t>Gbp</a:t>
-            </a:r>
-            <a:r>
-              <a:rPr lang="en-US" dirty="0"/>
-              <a:t> assembled</a:t>
-            </a:r>
-          </a:p>
-          <a:p>
-            <a:r>
-              <a:rPr lang="en-US" dirty="0"/>
-              <a:t>Trout Bog </a:t>
-            </a:r>
-          </a:p>
-          <a:p>
-            <a:pPr lvl="1"/>
-            <a:r>
-              <a:rPr lang="en-US" dirty="0" err="1"/>
-              <a:t>epilimnion</a:t>
-            </a:r>
-            <a:r>
-              <a:rPr lang="en-US" dirty="0"/>
-              <a:t> </a:t>
-            </a:r>
-          </a:p>
-          <a:p>
-            <a:pPr lvl="2"/>
-            <a:r>
-              <a:rPr lang="en-US" dirty="0" smtClean="0"/>
-              <a:t>2007-2009</a:t>
-            </a:r>
-          </a:p>
-          <a:p>
-            <a:pPr lvl="2"/>
-            <a:r>
-              <a:rPr lang="en-US" dirty="0" smtClean="0"/>
-              <a:t>47 metagenomes</a:t>
-            </a:r>
-            <a:endParaRPr lang="en-US" dirty="0"/>
-          </a:p>
-          <a:p>
-            <a:pPr lvl="1"/>
-            <a:r>
-              <a:rPr lang="en-US" dirty="0" err="1"/>
-              <a:t>hypolimnion</a:t>
-            </a:r>
-            <a:r>
-              <a:rPr lang="en-US" dirty="0"/>
-              <a:t> </a:t>
-            </a:r>
-          </a:p>
-          <a:p>
-            <a:pPr lvl="2"/>
-            <a:r>
-              <a:rPr lang="en-US" dirty="0"/>
-              <a:t>2005, 2007-2009, </a:t>
-            </a:r>
-            <a:r>
-              <a:rPr lang="en-US" dirty="0" smtClean="0"/>
-              <a:t>2012-2013</a:t>
-            </a:r>
-          </a:p>
-          <a:p>
-            <a:pPr lvl="2"/>
-            <a:r>
-              <a:rPr lang="en-US" dirty="0" smtClean="0"/>
-              <a:t>82 metagenomes</a:t>
-            </a:r>
-          </a:p>
-          <a:p>
-            <a:pPr lvl="2"/>
-            <a:endParaRPr lang="en-US" dirty="0"/>
-          </a:p>
-          <a:p>
+              <a:t>there a barrier </a:t>
+            </a:r>
+            <a:r>
+              <a:rPr lang="en-US" dirty="0" smtClean="0"/>
+              <a:t>to recombination between co-exiting strains?</a:t>
+            </a:r>
             <a:endParaRPr lang="en-US" dirty="0"/>
           </a:p>
         </p:txBody>
@@ -8495,13 +8645,20 @@
     </p:spTree>
     <p:extLst>
       <p:ext uri="{BB962C8B-B14F-4D97-AF65-F5344CB8AC3E}">
-        <p14:creationId xmlns:p14="http://schemas.microsoft.com/office/powerpoint/2010/main" val="2510057821"/>
+        <p14:creationId xmlns:p14="http://schemas.microsoft.com/office/powerpoint/2010/main" val="2491628351"/>
       </p:ext>
     </p:extLst>
   </p:cSld>
   <p:clrMapOvr>
     <a:masterClrMapping/>
   </p:clrMapOvr>
+  <p:timing>
+    <p:tnLst>
+      <p:par>
+        <p:cTn xmlns:p14="http://schemas.microsoft.com/office/powerpoint/2010/main" id="1" dur="indefinite" restart="never" nodeType="tmRoot"/>
+      </p:par>
+    </p:tnLst>
+  </p:timing>
 </p:sld>
 </file>
 

</xml_diff>